<commit_message>
pptx - backend started
</commit_message>
<xml_diff>
--- a/Documentations/NasaPC_WebShopProject.pptx
+++ b/Documentations/NasaPC_WebShopProject.pptx
@@ -2,10 +2,14 @@
 <file path=ppt/presentation.xml><?xml version="1.0" encoding="utf-8"?>
 <p:presentation xmlns:a="http://schemas.openxmlformats.org/drawingml/2006/main" xmlns:r="http://schemas.openxmlformats.org/officeDocument/2006/relationships" xmlns:p="http://schemas.openxmlformats.org/presentationml/2006/main" saveSubsetFonts="1">
   <p:sldMasterIdLst>
-    <p:sldMasterId id="2147483648" r:id="rId1"/>
+    <p:sldMasterId id="2147483660" r:id="rId1"/>
   </p:sldMasterIdLst>
+  <p:notesMasterIdLst>
+    <p:notesMasterId r:id="rId4"/>
+  </p:notesMasterIdLst>
   <p:sldIdLst>
     <p:sldId id="257" r:id="rId2"/>
+    <p:sldId id="259" r:id="rId3"/>
   </p:sldIdLst>
   <p:sldSz cx="12192000" cy="6858000"/>
   <p:notesSz cx="6858000" cy="9144000"/>
@@ -104,7 +108,362 @@
       </a:defRPr>
     </a:lvl9pPr>
   </p:defaultTextStyle>
+  <p:extLst>
+    <p:ext uri="{EFAFB233-063F-42B5-8137-9DF3F51BA10A}">
+      <p15:sldGuideLst xmlns:p15="http://schemas.microsoft.com/office/powerpoint/2012/main"/>
+    </p:ext>
+  </p:extLst>
 </p:presentation>
+</file>
+
+<file path=ppt/notesMasters/notesMaster1.xml><?xml version="1.0" encoding="utf-8"?>
+<p:notesMaster xmlns:a="http://schemas.openxmlformats.org/drawingml/2006/main" xmlns:r="http://schemas.openxmlformats.org/officeDocument/2006/relationships" xmlns:p="http://schemas.openxmlformats.org/presentationml/2006/main">
+  <p:cSld>
+    <p:bg>
+      <p:bgRef idx="1001">
+        <a:schemeClr val="bg1"/>
+      </p:bgRef>
+    </p:bg>
+    <p:spTree>
+      <p:nvGrpSpPr>
+        <p:cNvPr id="1" name=""/>
+        <p:cNvGrpSpPr/>
+        <p:nvPr/>
+      </p:nvGrpSpPr>
+      <p:grpSpPr>
+        <a:xfrm>
+          <a:off x="0" y="0"/>
+          <a:ext cx="0" cy="0"/>
+          <a:chOff x="0" y="0"/>
+          <a:chExt cx="0" cy="0"/>
+        </a:xfrm>
+      </p:grpSpPr>
+      <p:sp>
+        <p:nvSpPr>
+          <p:cNvPr id="2" name="Élőfej helye 1"/>
+          <p:cNvSpPr>
+            <a:spLocks noGrp="1"/>
+          </p:cNvSpPr>
+          <p:nvPr>
+            <p:ph type="hdr" sz="quarter"/>
+          </p:nvPr>
+        </p:nvSpPr>
+        <p:spPr>
+          <a:xfrm>
+            <a:off x="0" y="0"/>
+            <a:ext cx="2971800" cy="458788"/>
+          </a:xfrm>
+          <a:prstGeom prst="rect">
+            <a:avLst/>
+          </a:prstGeom>
+        </p:spPr>
+        <p:txBody>
+          <a:bodyPr vert="horz" lIns="91440" tIns="45720" rIns="91440" bIns="45720" rtlCol="0"/>
+          <a:lstStyle>
+            <a:lvl1pPr algn="l">
+              <a:defRPr sz="1200"/>
+            </a:lvl1pPr>
+          </a:lstStyle>
+          <a:p>
+            <a:endParaRPr lang="en-GB"/>
+          </a:p>
+        </p:txBody>
+      </p:sp>
+      <p:sp>
+        <p:nvSpPr>
+          <p:cNvPr id="3" name="Dátum helye 2"/>
+          <p:cNvSpPr>
+            <a:spLocks noGrp="1"/>
+          </p:cNvSpPr>
+          <p:nvPr>
+            <p:ph type="dt" idx="1"/>
+          </p:nvPr>
+        </p:nvSpPr>
+        <p:spPr>
+          <a:xfrm>
+            <a:off x="3884613" y="0"/>
+            <a:ext cx="2971800" cy="458788"/>
+          </a:xfrm>
+          <a:prstGeom prst="rect">
+            <a:avLst/>
+          </a:prstGeom>
+        </p:spPr>
+        <p:txBody>
+          <a:bodyPr vert="horz" lIns="91440" tIns="45720" rIns="91440" bIns="45720" rtlCol="0"/>
+          <a:lstStyle>
+            <a:lvl1pPr algn="r">
+              <a:defRPr sz="1200"/>
+            </a:lvl1pPr>
+          </a:lstStyle>
+          <a:p>
+            <a:fld id="{D0152BAE-99A8-4C46-A619-8CD90794C8F6}" type="datetimeFigureOut">
+              <a:rPr lang="en-GB" smtClean="0"/>
+              <a:t>27/04/2022</a:t>
+            </a:fld>
+            <a:endParaRPr lang="en-GB"/>
+          </a:p>
+        </p:txBody>
+      </p:sp>
+      <p:sp>
+        <p:nvSpPr>
+          <p:cNvPr id="4" name="Diakép helye 3"/>
+          <p:cNvSpPr>
+            <a:spLocks noGrp="1" noRot="1" noChangeAspect="1"/>
+          </p:cNvSpPr>
+          <p:nvPr>
+            <p:ph type="sldImg" idx="2"/>
+          </p:nvPr>
+        </p:nvSpPr>
+        <p:spPr>
+          <a:xfrm>
+            <a:off x="685800" y="1143000"/>
+            <a:ext cx="5486400" cy="3086100"/>
+          </a:xfrm>
+          <a:prstGeom prst="rect">
+            <a:avLst/>
+          </a:prstGeom>
+          <a:noFill/>
+          <a:ln w="12700">
+            <a:solidFill>
+              <a:prstClr val="black"/>
+            </a:solidFill>
+          </a:ln>
+        </p:spPr>
+        <p:txBody>
+          <a:bodyPr vert="horz" lIns="91440" tIns="45720" rIns="91440" bIns="45720" rtlCol="0" anchor="ctr"/>
+          <a:lstStyle/>
+          <a:p>
+            <a:endParaRPr lang="en-GB"/>
+          </a:p>
+        </p:txBody>
+      </p:sp>
+      <p:sp>
+        <p:nvSpPr>
+          <p:cNvPr id="5" name="Jegyzetek helye 4"/>
+          <p:cNvSpPr>
+            <a:spLocks noGrp="1"/>
+          </p:cNvSpPr>
+          <p:nvPr>
+            <p:ph type="body" sz="quarter" idx="3"/>
+          </p:nvPr>
+        </p:nvSpPr>
+        <p:spPr>
+          <a:xfrm>
+            <a:off x="685800" y="4400550"/>
+            <a:ext cx="5486400" cy="3600450"/>
+          </a:xfrm>
+          <a:prstGeom prst="rect">
+            <a:avLst/>
+          </a:prstGeom>
+        </p:spPr>
+        <p:txBody>
+          <a:bodyPr vert="horz" lIns="91440" tIns="45720" rIns="91440" bIns="45720" rtlCol="0"/>
+          <a:lstStyle/>
+          <a:p>
+            <a:pPr lvl="0"/>
+            <a:r>
+              <a:rPr lang="hu-HU"/>
+              <a:t>Mintaszöveg szerkesztése</a:t>
+            </a:r>
+          </a:p>
+          <a:p>
+            <a:pPr lvl="1"/>
+            <a:r>
+              <a:rPr lang="hu-HU"/>
+              <a:t>Második szint</a:t>
+            </a:r>
+          </a:p>
+          <a:p>
+            <a:pPr lvl="2"/>
+            <a:r>
+              <a:rPr lang="hu-HU"/>
+              <a:t>Harmadik szint</a:t>
+            </a:r>
+          </a:p>
+          <a:p>
+            <a:pPr lvl="3"/>
+            <a:r>
+              <a:rPr lang="hu-HU"/>
+              <a:t>Negyedik szint</a:t>
+            </a:r>
+          </a:p>
+          <a:p>
+            <a:pPr lvl="4"/>
+            <a:r>
+              <a:rPr lang="hu-HU"/>
+              <a:t>Ötödik szint</a:t>
+            </a:r>
+            <a:endParaRPr lang="en-GB"/>
+          </a:p>
+        </p:txBody>
+      </p:sp>
+      <p:sp>
+        <p:nvSpPr>
+          <p:cNvPr id="6" name="Élőláb helye 5"/>
+          <p:cNvSpPr>
+            <a:spLocks noGrp="1"/>
+          </p:cNvSpPr>
+          <p:nvPr>
+            <p:ph type="ftr" sz="quarter" idx="4"/>
+          </p:nvPr>
+        </p:nvSpPr>
+        <p:spPr>
+          <a:xfrm>
+            <a:off x="0" y="8685213"/>
+            <a:ext cx="2971800" cy="458787"/>
+          </a:xfrm>
+          <a:prstGeom prst="rect">
+            <a:avLst/>
+          </a:prstGeom>
+        </p:spPr>
+        <p:txBody>
+          <a:bodyPr vert="horz" lIns="91440" tIns="45720" rIns="91440" bIns="45720" rtlCol="0" anchor="b"/>
+          <a:lstStyle>
+            <a:lvl1pPr algn="l">
+              <a:defRPr sz="1200"/>
+            </a:lvl1pPr>
+          </a:lstStyle>
+          <a:p>
+            <a:endParaRPr lang="en-GB"/>
+          </a:p>
+        </p:txBody>
+      </p:sp>
+      <p:sp>
+        <p:nvSpPr>
+          <p:cNvPr id="7" name="Dia számának helye 6"/>
+          <p:cNvSpPr>
+            <a:spLocks noGrp="1"/>
+          </p:cNvSpPr>
+          <p:nvPr>
+            <p:ph type="sldNum" sz="quarter" idx="5"/>
+          </p:nvPr>
+        </p:nvSpPr>
+        <p:spPr>
+          <a:xfrm>
+            <a:off x="3884613" y="8685213"/>
+            <a:ext cx="2971800" cy="458787"/>
+          </a:xfrm>
+          <a:prstGeom prst="rect">
+            <a:avLst/>
+          </a:prstGeom>
+        </p:spPr>
+        <p:txBody>
+          <a:bodyPr vert="horz" lIns="91440" tIns="45720" rIns="91440" bIns="45720" rtlCol="0" anchor="b"/>
+          <a:lstStyle>
+            <a:lvl1pPr algn="r">
+              <a:defRPr sz="1200"/>
+            </a:lvl1pPr>
+          </a:lstStyle>
+          <a:p>
+            <a:fld id="{6CEA5896-0C53-49B5-9F02-CE99D7150E5E}" type="slidenum">
+              <a:rPr lang="en-GB" smtClean="0"/>
+              <a:t>‹#›</a:t>
+            </a:fld>
+            <a:endParaRPr lang="en-GB"/>
+          </a:p>
+        </p:txBody>
+      </p:sp>
+    </p:spTree>
+    <p:extLst>
+      <p:ext uri="{BB962C8B-B14F-4D97-AF65-F5344CB8AC3E}">
+        <p14:creationId xmlns:p14="http://schemas.microsoft.com/office/powerpoint/2010/main" val="794875187"/>
+      </p:ext>
+    </p:extLst>
+  </p:cSld>
+  <p:clrMap bg1="lt1" tx1="dk1" bg2="lt2" tx2="dk2" accent1="accent1" accent2="accent2" accent3="accent3" accent4="accent4" accent5="accent5" accent6="accent6" hlink="hlink" folHlink="folHlink"/>
+  <p:notesStyle>
+    <a:lvl1pPr marL="0" algn="l" defTabSz="914400" rtl="0" eaLnBrk="1" latinLnBrk="0" hangingPunct="1">
+      <a:defRPr sz="1200" kern="1200">
+        <a:solidFill>
+          <a:schemeClr val="tx1"/>
+        </a:solidFill>
+        <a:latin typeface="+mn-lt"/>
+        <a:ea typeface="+mn-ea"/>
+        <a:cs typeface="+mn-cs"/>
+      </a:defRPr>
+    </a:lvl1pPr>
+    <a:lvl2pPr marL="457200" algn="l" defTabSz="914400" rtl="0" eaLnBrk="1" latinLnBrk="0" hangingPunct="1">
+      <a:defRPr sz="1200" kern="1200">
+        <a:solidFill>
+          <a:schemeClr val="tx1"/>
+        </a:solidFill>
+        <a:latin typeface="+mn-lt"/>
+        <a:ea typeface="+mn-ea"/>
+        <a:cs typeface="+mn-cs"/>
+      </a:defRPr>
+    </a:lvl2pPr>
+    <a:lvl3pPr marL="914400" algn="l" defTabSz="914400" rtl="0" eaLnBrk="1" latinLnBrk="0" hangingPunct="1">
+      <a:defRPr sz="1200" kern="1200">
+        <a:solidFill>
+          <a:schemeClr val="tx1"/>
+        </a:solidFill>
+        <a:latin typeface="+mn-lt"/>
+        <a:ea typeface="+mn-ea"/>
+        <a:cs typeface="+mn-cs"/>
+      </a:defRPr>
+    </a:lvl3pPr>
+    <a:lvl4pPr marL="1371600" algn="l" defTabSz="914400" rtl="0" eaLnBrk="1" latinLnBrk="0" hangingPunct="1">
+      <a:defRPr sz="1200" kern="1200">
+        <a:solidFill>
+          <a:schemeClr val="tx1"/>
+        </a:solidFill>
+        <a:latin typeface="+mn-lt"/>
+        <a:ea typeface="+mn-ea"/>
+        <a:cs typeface="+mn-cs"/>
+      </a:defRPr>
+    </a:lvl4pPr>
+    <a:lvl5pPr marL="1828800" algn="l" defTabSz="914400" rtl="0" eaLnBrk="1" latinLnBrk="0" hangingPunct="1">
+      <a:defRPr sz="1200" kern="1200">
+        <a:solidFill>
+          <a:schemeClr val="tx1"/>
+        </a:solidFill>
+        <a:latin typeface="+mn-lt"/>
+        <a:ea typeface="+mn-ea"/>
+        <a:cs typeface="+mn-cs"/>
+      </a:defRPr>
+    </a:lvl5pPr>
+    <a:lvl6pPr marL="2286000" algn="l" defTabSz="914400" rtl="0" eaLnBrk="1" latinLnBrk="0" hangingPunct="1">
+      <a:defRPr sz="1200" kern="1200">
+        <a:solidFill>
+          <a:schemeClr val="tx1"/>
+        </a:solidFill>
+        <a:latin typeface="+mn-lt"/>
+        <a:ea typeface="+mn-ea"/>
+        <a:cs typeface="+mn-cs"/>
+      </a:defRPr>
+    </a:lvl6pPr>
+    <a:lvl7pPr marL="2743200" algn="l" defTabSz="914400" rtl="0" eaLnBrk="1" latinLnBrk="0" hangingPunct="1">
+      <a:defRPr sz="1200" kern="1200">
+        <a:solidFill>
+          <a:schemeClr val="tx1"/>
+        </a:solidFill>
+        <a:latin typeface="+mn-lt"/>
+        <a:ea typeface="+mn-ea"/>
+        <a:cs typeface="+mn-cs"/>
+      </a:defRPr>
+    </a:lvl7pPr>
+    <a:lvl8pPr marL="3200400" algn="l" defTabSz="914400" rtl="0" eaLnBrk="1" latinLnBrk="0" hangingPunct="1">
+      <a:defRPr sz="1200" kern="1200">
+        <a:solidFill>
+          <a:schemeClr val="tx1"/>
+        </a:solidFill>
+        <a:latin typeface="+mn-lt"/>
+        <a:ea typeface="+mn-ea"/>
+        <a:cs typeface="+mn-cs"/>
+      </a:defRPr>
+    </a:lvl8pPr>
+    <a:lvl9pPr marL="3657600" algn="l" defTabSz="914400" rtl="0" eaLnBrk="1" latinLnBrk="0" hangingPunct="1">
+      <a:defRPr sz="1200" kern="1200">
+        <a:solidFill>
+          <a:schemeClr val="tx1"/>
+        </a:solidFill>
+        <a:latin typeface="+mn-lt"/>
+        <a:ea typeface="+mn-ea"/>
+        <a:cs typeface="+mn-cs"/>
+      </a:defRPr>
+    </a:lvl9pPr>
+  </p:notesStyle>
+</p:notesMaster>
 </file>
 
 <file path=ppt/slideLayouts/slideLayout1.xml><?xml version="1.0" encoding="utf-8"?>
@@ -2809,10 +3168,10 @@
           <a:lstStyle/>
           <a:p>
             <a:r>
-              <a:rPr lang="hu-HU"/>
+              <a:rPr lang="hu-HU" dirty="0"/>
               <a:t>Mintacím szerkesztése</a:t>
             </a:r>
-            <a:endParaRPr lang="en-GB"/>
+            <a:endParaRPr lang="en-GB" dirty="0"/>
           </a:p>
         </p:txBody>
       </p:sp>
@@ -3017,6 +3376,67 @@
               <a:rPr lang="en-GB" smtClean="0"/>
               <a:t>‹#›</a:t>
             </a:fld>
+            <a:endParaRPr lang="en-GB"/>
+          </a:p>
+        </p:txBody>
+      </p:sp>
+      <p:sp>
+        <p:nvSpPr>
+          <p:cNvPr id="7" name="Téglalap 6">
+            <a:extLst>
+              <a:ext uri="{FF2B5EF4-FFF2-40B4-BE49-F238E27FC236}">
+                <a16:creationId xmlns:a16="http://schemas.microsoft.com/office/drawing/2014/main" id="{4F891FDD-D95F-41B3-ACB8-63F97CC252B0}"/>
+              </a:ext>
+            </a:extLst>
+          </p:cNvPr>
+          <p:cNvSpPr/>
+          <p:nvPr userDrawn="1"/>
+        </p:nvSpPr>
+        <p:spPr>
+          <a:xfrm>
+            <a:off x="30000" y="18000"/>
+            <a:ext cx="12132000" cy="6840000"/>
+          </a:xfrm>
+          <a:prstGeom prst="rect">
+            <a:avLst/>
+          </a:prstGeom>
+          <a:noFill/>
+          <a:ln w="76200">
+            <a:solidFill>
+              <a:schemeClr val="bg2">
+                <a:lumMod val="10000"/>
+              </a:schemeClr>
+            </a:solidFill>
+          </a:ln>
+          <a:effectLst>
+            <a:outerShdw blurRad="63500" sx="99000" sy="99000" algn="ctr" rotWithShape="0">
+              <a:prstClr val="black">
+                <a:alpha val="40000"/>
+              </a:prstClr>
+            </a:outerShdw>
+          </a:effectLst>
+        </p:spPr>
+        <p:style>
+          <a:lnRef idx="2">
+            <a:schemeClr val="accent1">
+              <a:shade val="50000"/>
+            </a:schemeClr>
+          </a:lnRef>
+          <a:fillRef idx="1">
+            <a:schemeClr val="accent1"/>
+          </a:fillRef>
+          <a:effectRef idx="0">
+            <a:schemeClr val="accent1"/>
+          </a:effectRef>
+          <a:fontRef idx="minor">
+            <a:schemeClr val="lt1"/>
+          </a:fontRef>
+        </p:style>
+        <p:txBody>
+          <a:bodyPr rtlCol="0" anchor="ctr"/>
+          <a:lstStyle/>
+          <a:p>
+            <a:pPr algn="ctr"/>
             <a:endParaRPr lang="en-GB"/>
           </a:p>
         </p:txBody>
@@ -3031,7 +3451,7 @@
   <p:clrMap bg1="lt1" tx1="dk1" bg2="lt2" tx2="dk2" accent1="accent1" accent2="accent2" accent3="accent3" accent4="accent4" accent5="accent5" accent6="accent6" hlink="hlink" folHlink="folHlink"/>
   <p:sldLayoutIdLst>
     <p:sldLayoutId id="2147483649" r:id="rId1"/>
-    <p:sldLayoutId id="2147483650" r:id="rId2"/>
+    <p:sldLayoutId id="2147483661" r:id="rId2"/>
     <p:sldLayoutId id="2147483651" r:id="rId3"/>
     <p:sldLayoutId id="2147483652" r:id="rId4"/>
     <p:sldLayoutId id="2147483653" r:id="rId5"/>
@@ -3360,42 +3780,1148 @@
         </p:nvSpPr>
         <p:spPr/>
         <p:txBody>
-          <a:bodyPr/>
+          <a:bodyPr>
+            <a:normAutofit/>
+          </a:bodyPr>
           <a:lstStyle/>
           <a:p>
             <a:pPr algn="ctr"/>
             <a:r>
-              <a:rPr lang="en-GB" b="1" dirty="0">
+              <a:rPr lang="en-GB" sz="6000" dirty="0">
+                <a:solidFill>
+                  <a:schemeClr val="tx1">
+                    <a:lumMod val="75000"/>
+                    <a:lumOff val="25000"/>
+                  </a:schemeClr>
+                </a:solidFill>
                 <a:latin typeface="Arial" panose="020B0604020202020204" pitchFamily="34" charset="0"/>
                 <a:cs typeface="Arial" panose="020B0604020202020204" pitchFamily="34" charset="0"/>
               </a:rPr>
               <a:t>Backend</a:t>
             </a:r>
-          </a:p>
-        </p:txBody>
-      </p:sp>
-      <p:sp>
-        <p:nvSpPr>
-          <p:cNvPr id="3" name="Tartalom helye 2">
-            <a:extLst>
-              <a:ext uri="{FF2B5EF4-FFF2-40B4-BE49-F238E27FC236}">
-                <a16:creationId xmlns:a16="http://schemas.microsoft.com/office/drawing/2014/main" id="{33B321FA-D1B1-482C-B701-CC87A3FD0DE5}"/>
-              </a:ext>
-            </a:extLst>
-          </p:cNvPr>
-          <p:cNvSpPr>
-            <a:spLocks noGrp="1"/>
-          </p:cNvSpPr>
-          <p:nvPr>
-            <p:ph idx="1"/>
-          </p:nvPr>
-        </p:nvSpPr>
-        <p:spPr/>
-        <p:txBody>
-          <a:bodyPr/>
-          <a:lstStyle/>
-          <a:p>
-            <a:endParaRPr lang="en-GB" dirty="0"/>
+            <a:endParaRPr lang="en-GB" sz="6000" b="1" dirty="0">
+              <a:latin typeface="Arial" panose="020B0604020202020204" pitchFamily="34" charset="0"/>
+              <a:cs typeface="Arial" panose="020B0604020202020204" pitchFamily="34" charset="0"/>
+            </a:endParaRPr>
+          </a:p>
+        </p:txBody>
+      </p:sp>
+      <p:sp>
+        <p:nvSpPr>
+          <p:cNvPr id="4" name="Rectangle 3">
+            <a:extLst>
+              <a:ext uri="{FF2B5EF4-FFF2-40B4-BE49-F238E27FC236}">
+                <a16:creationId xmlns:a16="http://schemas.microsoft.com/office/drawing/2014/main" id="{E78C9B8F-14E2-4006-969C-CF5971390AFA}"/>
+              </a:ext>
+            </a:extLst>
+          </p:cNvPr>
+          <p:cNvSpPr txBox="1">
+            <a:spLocks noChangeArrowheads="1"/>
+          </p:cNvSpPr>
+          <p:nvPr/>
+        </p:nvSpPr>
+        <p:spPr>
+          <a:xfrm>
+            <a:off x="1054100" y="1690687"/>
+            <a:ext cx="5041900" cy="4802187"/>
+          </a:xfrm>
+          <a:prstGeom prst="rect">
+            <a:avLst/>
+          </a:prstGeom>
+        </p:spPr>
+        <p:txBody>
+          <a:bodyPr vert="horz" lIns="91440" tIns="45720" rIns="91440" bIns="45720" rtlCol="0">
+            <a:normAutofit/>
+          </a:bodyPr>
+          <a:lstStyle>
+            <a:lvl1pPr marL="228600" indent="-228600" algn="l" defTabSz="914400" rtl="0" eaLnBrk="1" latinLnBrk="0" hangingPunct="1">
+              <a:lnSpc>
+                <a:spcPct val="90000"/>
+              </a:lnSpc>
+              <a:spcBef>
+                <a:spcPts val="1000"/>
+              </a:spcBef>
+              <a:buFont typeface="Arial" panose="020B0604020202020204" pitchFamily="34" charset="0"/>
+              <a:buChar char="•"/>
+              <a:defRPr sz="2800" kern="1200">
+                <a:solidFill>
+                  <a:schemeClr val="tx1"/>
+                </a:solidFill>
+                <a:latin typeface="+mn-lt"/>
+                <a:ea typeface="+mn-ea"/>
+                <a:cs typeface="+mn-cs"/>
+              </a:defRPr>
+            </a:lvl1pPr>
+            <a:lvl2pPr marL="685800" indent="-228600" algn="l" defTabSz="914400" rtl="0" eaLnBrk="1" latinLnBrk="0" hangingPunct="1">
+              <a:lnSpc>
+                <a:spcPct val="90000"/>
+              </a:lnSpc>
+              <a:spcBef>
+                <a:spcPts val="500"/>
+              </a:spcBef>
+              <a:buFont typeface="Arial" panose="020B0604020202020204" pitchFamily="34" charset="0"/>
+              <a:buChar char="•"/>
+              <a:defRPr sz="2400" kern="1200">
+                <a:solidFill>
+                  <a:schemeClr val="tx1"/>
+                </a:solidFill>
+                <a:latin typeface="+mn-lt"/>
+                <a:ea typeface="+mn-ea"/>
+                <a:cs typeface="+mn-cs"/>
+              </a:defRPr>
+            </a:lvl2pPr>
+            <a:lvl3pPr marL="1143000" indent="-228600" algn="l" defTabSz="914400" rtl="0" eaLnBrk="1" latinLnBrk="0" hangingPunct="1">
+              <a:lnSpc>
+                <a:spcPct val="90000"/>
+              </a:lnSpc>
+              <a:spcBef>
+                <a:spcPts val="500"/>
+              </a:spcBef>
+              <a:buFont typeface="Arial" panose="020B0604020202020204" pitchFamily="34" charset="0"/>
+              <a:buChar char="•"/>
+              <a:defRPr sz="2000" kern="1200">
+                <a:solidFill>
+                  <a:schemeClr val="tx1"/>
+                </a:solidFill>
+                <a:latin typeface="+mn-lt"/>
+                <a:ea typeface="+mn-ea"/>
+                <a:cs typeface="+mn-cs"/>
+              </a:defRPr>
+            </a:lvl3pPr>
+            <a:lvl4pPr marL="1600200" indent="-228600" algn="l" defTabSz="914400" rtl="0" eaLnBrk="1" latinLnBrk="0" hangingPunct="1">
+              <a:lnSpc>
+                <a:spcPct val="90000"/>
+              </a:lnSpc>
+              <a:spcBef>
+                <a:spcPts val="500"/>
+              </a:spcBef>
+              <a:buFont typeface="Arial" panose="020B0604020202020204" pitchFamily="34" charset="0"/>
+              <a:buChar char="•"/>
+              <a:defRPr sz="1800" kern="1200">
+                <a:solidFill>
+                  <a:schemeClr val="tx1"/>
+                </a:solidFill>
+                <a:latin typeface="+mn-lt"/>
+                <a:ea typeface="+mn-ea"/>
+                <a:cs typeface="+mn-cs"/>
+              </a:defRPr>
+            </a:lvl4pPr>
+            <a:lvl5pPr marL="2057400" indent="-228600" algn="l" defTabSz="914400" rtl="0" eaLnBrk="1" latinLnBrk="0" hangingPunct="1">
+              <a:lnSpc>
+                <a:spcPct val="90000"/>
+              </a:lnSpc>
+              <a:spcBef>
+                <a:spcPts val="500"/>
+              </a:spcBef>
+              <a:buFont typeface="Arial" panose="020B0604020202020204" pitchFamily="34" charset="0"/>
+              <a:buChar char="•"/>
+              <a:defRPr sz="1800" kern="1200">
+                <a:solidFill>
+                  <a:schemeClr val="tx1"/>
+                </a:solidFill>
+                <a:latin typeface="+mn-lt"/>
+                <a:ea typeface="+mn-ea"/>
+                <a:cs typeface="+mn-cs"/>
+              </a:defRPr>
+            </a:lvl5pPr>
+            <a:lvl6pPr marL="2514600" indent="-228600" algn="l" defTabSz="914400" rtl="0" eaLnBrk="1" latinLnBrk="0" hangingPunct="1">
+              <a:lnSpc>
+                <a:spcPct val="90000"/>
+              </a:lnSpc>
+              <a:spcBef>
+                <a:spcPts val="500"/>
+              </a:spcBef>
+              <a:buFont typeface="Arial" panose="020B0604020202020204" pitchFamily="34" charset="0"/>
+              <a:buChar char="•"/>
+              <a:defRPr sz="1800" kern="1200">
+                <a:solidFill>
+                  <a:schemeClr val="tx1"/>
+                </a:solidFill>
+                <a:latin typeface="+mn-lt"/>
+                <a:ea typeface="+mn-ea"/>
+                <a:cs typeface="+mn-cs"/>
+              </a:defRPr>
+            </a:lvl6pPr>
+            <a:lvl7pPr marL="2971800" indent="-228600" algn="l" defTabSz="914400" rtl="0" eaLnBrk="1" latinLnBrk="0" hangingPunct="1">
+              <a:lnSpc>
+                <a:spcPct val="90000"/>
+              </a:lnSpc>
+              <a:spcBef>
+                <a:spcPts val="500"/>
+              </a:spcBef>
+              <a:buFont typeface="Arial" panose="020B0604020202020204" pitchFamily="34" charset="0"/>
+              <a:buChar char="•"/>
+              <a:defRPr sz="1800" kern="1200">
+                <a:solidFill>
+                  <a:schemeClr val="tx1"/>
+                </a:solidFill>
+                <a:latin typeface="+mn-lt"/>
+                <a:ea typeface="+mn-ea"/>
+                <a:cs typeface="+mn-cs"/>
+              </a:defRPr>
+            </a:lvl7pPr>
+            <a:lvl8pPr marL="3429000" indent="-228600" algn="l" defTabSz="914400" rtl="0" eaLnBrk="1" latinLnBrk="0" hangingPunct="1">
+              <a:lnSpc>
+                <a:spcPct val="90000"/>
+              </a:lnSpc>
+              <a:spcBef>
+                <a:spcPts val="500"/>
+              </a:spcBef>
+              <a:buFont typeface="Arial" panose="020B0604020202020204" pitchFamily="34" charset="0"/>
+              <a:buChar char="•"/>
+              <a:defRPr sz="1800" kern="1200">
+                <a:solidFill>
+                  <a:schemeClr val="tx1"/>
+                </a:solidFill>
+                <a:latin typeface="+mn-lt"/>
+                <a:ea typeface="+mn-ea"/>
+                <a:cs typeface="+mn-cs"/>
+              </a:defRPr>
+            </a:lvl8pPr>
+            <a:lvl9pPr marL="3886200" indent="-228600" algn="l" defTabSz="914400" rtl="0" eaLnBrk="1" latinLnBrk="0" hangingPunct="1">
+              <a:lnSpc>
+                <a:spcPct val="90000"/>
+              </a:lnSpc>
+              <a:spcBef>
+                <a:spcPts val="500"/>
+              </a:spcBef>
+              <a:buFont typeface="Arial" panose="020B0604020202020204" pitchFamily="34" charset="0"/>
+              <a:buChar char="•"/>
+              <a:defRPr sz="1800" kern="1200">
+                <a:solidFill>
+                  <a:schemeClr val="tx1"/>
+                </a:solidFill>
+                <a:latin typeface="+mn-lt"/>
+                <a:ea typeface="+mn-ea"/>
+                <a:cs typeface="+mn-cs"/>
+              </a:defRPr>
+            </a:lvl9pPr>
+          </a:lstStyle>
+          <a:p>
+            <a:pPr marL="0" indent="0" algn="ctr">
+              <a:buNone/>
+              <a:defRPr/>
+            </a:pPr>
+            <a:r>
+              <a:rPr lang="en-GB" sz="2000" b="1" dirty="0">
+                <a:solidFill>
+                  <a:schemeClr val="tx1">
+                    <a:lumMod val="75000"/>
+                    <a:lumOff val="25000"/>
+                  </a:schemeClr>
+                </a:solidFill>
+              </a:rPr>
+              <a:t>Backend showcase</a:t>
+            </a:r>
+            <a:endParaRPr lang="tr-TR" sz="2000" b="1" dirty="0">
+              <a:solidFill>
+                <a:schemeClr val="tx1">
+                  <a:lumMod val="75000"/>
+                  <a:lumOff val="25000"/>
+                </a:schemeClr>
+              </a:solidFill>
+            </a:endParaRPr>
+          </a:p>
+          <a:p>
+            <a:pPr lvl="1">
+              <a:buFont typeface="Wingdings" pitchFamily="2" charset="2"/>
+              <a:buChar char="v"/>
+              <a:defRPr/>
+            </a:pPr>
+            <a:r>
+              <a:rPr lang="en-GB" sz="1800" dirty="0">
+                <a:solidFill>
+                  <a:schemeClr val="tx1">
+                    <a:lumMod val="75000"/>
+                    <a:lumOff val="25000"/>
+                  </a:schemeClr>
+                </a:solidFill>
+                <a:latin typeface="Arial" panose="020B0604020202020204" pitchFamily="34" charset="0"/>
+                <a:cs typeface="Arial" panose="020B0604020202020204" pitchFamily="34" charset="0"/>
+              </a:rPr>
+              <a:t>Introduction</a:t>
+            </a:r>
+            <a:r>
+              <a:rPr lang="tr-TR" sz="1800" dirty="0">
+                <a:solidFill>
+                  <a:schemeClr val="tx1">
+                    <a:lumMod val="75000"/>
+                    <a:lumOff val="25000"/>
+                  </a:schemeClr>
+                </a:solidFill>
+                <a:latin typeface="Arial" panose="020B0604020202020204" pitchFamily="34" charset="0"/>
+                <a:cs typeface="Arial" panose="020B0604020202020204" pitchFamily="34" charset="0"/>
+              </a:rPr>
+              <a:t> </a:t>
+            </a:r>
+          </a:p>
+          <a:p>
+            <a:pPr lvl="1">
+              <a:buFont typeface="Wingdings" pitchFamily="2" charset="2"/>
+              <a:buChar char="v"/>
+              <a:defRPr/>
+            </a:pPr>
+            <a:r>
+              <a:rPr lang="en-GB" sz="1800" dirty="0">
+                <a:solidFill>
+                  <a:schemeClr val="tx1">
+                    <a:lumMod val="75000"/>
+                    <a:lumOff val="25000"/>
+                  </a:schemeClr>
+                </a:solidFill>
+                <a:latin typeface="Arial" panose="020B0604020202020204" pitchFamily="34" charset="0"/>
+                <a:cs typeface="Arial" panose="020B0604020202020204" pitchFamily="34" charset="0"/>
+              </a:rPr>
+              <a:t>Starter file (app.js)</a:t>
+            </a:r>
+            <a:endParaRPr lang="tr-TR" sz="1800" dirty="0">
+              <a:solidFill>
+                <a:schemeClr val="tx1">
+                  <a:lumMod val="75000"/>
+                  <a:lumOff val="25000"/>
+                </a:schemeClr>
+              </a:solidFill>
+              <a:latin typeface="Arial" panose="020B0604020202020204" pitchFamily="34" charset="0"/>
+              <a:cs typeface="Arial" panose="020B0604020202020204" pitchFamily="34" charset="0"/>
+            </a:endParaRPr>
+          </a:p>
+          <a:p>
+            <a:pPr lvl="1">
+              <a:buFont typeface="Wingdings" pitchFamily="2" charset="2"/>
+              <a:buChar char="v"/>
+              <a:defRPr/>
+            </a:pPr>
+            <a:r>
+              <a:rPr lang="en-GB" sz="1800" dirty="0">
+                <a:solidFill>
+                  <a:schemeClr val="tx1">
+                    <a:lumMod val="75000"/>
+                    <a:lumOff val="25000"/>
+                  </a:schemeClr>
+                </a:solidFill>
+                <a:latin typeface="Arial" panose="020B0604020202020204" pitchFamily="34" charset="0"/>
+                <a:cs typeface="Arial" panose="020B0604020202020204" pitchFamily="34" charset="0"/>
+              </a:rPr>
+              <a:t>Register &amp; Verify Account</a:t>
+            </a:r>
+          </a:p>
+          <a:p>
+            <a:pPr lvl="1">
+              <a:buFont typeface="Wingdings" pitchFamily="2" charset="2"/>
+              <a:buChar char="v"/>
+              <a:defRPr/>
+            </a:pPr>
+            <a:r>
+              <a:rPr lang="en-GB" sz="1800" dirty="0">
+                <a:solidFill>
+                  <a:schemeClr val="tx1">
+                    <a:lumMod val="75000"/>
+                    <a:lumOff val="25000"/>
+                  </a:schemeClr>
+                </a:solidFill>
+                <a:latin typeface="Arial" panose="020B0604020202020204" pitchFamily="34" charset="0"/>
+                <a:cs typeface="Arial" panose="020B0604020202020204" pitchFamily="34" charset="0"/>
+              </a:rPr>
+              <a:t>Login &amp; Authentication</a:t>
+            </a:r>
+          </a:p>
+          <a:p>
+            <a:pPr lvl="1">
+              <a:buFont typeface="Wingdings" pitchFamily="2" charset="2"/>
+              <a:buChar char="v"/>
+              <a:defRPr/>
+            </a:pPr>
+            <a:r>
+              <a:rPr lang="en-GB" sz="1800" dirty="0">
+                <a:solidFill>
+                  <a:schemeClr val="tx1">
+                    <a:lumMod val="75000"/>
+                    <a:lumOff val="25000"/>
+                  </a:schemeClr>
+                </a:solidFill>
+                <a:latin typeface="Arial" panose="020B0604020202020204" pitchFamily="34" charset="0"/>
+                <a:cs typeface="Arial" panose="020B0604020202020204" pitchFamily="34" charset="0"/>
+              </a:rPr>
+              <a:t>Password Request &amp; Change</a:t>
+            </a:r>
+          </a:p>
+          <a:p>
+            <a:pPr lvl="1">
+              <a:buFont typeface="Wingdings" pitchFamily="2" charset="2"/>
+              <a:buChar char="v"/>
+              <a:defRPr/>
+            </a:pPr>
+            <a:r>
+              <a:rPr lang="en-GB" sz="1800" dirty="0">
+                <a:solidFill>
+                  <a:schemeClr val="tx1">
+                    <a:lumMod val="75000"/>
+                    <a:lumOff val="25000"/>
+                  </a:schemeClr>
+                </a:solidFill>
+                <a:latin typeface="Arial" panose="020B0604020202020204" pitchFamily="34" charset="0"/>
+                <a:cs typeface="Arial" panose="020B0604020202020204" pitchFamily="34" charset="0"/>
+              </a:rPr>
+              <a:t>Product Schema</a:t>
+            </a:r>
+          </a:p>
+          <a:p>
+            <a:pPr lvl="1">
+              <a:buFont typeface="Wingdings" pitchFamily="2" charset="2"/>
+              <a:buChar char="v"/>
+              <a:defRPr/>
+            </a:pPr>
+            <a:r>
+              <a:rPr lang="en-GB" sz="1800" dirty="0">
+                <a:solidFill>
+                  <a:schemeClr val="tx1">
+                    <a:lumMod val="75000"/>
+                    <a:lumOff val="25000"/>
+                  </a:schemeClr>
+                </a:solidFill>
+                <a:latin typeface="Arial" panose="020B0604020202020204" pitchFamily="34" charset="0"/>
+                <a:cs typeface="Arial" panose="020B0604020202020204" pitchFamily="34" charset="0"/>
+              </a:rPr>
+              <a:t>WishList</a:t>
+            </a:r>
+          </a:p>
+          <a:p>
+            <a:pPr lvl="1">
+              <a:buFont typeface="Wingdings" pitchFamily="2" charset="2"/>
+              <a:buChar char="v"/>
+              <a:defRPr/>
+            </a:pPr>
+            <a:r>
+              <a:rPr lang="en-GB" sz="1800" dirty="0">
+                <a:solidFill>
+                  <a:schemeClr val="tx1">
+                    <a:lumMod val="75000"/>
+                    <a:lumOff val="25000"/>
+                  </a:schemeClr>
+                </a:solidFill>
+                <a:latin typeface="Arial" panose="020B0604020202020204" pitchFamily="34" charset="0"/>
+                <a:cs typeface="Arial" panose="020B0604020202020204" pitchFamily="34" charset="0"/>
+              </a:rPr>
+              <a:t>Orders</a:t>
+            </a:r>
+          </a:p>
+          <a:p>
+            <a:pPr lvl="1">
+              <a:buFont typeface="Wingdings" pitchFamily="2" charset="2"/>
+              <a:buChar char="v"/>
+              <a:defRPr/>
+            </a:pPr>
+            <a:r>
+              <a:rPr lang="en-GB" sz="1800" dirty="0">
+                <a:solidFill>
+                  <a:schemeClr val="tx1">
+                    <a:lumMod val="75000"/>
+                    <a:lumOff val="25000"/>
+                  </a:schemeClr>
+                </a:solidFill>
+                <a:latin typeface="Arial" panose="020B0604020202020204" pitchFamily="34" charset="0"/>
+                <a:cs typeface="Arial" panose="020B0604020202020204" pitchFamily="34" charset="0"/>
+              </a:rPr>
+              <a:t>Reviews</a:t>
+            </a:r>
+          </a:p>
+          <a:p>
+            <a:pPr lvl="1">
+              <a:buFont typeface="Wingdings" pitchFamily="2" charset="2"/>
+              <a:buChar char="v"/>
+              <a:defRPr/>
+            </a:pPr>
+            <a:r>
+              <a:rPr lang="en-GB" sz="1800" dirty="0">
+                <a:solidFill>
+                  <a:schemeClr val="tx1">
+                    <a:lumMod val="75000"/>
+                    <a:lumOff val="25000"/>
+                  </a:schemeClr>
+                </a:solidFill>
+                <a:latin typeface="Arial" panose="020B0604020202020204" pitchFamily="34" charset="0"/>
+                <a:cs typeface="Arial" panose="020B0604020202020204" pitchFamily="34" charset="0"/>
+              </a:rPr>
+              <a:t>Admin</a:t>
+            </a:r>
+          </a:p>
+          <a:p>
+            <a:pPr lvl="2">
+              <a:buFont typeface="Wingdings" pitchFamily="2" charset="2"/>
+              <a:buChar char="v"/>
+              <a:defRPr/>
+            </a:pPr>
+            <a:r>
+              <a:rPr lang="en-GB" sz="1400" dirty="0">
+                <a:solidFill>
+                  <a:schemeClr val="tx1">
+                    <a:lumMod val="75000"/>
+                    <a:lumOff val="25000"/>
+                  </a:schemeClr>
+                </a:solidFill>
+                <a:latin typeface="Arial" panose="020B0604020202020204" pitchFamily="34" charset="0"/>
+                <a:cs typeface="Arial" panose="020B0604020202020204" pitchFamily="34" charset="0"/>
+              </a:rPr>
+              <a:t>Basic information</a:t>
+            </a:r>
+          </a:p>
+          <a:p>
+            <a:pPr lvl="2">
+              <a:buFont typeface="Wingdings" pitchFamily="2" charset="2"/>
+              <a:buChar char="v"/>
+              <a:defRPr/>
+            </a:pPr>
+            <a:r>
+              <a:rPr lang="en-GB" sz="1400" dirty="0">
+                <a:solidFill>
+                  <a:schemeClr val="tx1">
+                    <a:lumMod val="75000"/>
+                    <a:lumOff val="25000"/>
+                  </a:schemeClr>
+                </a:solidFill>
+                <a:latin typeface="Arial" panose="020B0604020202020204" pitchFamily="34" charset="0"/>
+                <a:cs typeface="Arial" panose="020B0604020202020204" pitchFamily="34" charset="0"/>
+              </a:rPr>
+              <a:t>Adding a new product</a:t>
+            </a:r>
+          </a:p>
+          <a:p>
+            <a:pPr lvl="2">
+              <a:buFont typeface="Wingdings" pitchFamily="2" charset="2"/>
+              <a:buChar char="v"/>
+              <a:defRPr/>
+            </a:pPr>
+            <a:r>
+              <a:rPr lang="en-GB" sz="1400" dirty="0">
+                <a:solidFill>
+                  <a:schemeClr val="tx1">
+                    <a:lumMod val="75000"/>
+                    <a:lumOff val="25000"/>
+                  </a:schemeClr>
+                </a:solidFill>
+                <a:latin typeface="Arial" panose="020B0604020202020204" pitchFamily="34" charset="0"/>
+                <a:cs typeface="Arial" panose="020B0604020202020204" pitchFamily="34" charset="0"/>
+              </a:rPr>
+              <a:t>Modifying a product</a:t>
+            </a:r>
+          </a:p>
+          <a:p>
+            <a:pPr lvl="2">
+              <a:buFont typeface="Wingdings" pitchFamily="2" charset="2"/>
+              <a:buChar char="v"/>
+              <a:defRPr/>
+            </a:pPr>
+            <a:r>
+              <a:rPr lang="en-GB" sz="1400" dirty="0">
+                <a:solidFill>
+                  <a:schemeClr val="tx1">
+                    <a:lumMod val="75000"/>
+                    <a:lumOff val="25000"/>
+                  </a:schemeClr>
+                </a:solidFill>
+                <a:latin typeface="Arial" panose="020B0604020202020204" pitchFamily="34" charset="0"/>
+                <a:cs typeface="Arial" panose="020B0604020202020204" pitchFamily="34" charset="0"/>
+              </a:rPr>
+              <a:t>Deleting a product</a:t>
+            </a:r>
+          </a:p>
+          <a:p>
+            <a:pPr lvl="1">
+              <a:buFont typeface="Wingdings" pitchFamily="2" charset="2"/>
+              <a:buChar char="v"/>
+              <a:defRPr/>
+            </a:pPr>
+            <a:r>
+              <a:rPr lang="en-GB" sz="1800" dirty="0">
+                <a:solidFill>
+                  <a:schemeClr val="tx1">
+                    <a:lumMod val="75000"/>
+                    <a:lumOff val="25000"/>
+                  </a:schemeClr>
+                </a:solidFill>
+                <a:latin typeface="Arial" panose="020B0604020202020204" pitchFamily="34" charset="0"/>
+                <a:cs typeface="Arial" panose="020B0604020202020204" pitchFamily="34" charset="0"/>
+              </a:rPr>
+              <a:t>Summary</a:t>
+            </a:r>
+          </a:p>
+          <a:p>
+            <a:pPr lvl="1">
+              <a:buFont typeface="Wingdings" pitchFamily="2" charset="2"/>
+              <a:buChar char="v"/>
+              <a:defRPr/>
+            </a:pPr>
+            <a:endParaRPr lang="en-GB" sz="1600" dirty="0">
+              <a:solidFill>
+                <a:schemeClr val="tx1">
+                  <a:lumMod val="75000"/>
+                  <a:lumOff val="25000"/>
+                </a:schemeClr>
+              </a:solidFill>
+            </a:endParaRPr>
+          </a:p>
+          <a:p>
+            <a:pPr lvl="1">
+              <a:buFont typeface="Wingdings" pitchFamily="2" charset="2"/>
+              <a:buChar char="v"/>
+              <a:defRPr/>
+            </a:pPr>
+            <a:endParaRPr lang="tr-TR" sz="1600" dirty="0">
+              <a:solidFill>
+                <a:schemeClr val="tx1">
+                  <a:lumMod val="75000"/>
+                  <a:lumOff val="25000"/>
+                </a:schemeClr>
+              </a:solidFill>
+            </a:endParaRPr>
+          </a:p>
+        </p:txBody>
+      </p:sp>
+      <p:sp>
+        <p:nvSpPr>
+          <p:cNvPr id="5" name="Rectangle 3">
+            <a:extLst>
+              <a:ext uri="{FF2B5EF4-FFF2-40B4-BE49-F238E27FC236}">
+                <a16:creationId xmlns:a16="http://schemas.microsoft.com/office/drawing/2014/main" id="{DE5C6F52-0877-42A0-961F-BBB8D173419E}"/>
+              </a:ext>
+            </a:extLst>
+          </p:cNvPr>
+          <p:cNvSpPr txBox="1">
+            <a:spLocks noChangeArrowheads="1"/>
+          </p:cNvSpPr>
+          <p:nvPr/>
+        </p:nvSpPr>
+        <p:spPr>
+          <a:xfrm>
+            <a:off x="6096000" y="1690687"/>
+            <a:ext cx="5041900" cy="4802187"/>
+          </a:xfrm>
+          <a:prstGeom prst="rect">
+            <a:avLst/>
+          </a:prstGeom>
+        </p:spPr>
+        <p:txBody>
+          <a:bodyPr vert="horz" lIns="91440" tIns="45720" rIns="91440" bIns="45720" rtlCol="0">
+            <a:normAutofit/>
+          </a:bodyPr>
+          <a:lstStyle>
+            <a:lvl1pPr marL="228600" indent="-228600" algn="l" defTabSz="914400" rtl="0" eaLnBrk="1" latinLnBrk="0" hangingPunct="1">
+              <a:lnSpc>
+                <a:spcPct val="90000"/>
+              </a:lnSpc>
+              <a:spcBef>
+                <a:spcPts val="1000"/>
+              </a:spcBef>
+              <a:buFont typeface="Arial" panose="020B0604020202020204" pitchFamily="34" charset="0"/>
+              <a:buChar char="•"/>
+              <a:defRPr sz="2800" kern="1200">
+                <a:solidFill>
+                  <a:schemeClr val="tx1"/>
+                </a:solidFill>
+                <a:latin typeface="+mn-lt"/>
+                <a:ea typeface="+mn-ea"/>
+                <a:cs typeface="+mn-cs"/>
+              </a:defRPr>
+            </a:lvl1pPr>
+            <a:lvl2pPr marL="685800" indent="-228600" algn="l" defTabSz="914400" rtl="0" eaLnBrk="1" latinLnBrk="0" hangingPunct="1">
+              <a:lnSpc>
+                <a:spcPct val="90000"/>
+              </a:lnSpc>
+              <a:spcBef>
+                <a:spcPts val="500"/>
+              </a:spcBef>
+              <a:buFont typeface="Arial" panose="020B0604020202020204" pitchFamily="34" charset="0"/>
+              <a:buChar char="•"/>
+              <a:defRPr sz="2400" kern="1200">
+                <a:solidFill>
+                  <a:schemeClr val="tx1"/>
+                </a:solidFill>
+                <a:latin typeface="+mn-lt"/>
+                <a:ea typeface="+mn-ea"/>
+                <a:cs typeface="+mn-cs"/>
+              </a:defRPr>
+            </a:lvl2pPr>
+            <a:lvl3pPr marL="1143000" indent="-228600" algn="l" defTabSz="914400" rtl="0" eaLnBrk="1" latinLnBrk="0" hangingPunct="1">
+              <a:lnSpc>
+                <a:spcPct val="90000"/>
+              </a:lnSpc>
+              <a:spcBef>
+                <a:spcPts val="500"/>
+              </a:spcBef>
+              <a:buFont typeface="Arial" panose="020B0604020202020204" pitchFamily="34" charset="0"/>
+              <a:buChar char="•"/>
+              <a:defRPr sz="2000" kern="1200">
+                <a:solidFill>
+                  <a:schemeClr val="tx1"/>
+                </a:solidFill>
+                <a:latin typeface="+mn-lt"/>
+                <a:ea typeface="+mn-ea"/>
+                <a:cs typeface="+mn-cs"/>
+              </a:defRPr>
+            </a:lvl3pPr>
+            <a:lvl4pPr marL="1600200" indent="-228600" algn="l" defTabSz="914400" rtl="0" eaLnBrk="1" latinLnBrk="0" hangingPunct="1">
+              <a:lnSpc>
+                <a:spcPct val="90000"/>
+              </a:lnSpc>
+              <a:spcBef>
+                <a:spcPts val="500"/>
+              </a:spcBef>
+              <a:buFont typeface="Arial" panose="020B0604020202020204" pitchFamily="34" charset="0"/>
+              <a:buChar char="•"/>
+              <a:defRPr sz="1800" kern="1200">
+                <a:solidFill>
+                  <a:schemeClr val="tx1"/>
+                </a:solidFill>
+                <a:latin typeface="+mn-lt"/>
+                <a:ea typeface="+mn-ea"/>
+                <a:cs typeface="+mn-cs"/>
+              </a:defRPr>
+            </a:lvl4pPr>
+            <a:lvl5pPr marL="2057400" indent="-228600" algn="l" defTabSz="914400" rtl="0" eaLnBrk="1" latinLnBrk="0" hangingPunct="1">
+              <a:lnSpc>
+                <a:spcPct val="90000"/>
+              </a:lnSpc>
+              <a:spcBef>
+                <a:spcPts val="500"/>
+              </a:spcBef>
+              <a:buFont typeface="Arial" panose="020B0604020202020204" pitchFamily="34" charset="0"/>
+              <a:buChar char="•"/>
+              <a:defRPr sz="1800" kern="1200">
+                <a:solidFill>
+                  <a:schemeClr val="tx1"/>
+                </a:solidFill>
+                <a:latin typeface="+mn-lt"/>
+                <a:ea typeface="+mn-ea"/>
+                <a:cs typeface="+mn-cs"/>
+              </a:defRPr>
+            </a:lvl5pPr>
+            <a:lvl6pPr marL="2514600" indent="-228600" algn="l" defTabSz="914400" rtl="0" eaLnBrk="1" latinLnBrk="0" hangingPunct="1">
+              <a:lnSpc>
+                <a:spcPct val="90000"/>
+              </a:lnSpc>
+              <a:spcBef>
+                <a:spcPts val="500"/>
+              </a:spcBef>
+              <a:buFont typeface="Arial" panose="020B0604020202020204" pitchFamily="34" charset="0"/>
+              <a:buChar char="•"/>
+              <a:defRPr sz="1800" kern="1200">
+                <a:solidFill>
+                  <a:schemeClr val="tx1"/>
+                </a:solidFill>
+                <a:latin typeface="+mn-lt"/>
+                <a:ea typeface="+mn-ea"/>
+                <a:cs typeface="+mn-cs"/>
+              </a:defRPr>
+            </a:lvl6pPr>
+            <a:lvl7pPr marL="2971800" indent="-228600" algn="l" defTabSz="914400" rtl="0" eaLnBrk="1" latinLnBrk="0" hangingPunct="1">
+              <a:lnSpc>
+                <a:spcPct val="90000"/>
+              </a:lnSpc>
+              <a:spcBef>
+                <a:spcPts val="500"/>
+              </a:spcBef>
+              <a:buFont typeface="Arial" panose="020B0604020202020204" pitchFamily="34" charset="0"/>
+              <a:buChar char="•"/>
+              <a:defRPr sz="1800" kern="1200">
+                <a:solidFill>
+                  <a:schemeClr val="tx1"/>
+                </a:solidFill>
+                <a:latin typeface="+mn-lt"/>
+                <a:ea typeface="+mn-ea"/>
+                <a:cs typeface="+mn-cs"/>
+              </a:defRPr>
+            </a:lvl7pPr>
+            <a:lvl8pPr marL="3429000" indent="-228600" algn="l" defTabSz="914400" rtl="0" eaLnBrk="1" latinLnBrk="0" hangingPunct="1">
+              <a:lnSpc>
+                <a:spcPct val="90000"/>
+              </a:lnSpc>
+              <a:spcBef>
+                <a:spcPts val="500"/>
+              </a:spcBef>
+              <a:buFont typeface="Arial" panose="020B0604020202020204" pitchFamily="34" charset="0"/>
+              <a:buChar char="•"/>
+              <a:defRPr sz="1800" kern="1200">
+                <a:solidFill>
+                  <a:schemeClr val="tx1"/>
+                </a:solidFill>
+                <a:latin typeface="+mn-lt"/>
+                <a:ea typeface="+mn-ea"/>
+                <a:cs typeface="+mn-cs"/>
+              </a:defRPr>
+            </a:lvl8pPr>
+            <a:lvl9pPr marL="3886200" indent="-228600" algn="l" defTabSz="914400" rtl="0" eaLnBrk="1" latinLnBrk="0" hangingPunct="1">
+              <a:lnSpc>
+                <a:spcPct val="90000"/>
+              </a:lnSpc>
+              <a:spcBef>
+                <a:spcPts val="500"/>
+              </a:spcBef>
+              <a:buFont typeface="Arial" panose="020B0604020202020204" pitchFamily="34" charset="0"/>
+              <a:buChar char="•"/>
+              <a:defRPr sz="1800" kern="1200">
+                <a:solidFill>
+                  <a:schemeClr val="tx1"/>
+                </a:solidFill>
+                <a:latin typeface="+mn-lt"/>
+                <a:ea typeface="+mn-ea"/>
+                <a:cs typeface="+mn-cs"/>
+              </a:defRPr>
+            </a:lvl9pPr>
+          </a:lstStyle>
+          <a:p>
+            <a:pPr marL="0" indent="0" algn="ctr">
+              <a:buNone/>
+              <a:defRPr/>
+            </a:pPr>
+            <a:r>
+              <a:rPr lang="en-GB" sz="2000" b="1" dirty="0">
+                <a:solidFill>
+                  <a:schemeClr val="tx1">
+                    <a:lumMod val="75000"/>
+                    <a:lumOff val="25000"/>
+                  </a:schemeClr>
+                </a:solidFill>
+              </a:rPr>
+              <a:t>Backend tests</a:t>
+            </a:r>
+            <a:r>
+              <a:rPr lang="tr-TR" sz="2000" b="1" dirty="0">
+                <a:solidFill>
+                  <a:schemeClr val="tx1">
+                    <a:lumMod val="75000"/>
+                    <a:lumOff val="25000"/>
+                  </a:schemeClr>
+                </a:solidFill>
+              </a:rPr>
+              <a:t> </a:t>
+            </a:r>
+          </a:p>
+          <a:p>
+            <a:pPr lvl="1">
+              <a:buFont typeface="Wingdings" pitchFamily="2" charset="2"/>
+              <a:buChar char="v"/>
+              <a:defRPr/>
+            </a:pPr>
+            <a:r>
+              <a:rPr lang="en-GB" sz="1800" dirty="0">
+                <a:solidFill>
+                  <a:schemeClr val="tx1">
+                    <a:lumMod val="75000"/>
+                    <a:lumOff val="25000"/>
+                  </a:schemeClr>
+                </a:solidFill>
+                <a:latin typeface="Arial" panose="020B0604020202020204" pitchFamily="34" charset="0"/>
+                <a:cs typeface="Arial" panose="020B0604020202020204" pitchFamily="34" charset="0"/>
+              </a:rPr>
+              <a:t>Introduction</a:t>
+            </a:r>
+            <a:endParaRPr lang="tr-TR" sz="1800" dirty="0">
+              <a:solidFill>
+                <a:srgbClr val="FFC000"/>
+              </a:solidFill>
+              <a:latin typeface="Arial" panose="020B0604020202020204" pitchFamily="34" charset="0"/>
+              <a:cs typeface="Arial" panose="020B0604020202020204" pitchFamily="34" charset="0"/>
+            </a:endParaRPr>
+          </a:p>
+          <a:p>
+            <a:pPr lvl="1">
+              <a:buFont typeface="Wingdings" pitchFamily="2" charset="2"/>
+              <a:buChar char="v"/>
+              <a:defRPr/>
+            </a:pPr>
+            <a:r>
+              <a:rPr lang="en-GB" sz="1800" dirty="0">
+                <a:solidFill>
+                  <a:schemeClr val="tx1">
+                    <a:lumMod val="75000"/>
+                    <a:lumOff val="25000"/>
+                  </a:schemeClr>
+                </a:solidFill>
+                <a:latin typeface="Arial" panose="020B0604020202020204" pitchFamily="34" charset="0"/>
+                <a:cs typeface="Arial" panose="020B0604020202020204" pitchFamily="34" charset="0"/>
+              </a:rPr>
+              <a:t>Login &amp; Authentication</a:t>
+            </a:r>
+          </a:p>
+          <a:p>
+            <a:pPr lvl="1">
+              <a:buFont typeface="Wingdings" pitchFamily="2" charset="2"/>
+              <a:buChar char="v"/>
+              <a:defRPr/>
+            </a:pPr>
+            <a:r>
+              <a:rPr lang="en-GB" sz="1800" dirty="0">
+                <a:solidFill>
+                  <a:schemeClr val="tx1">
+                    <a:lumMod val="75000"/>
+                    <a:lumOff val="25000"/>
+                  </a:schemeClr>
+                </a:solidFill>
+                <a:latin typeface="Arial" panose="020B0604020202020204" pitchFamily="34" charset="0"/>
+                <a:cs typeface="Arial" panose="020B0604020202020204" pitchFamily="34" charset="0"/>
+              </a:rPr>
+              <a:t>GET User session</a:t>
+            </a:r>
+            <a:endParaRPr lang="tr-TR" sz="1800" dirty="0">
+              <a:solidFill>
+                <a:schemeClr val="tx1">
+                  <a:lumMod val="75000"/>
+                  <a:lumOff val="25000"/>
+                </a:schemeClr>
+              </a:solidFill>
+              <a:latin typeface="Arial" panose="020B0604020202020204" pitchFamily="34" charset="0"/>
+              <a:cs typeface="Arial" panose="020B0604020202020204" pitchFamily="34" charset="0"/>
+            </a:endParaRPr>
+          </a:p>
+          <a:p>
+            <a:pPr lvl="1">
+              <a:buFont typeface="Wingdings" pitchFamily="2" charset="2"/>
+              <a:buChar char="v"/>
+              <a:defRPr/>
+            </a:pPr>
+            <a:r>
+              <a:rPr lang="en-GB" sz="1800" dirty="0">
+                <a:solidFill>
+                  <a:schemeClr val="tx1">
+                    <a:lumMod val="75000"/>
+                    <a:lumOff val="25000"/>
+                  </a:schemeClr>
+                </a:solidFill>
+                <a:latin typeface="Arial" panose="020B0604020202020204" pitchFamily="34" charset="0"/>
+                <a:cs typeface="Arial" panose="020B0604020202020204" pitchFamily="34" charset="0"/>
+              </a:rPr>
+              <a:t>GET products</a:t>
+            </a:r>
+            <a:endParaRPr lang="tr-TR" sz="1800" dirty="0">
+              <a:solidFill>
+                <a:schemeClr val="tx1">
+                  <a:lumMod val="75000"/>
+                  <a:lumOff val="25000"/>
+                </a:schemeClr>
+              </a:solidFill>
+              <a:latin typeface="Arial" panose="020B0604020202020204" pitchFamily="34" charset="0"/>
+              <a:cs typeface="Arial" panose="020B0604020202020204" pitchFamily="34" charset="0"/>
+            </a:endParaRPr>
+          </a:p>
+          <a:p>
+            <a:pPr lvl="1">
+              <a:buFont typeface="Wingdings" pitchFamily="2" charset="2"/>
+              <a:buChar char="v"/>
+              <a:defRPr/>
+            </a:pPr>
+            <a:r>
+              <a:rPr lang="en-GB" sz="1800" dirty="0">
+                <a:solidFill>
+                  <a:schemeClr val="tx1">
+                    <a:lumMod val="75000"/>
+                    <a:lumOff val="25000"/>
+                  </a:schemeClr>
+                </a:solidFill>
+                <a:latin typeface="Arial" panose="020B0604020202020204" pitchFamily="34" charset="0"/>
+                <a:cs typeface="Arial" panose="020B0604020202020204" pitchFamily="34" charset="0"/>
+              </a:rPr>
+              <a:t>GET a product by ID</a:t>
+            </a:r>
+            <a:endParaRPr lang="tr-TR" sz="1800" dirty="0">
+              <a:solidFill>
+                <a:schemeClr val="tx1">
+                  <a:lumMod val="75000"/>
+                  <a:lumOff val="25000"/>
+                </a:schemeClr>
+              </a:solidFill>
+              <a:latin typeface="Arial" panose="020B0604020202020204" pitchFamily="34" charset="0"/>
+              <a:cs typeface="Arial" panose="020B0604020202020204" pitchFamily="34" charset="0"/>
+            </a:endParaRPr>
+          </a:p>
+          <a:p>
+            <a:pPr lvl="1">
+              <a:buFont typeface="Wingdings" pitchFamily="2" charset="2"/>
+              <a:buChar char="v"/>
+              <a:defRPr/>
+            </a:pPr>
+            <a:r>
+              <a:rPr lang="en-GB" sz="1800" dirty="0">
+                <a:solidFill>
+                  <a:schemeClr val="tx1">
+                    <a:lumMod val="75000"/>
+                    <a:lumOff val="25000"/>
+                  </a:schemeClr>
+                </a:solidFill>
+                <a:latin typeface="Arial" panose="020B0604020202020204" pitchFamily="34" charset="0"/>
+                <a:cs typeface="Arial" panose="020B0604020202020204" pitchFamily="34" charset="0"/>
+              </a:rPr>
+              <a:t>Adding a product to WishList</a:t>
+            </a:r>
+          </a:p>
+          <a:p>
+            <a:pPr lvl="1">
+              <a:buFont typeface="Wingdings" pitchFamily="2" charset="2"/>
+              <a:buChar char="v"/>
+              <a:defRPr/>
+            </a:pPr>
+            <a:r>
+              <a:rPr lang="en-GB" sz="1800" dirty="0">
+                <a:solidFill>
+                  <a:schemeClr val="tx1">
+                    <a:lumMod val="75000"/>
+                    <a:lumOff val="25000"/>
+                  </a:schemeClr>
+                </a:solidFill>
+                <a:latin typeface="Arial" panose="020B0604020202020204" pitchFamily="34" charset="0"/>
+                <a:cs typeface="Arial" panose="020B0604020202020204" pitchFamily="34" charset="0"/>
+              </a:rPr>
+              <a:t>GET WishList</a:t>
+            </a:r>
+          </a:p>
+          <a:p>
+            <a:pPr lvl="1">
+              <a:buFont typeface="Wingdings" pitchFamily="2" charset="2"/>
+              <a:buChar char="v"/>
+              <a:defRPr/>
+            </a:pPr>
+            <a:r>
+              <a:rPr lang="en-GB" sz="1800" dirty="0">
+                <a:solidFill>
+                  <a:schemeClr val="tx1">
+                    <a:lumMod val="75000"/>
+                    <a:lumOff val="25000"/>
+                  </a:schemeClr>
+                </a:solidFill>
+                <a:latin typeface="Arial" panose="020B0604020202020204" pitchFamily="34" charset="0"/>
+                <a:cs typeface="Arial" panose="020B0604020202020204" pitchFamily="34" charset="0"/>
+              </a:rPr>
+              <a:t>Remove added product from WishList</a:t>
+            </a:r>
+          </a:p>
+          <a:p>
+            <a:pPr lvl="1">
+              <a:buFont typeface="Wingdings" pitchFamily="2" charset="2"/>
+              <a:buChar char="v"/>
+              <a:defRPr/>
+            </a:pPr>
+            <a:r>
+              <a:rPr lang="en-GB" sz="1800" dirty="0">
+                <a:solidFill>
+                  <a:schemeClr val="tx1">
+                    <a:lumMod val="75000"/>
+                    <a:lumOff val="25000"/>
+                  </a:schemeClr>
+                </a:solidFill>
+                <a:latin typeface="Arial" panose="020B0604020202020204" pitchFamily="34" charset="0"/>
+                <a:cs typeface="Arial" panose="020B0604020202020204" pitchFamily="34" charset="0"/>
+              </a:rPr>
+              <a:t>Adding a new product</a:t>
+            </a:r>
+          </a:p>
+          <a:p>
+            <a:pPr lvl="1">
+              <a:buFont typeface="Wingdings" pitchFamily="2" charset="2"/>
+              <a:buChar char="v"/>
+              <a:defRPr/>
+            </a:pPr>
+            <a:r>
+              <a:rPr lang="en-GB" sz="1800" dirty="0">
+                <a:solidFill>
+                  <a:schemeClr val="tx1">
+                    <a:lumMod val="75000"/>
+                    <a:lumOff val="25000"/>
+                  </a:schemeClr>
+                </a:solidFill>
+                <a:latin typeface="Arial" panose="020B0604020202020204" pitchFamily="34" charset="0"/>
+                <a:cs typeface="Arial" panose="020B0604020202020204" pitchFamily="34" charset="0"/>
+              </a:rPr>
+              <a:t>Modifying a product</a:t>
+            </a:r>
+          </a:p>
+          <a:p>
+            <a:pPr lvl="1">
+              <a:buFont typeface="Wingdings" pitchFamily="2" charset="2"/>
+              <a:buChar char="v"/>
+              <a:defRPr/>
+            </a:pPr>
+            <a:r>
+              <a:rPr lang="en-GB" sz="1800" dirty="0">
+                <a:solidFill>
+                  <a:schemeClr val="tx1">
+                    <a:lumMod val="75000"/>
+                    <a:lumOff val="25000"/>
+                  </a:schemeClr>
+                </a:solidFill>
+                <a:latin typeface="Arial" panose="020B0604020202020204" pitchFamily="34" charset="0"/>
+                <a:cs typeface="Arial" panose="020B0604020202020204" pitchFamily="34" charset="0"/>
+              </a:rPr>
+              <a:t>Deleting a product</a:t>
+            </a:r>
+          </a:p>
+          <a:p>
+            <a:pPr lvl="1">
+              <a:buFont typeface="Wingdings" pitchFamily="2" charset="2"/>
+              <a:buChar char="v"/>
+              <a:defRPr/>
+            </a:pPr>
+            <a:r>
+              <a:rPr lang="en-GB" sz="1800" dirty="0">
+                <a:solidFill>
+                  <a:schemeClr val="tx1">
+                    <a:lumMod val="75000"/>
+                    <a:lumOff val="25000"/>
+                  </a:schemeClr>
+                </a:solidFill>
+                <a:latin typeface="Arial" panose="020B0604020202020204" pitchFamily="34" charset="0"/>
+                <a:cs typeface="Arial" panose="020B0604020202020204" pitchFamily="34" charset="0"/>
+              </a:rPr>
+              <a:t>Request password change</a:t>
+            </a:r>
+          </a:p>
+          <a:p>
+            <a:pPr lvl="1">
+              <a:buFont typeface="Wingdings" pitchFamily="2" charset="2"/>
+              <a:buChar char="v"/>
+              <a:defRPr/>
+            </a:pPr>
+            <a:r>
+              <a:rPr lang="en-GB" sz="1800" dirty="0">
+                <a:solidFill>
+                  <a:schemeClr val="tx1">
+                    <a:lumMod val="75000"/>
+                    <a:lumOff val="25000"/>
+                  </a:schemeClr>
+                </a:solidFill>
+                <a:latin typeface="Arial" panose="020B0604020202020204" pitchFamily="34" charset="0"/>
+                <a:cs typeface="Arial" panose="020B0604020202020204" pitchFamily="34" charset="0"/>
+              </a:rPr>
+              <a:t>Logout</a:t>
+            </a:r>
+          </a:p>
+          <a:p>
+            <a:pPr lvl="1">
+              <a:buFont typeface="Wingdings" pitchFamily="2" charset="2"/>
+              <a:buChar char="v"/>
+              <a:defRPr/>
+            </a:pPr>
+            <a:r>
+              <a:rPr lang="en-GB" sz="1800" dirty="0">
+                <a:solidFill>
+                  <a:schemeClr val="tx1">
+                    <a:lumMod val="75000"/>
+                    <a:lumOff val="25000"/>
+                  </a:schemeClr>
+                </a:solidFill>
+                <a:latin typeface="Arial" panose="020B0604020202020204" pitchFamily="34" charset="0"/>
+                <a:cs typeface="Arial" panose="020B0604020202020204" pitchFamily="34" charset="0"/>
+              </a:rPr>
+              <a:t>Summary</a:t>
+            </a:r>
+            <a:endParaRPr lang="tr-TR" sz="1800" dirty="0">
+              <a:solidFill>
+                <a:schemeClr val="tx1">
+                  <a:lumMod val="75000"/>
+                  <a:lumOff val="25000"/>
+                </a:schemeClr>
+              </a:solidFill>
+              <a:latin typeface="Arial" panose="020B0604020202020204" pitchFamily="34" charset="0"/>
+              <a:cs typeface="Arial" panose="020B0604020202020204" pitchFamily="34" charset="0"/>
+            </a:endParaRPr>
           </a:p>
         </p:txBody>
       </p:sp>
@@ -3403,6 +4929,173 @@
     <p:extLst>
       <p:ext uri="{BB962C8B-B14F-4D97-AF65-F5344CB8AC3E}">
         <p14:creationId xmlns:p14="http://schemas.microsoft.com/office/powerpoint/2010/main" val="1053197981"/>
+      </p:ext>
+    </p:extLst>
+  </p:cSld>
+  <p:clrMapOvr>
+    <a:masterClrMapping/>
+  </p:clrMapOvr>
+</p:sld>
+</file>
+
+<file path=ppt/slides/slide2.xml><?xml version="1.0" encoding="utf-8"?>
+<p:sld xmlns:a="http://schemas.openxmlformats.org/drawingml/2006/main" xmlns:r="http://schemas.openxmlformats.org/officeDocument/2006/relationships" xmlns:p="http://schemas.openxmlformats.org/presentationml/2006/main">
+  <p:cSld>
+    <p:spTree>
+      <p:nvGrpSpPr>
+        <p:cNvPr id="1" name=""/>
+        <p:cNvGrpSpPr/>
+        <p:nvPr/>
+      </p:nvGrpSpPr>
+      <p:grpSpPr>
+        <a:xfrm>
+          <a:off x="0" y="0"/>
+          <a:ext cx="0" cy="0"/>
+          <a:chOff x="0" y="0"/>
+          <a:chExt cx="0" cy="0"/>
+        </a:xfrm>
+      </p:grpSpPr>
+      <p:sp>
+        <p:nvSpPr>
+          <p:cNvPr id="2" name="Cím 1">
+            <a:extLst>
+              <a:ext uri="{FF2B5EF4-FFF2-40B4-BE49-F238E27FC236}">
+                <a16:creationId xmlns:a16="http://schemas.microsoft.com/office/drawing/2014/main" id="{C37C21C9-7C9C-4C95-BE06-301051055663}"/>
+              </a:ext>
+            </a:extLst>
+          </p:cNvPr>
+          <p:cNvSpPr>
+            <a:spLocks noGrp="1"/>
+          </p:cNvSpPr>
+          <p:nvPr>
+            <p:ph type="ctrTitle"/>
+          </p:nvPr>
+        </p:nvSpPr>
+        <p:spPr>
+          <a:xfrm>
+            <a:off x="1524000" y="67286"/>
+            <a:ext cx="9144000" cy="847114"/>
+          </a:xfrm>
+          <a:ln>
+            <a:noFill/>
+          </a:ln>
+        </p:spPr>
+        <p:txBody>
+          <a:bodyPr anchor="ctr">
+            <a:normAutofit fontScale="90000"/>
+          </a:bodyPr>
+          <a:lstStyle/>
+          <a:p>
+            <a:r>
+              <a:rPr lang="en-GB" sz="6000" dirty="0">
+                <a:solidFill>
+                  <a:schemeClr val="tx1">
+                    <a:lumMod val="75000"/>
+                    <a:lumOff val="25000"/>
+                  </a:schemeClr>
+                </a:solidFill>
+                <a:latin typeface="Arial" panose="020B0604020202020204" pitchFamily="34" charset="0"/>
+                <a:cs typeface="Arial" panose="020B0604020202020204" pitchFamily="34" charset="0"/>
+              </a:rPr>
+              <a:t>Backend showcase</a:t>
+            </a:r>
+            <a:endParaRPr lang="en-GB" dirty="0"/>
+          </a:p>
+        </p:txBody>
+      </p:sp>
+      <p:sp>
+        <p:nvSpPr>
+          <p:cNvPr id="3" name="Alcím 2">
+            <a:extLst>
+              <a:ext uri="{FF2B5EF4-FFF2-40B4-BE49-F238E27FC236}">
+                <a16:creationId xmlns:a16="http://schemas.microsoft.com/office/drawing/2014/main" id="{2C955F0C-2D0A-42E1-9674-A9AFB46D7175}"/>
+              </a:ext>
+            </a:extLst>
+          </p:cNvPr>
+          <p:cNvSpPr>
+            <a:spLocks noGrp="1"/>
+          </p:cNvSpPr>
+          <p:nvPr>
+            <p:ph type="subTitle" idx="1"/>
+          </p:nvPr>
+        </p:nvSpPr>
+        <p:spPr>
+          <a:xfrm>
+            <a:off x="1524000" y="1096231"/>
+            <a:ext cx="9144000" cy="1655762"/>
+          </a:xfrm>
+        </p:spPr>
+        <p:txBody>
+          <a:bodyPr/>
+          <a:lstStyle/>
+          <a:p>
+            <a:r>
+              <a:rPr lang="en-GB" sz="2400" dirty="0">
+                <a:solidFill>
+                  <a:schemeClr val="tx1">
+                    <a:lumMod val="75000"/>
+                    <a:lumOff val="25000"/>
+                  </a:schemeClr>
+                </a:solidFill>
+                <a:latin typeface="Arial" panose="020B0604020202020204" pitchFamily="34" charset="0"/>
+                <a:cs typeface="Arial" panose="020B0604020202020204" pitchFamily="34" charset="0"/>
+              </a:rPr>
+              <a:t>Backend showcase</a:t>
+            </a:r>
+            <a:endParaRPr lang="en-GB" dirty="0"/>
+          </a:p>
+        </p:txBody>
+      </p:sp>
+      <p:cxnSp>
+        <p:nvCxnSpPr>
+          <p:cNvPr id="5" name="Egyenes összekötő 4">
+            <a:extLst>
+              <a:ext uri="{FF2B5EF4-FFF2-40B4-BE49-F238E27FC236}">
+                <a16:creationId xmlns:a16="http://schemas.microsoft.com/office/drawing/2014/main" id="{67B72B84-2E81-4645-92BA-59A24301A3AF}"/>
+              </a:ext>
+            </a:extLst>
+          </p:cNvPr>
+          <p:cNvCxnSpPr>
+            <a:cxnSpLocks/>
+          </p:cNvCxnSpPr>
+          <p:nvPr/>
+        </p:nvCxnSpPr>
+        <p:spPr>
+          <a:xfrm>
+            <a:off x="3167406" y="914400"/>
+            <a:ext cx="5863472" cy="0"/>
+          </a:xfrm>
+          <a:prstGeom prst="line">
+            <a:avLst/>
+          </a:prstGeom>
+          <a:ln w="25400">
+            <a:solidFill>
+              <a:schemeClr val="tx1">
+                <a:lumMod val="50000"/>
+                <a:lumOff val="50000"/>
+              </a:schemeClr>
+            </a:solidFill>
+          </a:ln>
+        </p:spPr>
+        <p:style>
+          <a:lnRef idx="1">
+            <a:schemeClr val="accent1"/>
+          </a:lnRef>
+          <a:fillRef idx="0">
+            <a:schemeClr val="accent1"/>
+          </a:fillRef>
+          <a:effectRef idx="0">
+            <a:schemeClr val="accent1"/>
+          </a:effectRef>
+          <a:fontRef idx="minor">
+            <a:schemeClr val="tx1"/>
+          </a:fontRef>
+        </p:style>
+      </p:cxnSp>
+    </p:spTree>
+    <p:extLst>
+      <p:ext uri="{BB962C8B-B14F-4D97-AF65-F5344CB8AC3E}">
+        <p14:creationId xmlns:p14="http://schemas.microsoft.com/office/powerpoint/2010/main" val="340760400"/>
       </p:ext>
     </p:extLst>
   </p:cSld>
@@ -3705,4 +5398,299 @@
     </a:ext>
   </a:extLst>
 </a:theme>
+</file>
+
+<file path=ppt/theme/theme2.xml><?xml version="1.0" encoding="utf-8"?>
+<a:theme xmlns:a="http://schemas.openxmlformats.org/drawingml/2006/main" name="Office-téma">
+  <a:themeElements>
+    <a:clrScheme name="Office">
+      <a:dk1>
+        <a:sysClr val="windowText" lastClr="000000"/>
+      </a:dk1>
+      <a:lt1>
+        <a:sysClr val="window" lastClr="FFFFFF"/>
+      </a:lt1>
+      <a:dk2>
+        <a:srgbClr val="44546A"/>
+      </a:dk2>
+      <a:lt2>
+        <a:srgbClr val="E7E6E6"/>
+      </a:lt2>
+      <a:accent1>
+        <a:srgbClr val="4472C4"/>
+      </a:accent1>
+      <a:accent2>
+        <a:srgbClr val="ED7D31"/>
+      </a:accent2>
+      <a:accent3>
+        <a:srgbClr val="A5A5A5"/>
+      </a:accent3>
+      <a:accent4>
+        <a:srgbClr val="FFC000"/>
+      </a:accent4>
+      <a:accent5>
+        <a:srgbClr val="5B9BD5"/>
+      </a:accent5>
+      <a:accent6>
+        <a:srgbClr val="70AD47"/>
+      </a:accent6>
+      <a:hlink>
+        <a:srgbClr val="0563C1"/>
+      </a:hlink>
+      <a:folHlink>
+        <a:srgbClr val="954F72"/>
+      </a:folHlink>
+    </a:clrScheme>
+    <a:fontScheme name="Office">
+      <a:majorFont>
+        <a:latin typeface="Calibri Light" panose="020F0302020204030204"/>
+        <a:ea typeface=""/>
+        <a:cs typeface=""/>
+        <a:font script="Jpan" typeface="游ゴシック Light"/>
+        <a:font script="Hang" typeface="맑은 고딕"/>
+        <a:font script="Hans" typeface="等线 Light"/>
+        <a:font script="Hant" typeface="新細明體"/>
+        <a:font script="Arab" typeface="Times New Roman"/>
+        <a:font script="Hebr" typeface="Times New Roman"/>
+        <a:font script="Thai" typeface="Angsana New"/>
+        <a:font script="Ethi" typeface="Nyala"/>
+        <a:font script="Beng" typeface="Vrinda"/>
+        <a:font script="Gujr" typeface="Shruti"/>
+        <a:font script="Khmr" typeface="MoolBoran"/>
+        <a:font script="Knda" typeface="Tunga"/>
+        <a:font script="Guru" typeface="Raavi"/>
+        <a:font script="Cans" typeface="Euphemia"/>
+        <a:font script="Cher" typeface="Plantagenet Cherokee"/>
+        <a:font script="Yiii" typeface="Microsoft Yi Baiti"/>
+        <a:font script="Tibt" typeface="Microsoft Himalaya"/>
+        <a:font script="Thaa" typeface="MV Boli"/>
+        <a:font script="Deva" typeface="Mangal"/>
+        <a:font script="Telu" typeface="Gautami"/>
+        <a:font script="Taml" typeface="Latha"/>
+        <a:font script="Syrc" typeface="Estrangelo Edessa"/>
+        <a:font script="Orya" typeface="Kalinga"/>
+        <a:font script="Mlym" typeface="Kartika"/>
+        <a:font script="Laoo" typeface="DokChampa"/>
+        <a:font script="Sinh" typeface="Iskoola Pota"/>
+        <a:font script="Mong" typeface="Mongolian Baiti"/>
+        <a:font script="Viet" typeface="Times New Roman"/>
+        <a:font script="Uigh" typeface="Microsoft Uighur"/>
+        <a:font script="Geor" typeface="Sylfaen"/>
+        <a:font script="Armn" typeface="Arial"/>
+        <a:font script="Bugi" typeface="Leelawadee UI"/>
+        <a:font script="Bopo" typeface="Microsoft JhengHei"/>
+        <a:font script="Java" typeface="Javanese Text"/>
+        <a:font script="Lisu" typeface="Segoe UI"/>
+        <a:font script="Mymr" typeface="Myanmar Text"/>
+        <a:font script="Nkoo" typeface="Ebrima"/>
+        <a:font script="Olck" typeface="Nirmala UI"/>
+        <a:font script="Osma" typeface="Ebrima"/>
+        <a:font script="Phag" typeface="Phagspa"/>
+        <a:font script="Syrn" typeface="Estrangelo Edessa"/>
+        <a:font script="Syrj" typeface="Estrangelo Edessa"/>
+        <a:font script="Syre" typeface="Estrangelo Edessa"/>
+        <a:font script="Sora" typeface="Nirmala UI"/>
+        <a:font script="Tale" typeface="Microsoft Tai Le"/>
+        <a:font script="Talu" typeface="Microsoft New Tai Lue"/>
+        <a:font script="Tfng" typeface="Ebrima"/>
+      </a:majorFont>
+      <a:minorFont>
+        <a:latin typeface="Calibri" panose="020F0502020204030204"/>
+        <a:ea typeface=""/>
+        <a:cs typeface=""/>
+        <a:font script="Jpan" typeface="游ゴシック"/>
+        <a:font script="Hang" typeface="맑은 고딕"/>
+        <a:font script="Hans" typeface="等线"/>
+        <a:font script="Hant" typeface="新細明體"/>
+        <a:font script="Arab" typeface="Arial"/>
+        <a:font script="Hebr" typeface="Arial"/>
+        <a:font script="Thai" typeface="Cordia New"/>
+        <a:font script="Ethi" typeface="Nyala"/>
+        <a:font script="Beng" typeface="Vrinda"/>
+        <a:font script="Gujr" typeface="Shruti"/>
+        <a:font script="Khmr" typeface="DaunPenh"/>
+        <a:font script="Knda" typeface="Tunga"/>
+        <a:font script="Guru" typeface="Raavi"/>
+        <a:font script="Cans" typeface="Euphemia"/>
+        <a:font script="Cher" typeface="Plantagenet Cherokee"/>
+        <a:font script="Yiii" typeface="Microsoft Yi Baiti"/>
+        <a:font script="Tibt" typeface="Microsoft Himalaya"/>
+        <a:font script="Thaa" typeface="MV Boli"/>
+        <a:font script="Deva" typeface="Mangal"/>
+        <a:font script="Telu" typeface="Gautami"/>
+        <a:font script="Taml" typeface="Latha"/>
+        <a:font script="Syrc" typeface="Estrangelo Edessa"/>
+        <a:font script="Orya" typeface="Kalinga"/>
+        <a:font script="Mlym" typeface="Kartika"/>
+        <a:font script="Laoo" typeface="DokChampa"/>
+        <a:font script="Sinh" typeface="Iskoola Pota"/>
+        <a:font script="Mong" typeface="Mongolian Baiti"/>
+        <a:font script="Viet" typeface="Arial"/>
+        <a:font script="Uigh" typeface="Microsoft Uighur"/>
+        <a:font script="Geor" typeface="Sylfaen"/>
+        <a:font script="Armn" typeface="Arial"/>
+        <a:font script="Bugi" typeface="Leelawadee UI"/>
+        <a:font script="Bopo" typeface="Microsoft JhengHei"/>
+        <a:font script="Java" typeface="Javanese Text"/>
+        <a:font script="Lisu" typeface="Segoe UI"/>
+        <a:font script="Mymr" typeface="Myanmar Text"/>
+        <a:font script="Nkoo" typeface="Ebrima"/>
+        <a:font script="Olck" typeface="Nirmala UI"/>
+        <a:font script="Osma" typeface="Ebrima"/>
+        <a:font script="Phag" typeface="Phagspa"/>
+        <a:font script="Syrn" typeface="Estrangelo Edessa"/>
+        <a:font script="Syrj" typeface="Estrangelo Edessa"/>
+        <a:font script="Syre" typeface="Estrangelo Edessa"/>
+        <a:font script="Sora" typeface="Nirmala UI"/>
+        <a:font script="Tale" typeface="Microsoft Tai Le"/>
+        <a:font script="Talu" typeface="Microsoft New Tai Lue"/>
+        <a:font script="Tfng" typeface="Ebrima"/>
+      </a:minorFont>
+    </a:fontScheme>
+    <a:fmtScheme name="Office">
+      <a:fillStyleLst>
+        <a:solidFill>
+          <a:schemeClr val="phClr"/>
+        </a:solidFill>
+        <a:gradFill rotWithShape="1">
+          <a:gsLst>
+            <a:gs pos="0">
+              <a:schemeClr val="phClr">
+                <a:lumMod val="110000"/>
+                <a:satMod val="105000"/>
+                <a:tint val="67000"/>
+              </a:schemeClr>
+            </a:gs>
+            <a:gs pos="50000">
+              <a:schemeClr val="phClr">
+                <a:lumMod val="105000"/>
+                <a:satMod val="103000"/>
+                <a:tint val="73000"/>
+              </a:schemeClr>
+            </a:gs>
+            <a:gs pos="100000">
+              <a:schemeClr val="phClr">
+                <a:lumMod val="105000"/>
+                <a:satMod val="109000"/>
+                <a:tint val="81000"/>
+              </a:schemeClr>
+            </a:gs>
+          </a:gsLst>
+          <a:lin ang="5400000" scaled="0"/>
+        </a:gradFill>
+        <a:gradFill rotWithShape="1">
+          <a:gsLst>
+            <a:gs pos="0">
+              <a:schemeClr val="phClr">
+                <a:satMod val="103000"/>
+                <a:lumMod val="102000"/>
+                <a:tint val="94000"/>
+              </a:schemeClr>
+            </a:gs>
+            <a:gs pos="50000">
+              <a:schemeClr val="phClr">
+                <a:satMod val="110000"/>
+                <a:lumMod val="100000"/>
+                <a:shade val="100000"/>
+              </a:schemeClr>
+            </a:gs>
+            <a:gs pos="100000">
+              <a:schemeClr val="phClr">
+                <a:lumMod val="99000"/>
+                <a:satMod val="120000"/>
+                <a:shade val="78000"/>
+              </a:schemeClr>
+            </a:gs>
+          </a:gsLst>
+          <a:lin ang="5400000" scaled="0"/>
+        </a:gradFill>
+      </a:fillStyleLst>
+      <a:lnStyleLst>
+        <a:ln w="6350" cap="flat" cmpd="sng" algn="ctr">
+          <a:solidFill>
+            <a:schemeClr val="phClr"/>
+          </a:solidFill>
+          <a:prstDash val="solid"/>
+          <a:miter lim="800000"/>
+        </a:ln>
+        <a:ln w="12700" cap="flat" cmpd="sng" algn="ctr">
+          <a:solidFill>
+            <a:schemeClr val="phClr"/>
+          </a:solidFill>
+          <a:prstDash val="solid"/>
+          <a:miter lim="800000"/>
+        </a:ln>
+        <a:ln w="19050" cap="flat" cmpd="sng" algn="ctr">
+          <a:solidFill>
+            <a:schemeClr val="phClr"/>
+          </a:solidFill>
+          <a:prstDash val="solid"/>
+          <a:miter lim="800000"/>
+        </a:ln>
+      </a:lnStyleLst>
+      <a:effectStyleLst>
+        <a:effectStyle>
+          <a:effectLst/>
+        </a:effectStyle>
+        <a:effectStyle>
+          <a:effectLst/>
+        </a:effectStyle>
+        <a:effectStyle>
+          <a:effectLst>
+            <a:outerShdw blurRad="57150" dist="19050" dir="5400000" algn="ctr" rotWithShape="0">
+              <a:srgbClr val="000000">
+                <a:alpha val="63000"/>
+              </a:srgbClr>
+            </a:outerShdw>
+          </a:effectLst>
+        </a:effectStyle>
+      </a:effectStyleLst>
+      <a:bgFillStyleLst>
+        <a:solidFill>
+          <a:schemeClr val="phClr"/>
+        </a:solidFill>
+        <a:solidFill>
+          <a:schemeClr val="phClr">
+            <a:tint val="95000"/>
+            <a:satMod val="170000"/>
+          </a:schemeClr>
+        </a:solidFill>
+        <a:gradFill rotWithShape="1">
+          <a:gsLst>
+            <a:gs pos="0">
+              <a:schemeClr val="phClr">
+                <a:tint val="93000"/>
+                <a:satMod val="150000"/>
+                <a:shade val="98000"/>
+                <a:lumMod val="102000"/>
+              </a:schemeClr>
+            </a:gs>
+            <a:gs pos="50000">
+              <a:schemeClr val="phClr">
+                <a:tint val="98000"/>
+                <a:satMod val="130000"/>
+                <a:shade val="90000"/>
+                <a:lumMod val="103000"/>
+              </a:schemeClr>
+            </a:gs>
+            <a:gs pos="100000">
+              <a:schemeClr val="phClr">
+                <a:shade val="63000"/>
+                <a:satMod val="120000"/>
+              </a:schemeClr>
+            </a:gs>
+          </a:gsLst>
+          <a:lin ang="5400000" scaled="0"/>
+        </a:gradFill>
+      </a:bgFillStyleLst>
+    </a:fmtScheme>
+  </a:themeElements>
+  <a:objectDefaults/>
+  <a:extraClrSchemeLst/>
+  <a:extLst>
+    <a:ext uri="{05A4C25C-085E-4340-85A3-A5531E510DB2}">
+      <thm15:themeFamily xmlns:thm15="http://schemas.microsoft.com/office/thememl/2012/main" name="Office Theme" id="{62F939B6-93AF-4DB8-9C6B-D6C7DFDC589F}" vid="{4A3C46E8-61CC-4603-A589-7422A47A8E4A}"/>
+    </a:ext>
+  </a:extLst>
+</a:theme>
 </file>
</xml_diff>

<commit_message>
formatting + pptx progression - starter file done
</commit_message>
<xml_diff>
--- a/Documentations/NasaPC_WebShopProject.pptx
+++ b/Documentations/NasaPC_WebShopProject.pptx
@@ -111,6 +111,9 @@
   <p:extLst>
     <p:ext uri="{EFAFB233-063F-42B5-8137-9DF3F51BA10A}">
       <p15:sldGuideLst xmlns:p15="http://schemas.microsoft.com/office/powerpoint/2012/main"/>
+    </p:ext>
+    <p:ext uri="{2D200454-40CA-4A62-9FC3-DE9A4176ACB9}">
+      <p15:notesGuideLst xmlns:p15="http://schemas.microsoft.com/office/powerpoint/2012/main"/>
     </p:ext>
   </p:extLst>
 </p:presentation>
@@ -3208,38 +3211,38 @@
           <a:p>
             <a:pPr lvl="0"/>
             <a:r>
-              <a:rPr lang="hu-HU"/>
+              <a:rPr lang="hu-HU" dirty="0"/>
               <a:t>Mintaszöveg szerkesztése</a:t>
             </a:r>
           </a:p>
           <a:p>
             <a:pPr lvl="1"/>
             <a:r>
-              <a:rPr lang="hu-HU"/>
+              <a:rPr lang="hu-HU" dirty="0"/>
               <a:t>Második szint</a:t>
             </a:r>
           </a:p>
           <a:p>
             <a:pPr lvl="2"/>
             <a:r>
-              <a:rPr lang="hu-HU"/>
+              <a:rPr lang="hu-HU" dirty="0"/>
               <a:t>Harmadik szint</a:t>
             </a:r>
           </a:p>
           <a:p>
             <a:pPr lvl="3"/>
             <a:r>
-              <a:rPr lang="hu-HU"/>
+              <a:rPr lang="hu-HU" dirty="0"/>
               <a:t>Negyedik szint</a:t>
             </a:r>
           </a:p>
           <a:p>
             <a:pPr lvl="4"/>
             <a:r>
-              <a:rPr lang="hu-HU"/>
+              <a:rPr lang="hu-HU" dirty="0"/>
               <a:t>Ötödik szint</a:t>
             </a:r>
-            <a:endParaRPr lang="en-GB"/>
+            <a:endParaRPr lang="en-GB" dirty="0"/>
           </a:p>
         </p:txBody>
       </p:sp>
@@ -3441,6 +3444,83 @@
           </a:p>
         </p:txBody>
       </p:sp>
+      <p:pic>
+        <p:nvPicPr>
+          <p:cNvPr id="9" name="Kép 8">
+            <a:extLst>
+              <a:ext uri="{FF2B5EF4-FFF2-40B4-BE49-F238E27FC236}">
+                <a16:creationId xmlns:a16="http://schemas.microsoft.com/office/drawing/2014/main" id="{FBF3F5BF-81A0-44DA-9F54-C5874D32366B}"/>
+              </a:ext>
+            </a:extLst>
+          </p:cNvPr>
+          <p:cNvPicPr>
+            <a:picLocks noChangeAspect="1"/>
+          </p:cNvPicPr>
+          <p:nvPr userDrawn="1"/>
+        </p:nvPicPr>
+        <p:blipFill>
+          <a:blip r:embed="rId13">
+            <a:extLst>
+              <a:ext uri="{28A0092B-C50C-407E-A947-70E740481C1C}">
+                <a14:useLocalDpi xmlns:a14="http://schemas.microsoft.com/office/drawing/2010/main" val="0"/>
+              </a:ext>
+            </a:extLst>
+          </a:blip>
+          <a:stretch>
+            <a:fillRect/>
+          </a:stretch>
+        </p:blipFill>
+        <p:spPr>
+          <a:xfrm>
+            <a:off x="650991" y="136525"/>
+            <a:ext cx="1308606" cy="1292248"/>
+          </a:xfrm>
+          <a:prstGeom prst="rect">
+            <a:avLst/>
+          </a:prstGeom>
+        </p:spPr>
+      </p:pic>
+      <p:pic>
+        <p:nvPicPr>
+          <p:cNvPr id="11" name="Kép 10">
+            <a:extLst>
+              <a:ext uri="{FF2B5EF4-FFF2-40B4-BE49-F238E27FC236}">
+                <a16:creationId xmlns:a16="http://schemas.microsoft.com/office/drawing/2014/main" id="{234ECDE0-9558-4486-910B-470024A2BCEC}"/>
+              </a:ext>
+            </a:extLst>
+          </p:cNvPr>
+          <p:cNvPicPr>
+            <a:picLocks noChangeAspect="1"/>
+          </p:cNvPicPr>
+          <p:nvPr userDrawn="1"/>
+        </p:nvPicPr>
+        <p:blipFill rotWithShape="1">
+          <a:blip r:embed="rId14">
+            <a:extLst>
+              <a:ext uri="{28A0092B-C50C-407E-A947-70E740481C1C}">
+                <a14:useLocalDpi xmlns:a14="http://schemas.microsoft.com/office/drawing/2010/main" val="0"/>
+              </a:ext>
+            </a:extLst>
+          </a:blip>
+          <a:srcRect r="3932" b="-2465"/>
+          <a:stretch/>
+        </p:blipFill>
+        <p:spPr>
+          <a:xfrm>
+            <a:off x="650992" y="1169310"/>
+            <a:ext cx="1308606" cy="326932"/>
+          </a:xfrm>
+          <a:prstGeom prst="rect">
+            <a:avLst/>
+          </a:prstGeom>
+          <a:ln>
+            <a:noFill/>
+          </a:ln>
+          <a:effectLst>
+            <a:softEdge rad="25400"/>
+          </a:effectLst>
+        </p:spPr>
+      </p:pic>
     </p:spTree>
     <p:extLst>
       <p:ext uri="{BB962C8B-B14F-4D97-AF65-F5344CB8AC3E}">
@@ -4039,39 +4119,6 @@
                 <a:latin typeface="Arial" panose="020B0604020202020204" pitchFamily="34" charset="0"/>
                 <a:cs typeface="Arial" panose="020B0604020202020204" pitchFamily="34" charset="0"/>
               </a:rPr>
-              <a:t>Introduction</a:t>
-            </a:r>
-            <a:r>
-              <a:rPr lang="tr-TR" sz="1800" dirty="0">
-                <a:solidFill>
-                  <a:schemeClr val="tx1">
-                    <a:lumMod val="75000"/>
-                    <a:lumOff val="25000"/>
-                  </a:schemeClr>
-                </a:solidFill>
-                <a:latin typeface="Arial" panose="020B0604020202020204" pitchFamily="34" charset="0"/>
-                <a:cs typeface="Arial" panose="020B0604020202020204" pitchFamily="34" charset="0"/>
-              </a:rPr>
-              <a:t> </a:t>
-            </a:r>
-          </a:p>
-          <a:p>
-            <a:pPr lvl="1">
-              <a:buFont typeface="Wingdings" pitchFamily="2" charset="2"/>
-              <a:buChar char="v"/>
-              <a:defRPr/>
-            </a:pPr>
-            <a:r>
-              <a:rPr lang="en-GB" sz="1800" dirty="0">
-                <a:solidFill>
-                  <a:schemeClr val="tx1">
-                    <a:lumMod val="75000"/>
-                    <a:lumOff val="25000"/>
-                  </a:schemeClr>
-                </a:solidFill>
-                <a:latin typeface="Arial" panose="020B0604020202020204" pitchFamily="34" charset="0"/>
-                <a:cs typeface="Arial" panose="020B0604020202020204" pitchFamily="34" charset="0"/>
-              </a:rPr>
               <a:t>Starter file (app.js)</a:t>
             </a:r>
             <a:endParaRPr lang="tr-TR" sz="1800" dirty="0">
@@ -5021,16 +5068,18 @@
         </p:nvSpPr>
         <p:spPr>
           <a:xfrm>
-            <a:off x="1524000" y="1096231"/>
+            <a:off x="1524000" y="933633"/>
             <a:ext cx="9144000" cy="1655762"/>
           </a:xfrm>
         </p:spPr>
         <p:txBody>
-          <a:bodyPr/>
+          <a:bodyPr>
+            <a:normAutofit/>
+          </a:bodyPr>
           <a:lstStyle/>
           <a:p>
             <a:r>
-              <a:rPr lang="en-GB" sz="2400" dirty="0">
+              <a:rPr lang="en-GB" sz="3600" dirty="0">
                 <a:solidFill>
                   <a:schemeClr val="tx1">
                     <a:lumMod val="75000"/>
@@ -5040,9 +5089,9 @@
                 <a:latin typeface="Arial" panose="020B0604020202020204" pitchFamily="34" charset="0"/>
                 <a:cs typeface="Arial" panose="020B0604020202020204" pitchFamily="34" charset="0"/>
               </a:rPr>
-              <a:t>Backend showcase</a:t>
-            </a:r>
-            <a:endParaRPr lang="en-GB" dirty="0"/>
+              <a:t>Starter file (app.js)</a:t>
+            </a:r>
+            <a:endParaRPr lang="en-GB" sz="3600" dirty="0"/>
           </a:p>
         </p:txBody>
       </p:sp>
@@ -5092,6 +5141,50 @@
           </a:fontRef>
         </p:style>
       </p:cxnSp>
+      <p:pic>
+        <p:nvPicPr>
+          <p:cNvPr id="26" name="Kép 25" descr="A képen szöveg látható&#10;&#10;Automatikusan generált leírás">
+            <a:extLst>
+              <a:ext uri="{FF2B5EF4-FFF2-40B4-BE49-F238E27FC236}">
+                <a16:creationId xmlns:a16="http://schemas.microsoft.com/office/drawing/2014/main" id="{71666F6A-D908-481F-847C-9B4EA3478EB5}"/>
+              </a:ext>
+            </a:extLst>
+          </p:cNvPr>
+          <p:cNvPicPr>
+            <a:picLocks noChangeAspect="1"/>
+          </p:cNvPicPr>
+          <p:nvPr/>
+        </p:nvPicPr>
+        <p:blipFill>
+          <a:blip r:embed="rId2">
+            <a:extLst>
+              <a:ext uri="{28A0092B-C50C-407E-A947-70E740481C1C}">
+                <a14:useLocalDpi xmlns:a14="http://schemas.microsoft.com/office/drawing/2010/main" val="0"/>
+              </a:ext>
+            </a:extLst>
+          </a:blip>
+          <a:stretch>
+            <a:fillRect/>
+          </a:stretch>
+        </p:blipFill>
+        <p:spPr>
+          <a:xfrm>
+            <a:off x="2831837" y="1591786"/>
+            <a:ext cx="6528325" cy="4887931"/>
+          </a:xfrm>
+          <a:prstGeom prst="rect">
+            <a:avLst/>
+          </a:prstGeom>
+          <a:effectLst>
+            <a:outerShdw blurRad="63500" sx="102000" sy="102000" algn="ctr" rotWithShape="0">
+              <a:schemeClr val="bg1">
+                <a:lumMod val="50000"/>
+                <a:alpha val="40000"/>
+              </a:schemeClr>
+            </a:outerShdw>
+          </a:effectLst>
+        </p:spPr>
+      </p:pic>
     </p:spTree>
     <p:extLst>
       <p:ext uri="{BB962C8B-B14F-4D97-AF65-F5344CB8AC3E}">

</xml_diff>

<commit_message>
backend progression - register & verify account done
</commit_message>
<xml_diff>
--- a/Documentations/NasaPC_WebShopProject.pptx
+++ b/Documentations/NasaPC_WebShopProject.pptx
@@ -5,11 +5,13 @@
     <p:sldMasterId id="2147483660" r:id="rId1"/>
   </p:sldMasterIdLst>
   <p:notesMasterIdLst>
-    <p:notesMasterId r:id="rId4"/>
+    <p:notesMasterId r:id="rId6"/>
   </p:notesMasterIdLst>
   <p:sldIdLst>
     <p:sldId id="257" r:id="rId2"/>
     <p:sldId id="259" r:id="rId3"/>
+    <p:sldId id="260" r:id="rId4"/>
+    <p:sldId id="261" r:id="rId5"/>
   </p:sldIdLst>
   <p:sldSz cx="12192000" cy="6858000"/>
   <p:notesSz cx="6858000" cy="9144000"/>
@@ -5189,6 +5191,1179 @@
     <p:extLst>
       <p:ext uri="{BB962C8B-B14F-4D97-AF65-F5344CB8AC3E}">
         <p14:creationId xmlns:p14="http://schemas.microsoft.com/office/powerpoint/2010/main" val="340760400"/>
+      </p:ext>
+    </p:extLst>
+  </p:cSld>
+  <p:clrMapOvr>
+    <a:masterClrMapping/>
+  </p:clrMapOvr>
+</p:sld>
+</file>
+
+<file path=ppt/slides/slide3.xml><?xml version="1.0" encoding="utf-8"?>
+<p:sld xmlns:a="http://schemas.openxmlformats.org/drawingml/2006/main" xmlns:r="http://schemas.openxmlformats.org/officeDocument/2006/relationships" xmlns:p="http://schemas.openxmlformats.org/presentationml/2006/main">
+  <p:cSld>
+    <p:spTree>
+      <p:nvGrpSpPr>
+        <p:cNvPr id="1" name=""/>
+        <p:cNvGrpSpPr/>
+        <p:nvPr/>
+      </p:nvGrpSpPr>
+      <p:grpSpPr>
+        <a:xfrm>
+          <a:off x="0" y="0"/>
+          <a:ext cx="0" cy="0"/>
+          <a:chOff x="0" y="0"/>
+          <a:chExt cx="0" cy="0"/>
+        </a:xfrm>
+      </p:grpSpPr>
+      <p:sp>
+        <p:nvSpPr>
+          <p:cNvPr id="2" name="Cím 1">
+            <a:extLst>
+              <a:ext uri="{FF2B5EF4-FFF2-40B4-BE49-F238E27FC236}">
+                <a16:creationId xmlns:a16="http://schemas.microsoft.com/office/drawing/2014/main" id="{C37C21C9-7C9C-4C95-BE06-301051055663}"/>
+              </a:ext>
+            </a:extLst>
+          </p:cNvPr>
+          <p:cNvSpPr>
+            <a:spLocks noGrp="1"/>
+          </p:cNvSpPr>
+          <p:nvPr>
+            <p:ph type="ctrTitle"/>
+          </p:nvPr>
+        </p:nvSpPr>
+        <p:spPr>
+          <a:xfrm>
+            <a:off x="1524000" y="67286"/>
+            <a:ext cx="9144000" cy="847114"/>
+          </a:xfrm>
+          <a:ln>
+            <a:noFill/>
+          </a:ln>
+        </p:spPr>
+        <p:txBody>
+          <a:bodyPr anchor="ctr">
+            <a:normAutofit fontScale="90000"/>
+          </a:bodyPr>
+          <a:lstStyle/>
+          <a:p>
+            <a:r>
+              <a:rPr lang="en-GB" sz="6000" dirty="0">
+                <a:solidFill>
+                  <a:schemeClr val="tx1">
+                    <a:lumMod val="75000"/>
+                    <a:lumOff val="25000"/>
+                  </a:schemeClr>
+                </a:solidFill>
+                <a:latin typeface="Arial" panose="020B0604020202020204" pitchFamily="34" charset="0"/>
+                <a:cs typeface="Arial" panose="020B0604020202020204" pitchFamily="34" charset="0"/>
+              </a:rPr>
+              <a:t>Backend showcase</a:t>
+            </a:r>
+            <a:endParaRPr lang="en-GB" dirty="0"/>
+          </a:p>
+        </p:txBody>
+      </p:sp>
+      <p:sp>
+        <p:nvSpPr>
+          <p:cNvPr id="3" name="Alcím 2">
+            <a:extLst>
+              <a:ext uri="{FF2B5EF4-FFF2-40B4-BE49-F238E27FC236}">
+                <a16:creationId xmlns:a16="http://schemas.microsoft.com/office/drawing/2014/main" id="{2C955F0C-2D0A-42E1-9674-A9AFB46D7175}"/>
+              </a:ext>
+            </a:extLst>
+          </p:cNvPr>
+          <p:cNvSpPr>
+            <a:spLocks noGrp="1"/>
+          </p:cNvSpPr>
+          <p:nvPr>
+            <p:ph type="subTitle" idx="1"/>
+          </p:nvPr>
+        </p:nvSpPr>
+        <p:spPr>
+          <a:xfrm>
+            <a:off x="1524000" y="933633"/>
+            <a:ext cx="9144000" cy="545352"/>
+          </a:xfrm>
+        </p:spPr>
+        <p:txBody>
+          <a:bodyPr>
+            <a:normAutofit lnSpcReduction="10000"/>
+          </a:bodyPr>
+          <a:lstStyle/>
+          <a:p>
+            <a:r>
+              <a:rPr lang="en-GB" sz="3600" dirty="0">
+                <a:solidFill>
+                  <a:schemeClr val="tx1">
+                    <a:lumMod val="75000"/>
+                    <a:lumOff val="25000"/>
+                  </a:schemeClr>
+                </a:solidFill>
+                <a:latin typeface="Arial" panose="020B0604020202020204" pitchFamily="34" charset="0"/>
+                <a:cs typeface="Arial" panose="020B0604020202020204" pitchFamily="34" charset="0"/>
+              </a:rPr>
+              <a:t>Register &amp; Verify Account</a:t>
+            </a:r>
+            <a:endParaRPr lang="en-GB" sz="3600" dirty="0"/>
+          </a:p>
+        </p:txBody>
+      </p:sp>
+      <p:cxnSp>
+        <p:nvCxnSpPr>
+          <p:cNvPr id="5" name="Egyenes összekötő 4">
+            <a:extLst>
+              <a:ext uri="{FF2B5EF4-FFF2-40B4-BE49-F238E27FC236}">
+                <a16:creationId xmlns:a16="http://schemas.microsoft.com/office/drawing/2014/main" id="{67B72B84-2E81-4645-92BA-59A24301A3AF}"/>
+              </a:ext>
+            </a:extLst>
+          </p:cNvPr>
+          <p:cNvCxnSpPr>
+            <a:cxnSpLocks/>
+          </p:cNvCxnSpPr>
+          <p:nvPr/>
+        </p:nvCxnSpPr>
+        <p:spPr>
+          <a:xfrm>
+            <a:off x="3167406" y="914400"/>
+            <a:ext cx="5863472" cy="0"/>
+          </a:xfrm>
+          <a:prstGeom prst="line">
+            <a:avLst/>
+          </a:prstGeom>
+          <a:ln w="25400">
+            <a:solidFill>
+              <a:schemeClr val="tx1">
+                <a:lumMod val="50000"/>
+                <a:lumOff val="50000"/>
+              </a:schemeClr>
+            </a:solidFill>
+          </a:ln>
+        </p:spPr>
+        <p:style>
+          <a:lnRef idx="1">
+            <a:schemeClr val="accent1"/>
+          </a:lnRef>
+          <a:fillRef idx="0">
+            <a:schemeClr val="accent1"/>
+          </a:fillRef>
+          <a:effectRef idx="0">
+            <a:schemeClr val="accent1"/>
+          </a:effectRef>
+          <a:fontRef idx="minor">
+            <a:schemeClr val="tx1"/>
+          </a:fontRef>
+        </p:style>
+      </p:cxnSp>
+      <p:pic>
+        <p:nvPicPr>
+          <p:cNvPr id="6" name="Kép 5" descr="A képen szöveg látható&#10;&#10;Automatikusan generált leírás">
+            <a:extLst>
+              <a:ext uri="{FF2B5EF4-FFF2-40B4-BE49-F238E27FC236}">
+                <a16:creationId xmlns:a16="http://schemas.microsoft.com/office/drawing/2014/main" id="{5422F4C5-3618-4295-86B4-3650F2475BEF}"/>
+              </a:ext>
+            </a:extLst>
+          </p:cNvPr>
+          <p:cNvPicPr>
+            <a:picLocks noChangeAspect="1"/>
+          </p:cNvPicPr>
+          <p:nvPr/>
+        </p:nvPicPr>
+        <p:blipFill rotWithShape="1">
+          <a:blip r:embed="rId2">
+            <a:extLst>
+              <a:ext uri="{28A0092B-C50C-407E-A947-70E740481C1C}">
+                <a14:useLocalDpi xmlns:a14="http://schemas.microsoft.com/office/drawing/2010/main" val="0"/>
+              </a:ext>
+            </a:extLst>
+          </a:blip>
+          <a:srcRect b="17443"/>
+          <a:stretch/>
+        </p:blipFill>
+        <p:spPr bwMode="auto">
+          <a:xfrm>
+            <a:off x="555115" y="2027213"/>
+            <a:ext cx="5038725" cy="2374810"/>
+          </a:xfrm>
+          <a:prstGeom prst="rect">
+            <a:avLst/>
+          </a:prstGeom>
+          <a:effectLst>
+            <a:outerShdw blurRad="63500" sx="102000" sy="102000" algn="ctr" rotWithShape="0">
+              <a:schemeClr val="bg1">
+                <a:lumMod val="50000"/>
+                <a:alpha val="40000"/>
+              </a:schemeClr>
+            </a:outerShdw>
+          </a:effectLst>
+        </p:spPr>
+      </p:pic>
+      <p:pic>
+        <p:nvPicPr>
+          <p:cNvPr id="11" name="Kép 10">
+            <a:extLst>
+              <a:ext uri="{FF2B5EF4-FFF2-40B4-BE49-F238E27FC236}">
+                <a16:creationId xmlns:a16="http://schemas.microsoft.com/office/drawing/2014/main" id="{C2E2FF05-73BE-4AAD-92DE-0C68B06F3758}"/>
+              </a:ext>
+            </a:extLst>
+          </p:cNvPr>
+          <p:cNvPicPr>
+            <a:picLocks noChangeAspect="1"/>
+          </p:cNvPicPr>
+          <p:nvPr/>
+        </p:nvPicPr>
+        <p:blipFill rotWithShape="1">
+          <a:blip r:embed="rId3">
+            <a:extLst>
+              <a:ext uri="{28A0092B-C50C-407E-A947-70E740481C1C}">
+                <a14:useLocalDpi xmlns:a14="http://schemas.microsoft.com/office/drawing/2010/main" val="0"/>
+              </a:ext>
+            </a:extLst>
+          </a:blip>
+          <a:srcRect t="1827" b="25330"/>
+          <a:stretch/>
+        </p:blipFill>
+        <p:spPr bwMode="auto">
+          <a:xfrm>
+            <a:off x="6510880" y="5096487"/>
+            <a:ext cx="5039995" cy="1223437"/>
+          </a:xfrm>
+          <a:prstGeom prst="rect">
+            <a:avLst/>
+          </a:prstGeom>
+          <a:effectLst>
+            <a:outerShdw blurRad="63500" sx="102000" sy="102000" algn="ctr" rotWithShape="0">
+              <a:schemeClr val="bg1">
+                <a:lumMod val="50000"/>
+                <a:alpha val="40000"/>
+              </a:schemeClr>
+            </a:outerShdw>
+          </a:effectLst>
+          <a:extLst>
+            <a:ext uri="{53640926-AAD7-44D8-BBD7-CCE9431645EC}">
+              <a14:shadowObscured xmlns:a14="http://schemas.microsoft.com/office/drawing/2010/main"/>
+            </a:ext>
+          </a:extLst>
+        </p:spPr>
+      </p:pic>
+      <p:pic>
+        <p:nvPicPr>
+          <p:cNvPr id="15" name="Kép 14" descr="A képen szöveg látható&#10;&#10;Automatikusan generált leírás">
+            <a:extLst>
+              <a:ext uri="{FF2B5EF4-FFF2-40B4-BE49-F238E27FC236}">
+                <a16:creationId xmlns:a16="http://schemas.microsoft.com/office/drawing/2014/main" id="{BCE12F8D-C494-4820-8DC8-41071482C32D}"/>
+              </a:ext>
+            </a:extLst>
+          </p:cNvPr>
+          <p:cNvPicPr>
+            <a:picLocks noChangeAspect="1"/>
+          </p:cNvPicPr>
+          <p:nvPr/>
+        </p:nvPicPr>
+        <p:blipFill>
+          <a:blip r:embed="rId4">
+            <a:extLst>
+              <a:ext uri="{28A0092B-C50C-407E-A947-70E740481C1C}">
+                <a14:useLocalDpi xmlns:a14="http://schemas.microsoft.com/office/drawing/2010/main" val="0"/>
+              </a:ext>
+            </a:extLst>
+          </a:blip>
+          <a:stretch>
+            <a:fillRect/>
+          </a:stretch>
+        </p:blipFill>
+        <p:spPr>
+          <a:xfrm>
+            <a:off x="550736" y="5096487"/>
+            <a:ext cx="5043104" cy="1224754"/>
+          </a:xfrm>
+          <a:prstGeom prst="rect">
+            <a:avLst/>
+          </a:prstGeom>
+          <a:effectLst>
+            <a:outerShdw blurRad="63500" sx="102000" sy="102000" algn="ctr" rotWithShape="0">
+              <a:schemeClr val="bg1">
+                <a:lumMod val="50000"/>
+                <a:alpha val="40000"/>
+              </a:schemeClr>
+            </a:outerShdw>
+          </a:effectLst>
+        </p:spPr>
+      </p:pic>
+      <p:pic>
+        <p:nvPicPr>
+          <p:cNvPr id="17" name="Kép 16" descr="A képen szöveg látható&#10;&#10;Automatikusan generált leírás">
+            <a:extLst>
+              <a:ext uri="{FF2B5EF4-FFF2-40B4-BE49-F238E27FC236}">
+                <a16:creationId xmlns:a16="http://schemas.microsoft.com/office/drawing/2014/main" id="{5F39D9DB-73CA-47A5-905A-D17D27E6173B}"/>
+              </a:ext>
+            </a:extLst>
+          </p:cNvPr>
+          <p:cNvPicPr>
+            <a:picLocks noChangeAspect="1"/>
+          </p:cNvPicPr>
+          <p:nvPr/>
+        </p:nvPicPr>
+        <p:blipFill>
+          <a:blip r:embed="rId5">
+            <a:extLst>
+              <a:ext uri="{28A0092B-C50C-407E-A947-70E740481C1C}">
+                <a14:useLocalDpi xmlns:a14="http://schemas.microsoft.com/office/drawing/2010/main" val="0"/>
+              </a:ext>
+            </a:extLst>
+          </a:blip>
+          <a:stretch>
+            <a:fillRect/>
+          </a:stretch>
+        </p:blipFill>
+        <p:spPr>
+          <a:xfrm>
+            <a:off x="6510542" y="2027213"/>
+            <a:ext cx="5040333" cy="2374692"/>
+          </a:xfrm>
+          <a:prstGeom prst="rect">
+            <a:avLst/>
+          </a:prstGeom>
+          <a:effectLst>
+            <a:outerShdw blurRad="63500" sx="102000" sy="102000" algn="ctr" rotWithShape="0">
+              <a:schemeClr val="bg1">
+                <a:lumMod val="50000"/>
+                <a:alpha val="40000"/>
+              </a:schemeClr>
+            </a:outerShdw>
+          </a:effectLst>
+        </p:spPr>
+      </p:pic>
+      <p:sp>
+        <p:nvSpPr>
+          <p:cNvPr id="19" name="Alcím 2">
+            <a:extLst>
+              <a:ext uri="{FF2B5EF4-FFF2-40B4-BE49-F238E27FC236}">
+                <a16:creationId xmlns:a16="http://schemas.microsoft.com/office/drawing/2014/main" id="{E0570FEA-9BAE-45BD-BE2E-95F1E84F7C7C}"/>
+              </a:ext>
+            </a:extLst>
+          </p:cNvPr>
+          <p:cNvSpPr txBox="1">
+            <a:spLocks/>
+          </p:cNvSpPr>
+          <p:nvPr/>
+        </p:nvSpPr>
+        <p:spPr>
+          <a:xfrm>
+            <a:off x="1524000" y="1362626"/>
+            <a:ext cx="9144000" cy="398888"/>
+          </a:xfrm>
+          <a:prstGeom prst="rect">
+            <a:avLst/>
+          </a:prstGeom>
+        </p:spPr>
+        <p:txBody>
+          <a:bodyPr vert="horz" lIns="91440" tIns="45720" rIns="91440" bIns="45720" rtlCol="0">
+            <a:normAutofit lnSpcReduction="10000"/>
+          </a:bodyPr>
+          <a:lstStyle>
+            <a:lvl1pPr marL="0" indent="0" algn="ctr" defTabSz="914400" rtl="0" eaLnBrk="1" latinLnBrk="0" hangingPunct="1">
+              <a:lnSpc>
+                <a:spcPct val="90000"/>
+              </a:lnSpc>
+              <a:spcBef>
+                <a:spcPts val="1000"/>
+              </a:spcBef>
+              <a:buFont typeface="Arial" panose="020B0604020202020204" pitchFamily="34" charset="0"/>
+              <a:buNone/>
+              <a:defRPr sz="2400" kern="1200">
+                <a:solidFill>
+                  <a:schemeClr val="tx1"/>
+                </a:solidFill>
+                <a:latin typeface="+mn-lt"/>
+                <a:ea typeface="+mn-ea"/>
+                <a:cs typeface="+mn-cs"/>
+              </a:defRPr>
+            </a:lvl1pPr>
+            <a:lvl2pPr marL="457200" indent="0" algn="ctr" defTabSz="914400" rtl="0" eaLnBrk="1" latinLnBrk="0" hangingPunct="1">
+              <a:lnSpc>
+                <a:spcPct val="90000"/>
+              </a:lnSpc>
+              <a:spcBef>
+                <a:spcPts val="500"/>
+              </a:spcBef>
+              <a:buFont typeface="Arial" panose="020B0604020202020204" pitchFamily="34" charset="0"/>
+              <a:buNone/>
+              <a:defRPr sz="2000" kern="1200">
+                <a:solidFill>
+                  <a:schemeClr val="tx1"/>
+                </a:solidFill>
+                <a:latin typeface="+mn-lt"/>
+                <a:ea typeface="+mn-ea"/>
+                <a:cs typeface="+mn-cs"/>
+              </a:defRPr>
+            </a:lvl2pPr>
+            <a:lvl3pPr marL="914400" indent="0" algn="ctr" defTabSz="914400" rtl="0" eaLnBrk="1" latinLnBrk="0" hangingPunct="1">
+              <a:lnSpc>
+                <a:spcPct val="90000"/>
+              </a:lnSpc>
+              <a:spcBef>
+                <a:spcPts val="500"/>
+              </a:spcBef>
+              <a:buFont typeface="Arial" panose="020B0604020202020204" pitchFamily="34" charset="0"/>
+              <a:buNone/>
+              <a:defRPr sz="1800" kern="1200">
+                <a:solidFill>
+                  <a:schemeClr val="tx1"/>
+                </a:solidFill>
+                <a:latin typeface="+mn-lt"/>
+                <a:ea typeface="+mn-ea"/>
+                <a:cs typeface="+mn-cs"/>
+              </a:defRPr>
+            </a:lvl3pPr>
+            <a:lvl4pPr marL="1371600" indent="0" algn="ctr" defTabSz="914400" rtl="0" eaLnBrk="1" latinLnBrk="0" hangingPunct="1">
+              <a:lnSpc>
+                <a:spcPct val="90000"/>
+              </a:lnSpc>
+              <a:spcBef>
+                <a:spcPts val="500"/>
+              </a:spcBef>
+              <a:buFont typeface="Arial" panose="020B0604020202020204" pitchFamily="34" charset="0"/>
+              <a:buNone/>
+              <a:defRPr sz="1600" kern="1200">
+                <a:solidFill>
+                  <a:schemeClr val="tx1"/>
+                </a:solidFill>
+                <a:latin typeface="+mn-lt"/>
+                <a:ea typeface="+mn-ea"/>
+                <a:cs typeface="+mn-cs"/>
+              </a:defRPr>
+            </a:lvl4pPr>
+            <a:lvl5pPr marL="1828800" indent="0" algn="ctr" defTabSz="914400" rtl="0" eaLnBrk="1" latinLnBrk="0" hangingPunct="1">
+              <a:lnSpc>
+                <a:spcPct val="90000"/>
+              </a:lnSpc>
+              <a:spcBef>
+                <a:spcPts val="500"/>
+              </a:spcBef>
+              <a:buFont typeface="Arial" panose="020B0604020202020204" pitchFamily="34" charset="0"/>
+              <a:buNone/>
+              <a:defRPr sz="1600" kern="1200">
+                <a:solidFill>
+                  <a:schemeClr val="tx1"/>
+                </a:solidFill>
+                <a:latin typeface="+mn-lt"/>
+                <a:ea typeface="+mn-ea"/>
+                <a:cs typeface="+mn-cs"/>
+              </a:defRPr>
+            </a:lvl5pPr>
+            <a:lvl6pPr marL="2286000" indent="0" algn="ctr" defTabSz="914400" rtl="0" eaLnBrk="1" latinLnBrk="0" hangingPunct="1">
+              <a:lnSpc>
+                <a:spcPct val="90000"/>
+              </a:lnSpc>
+              <a:spcBef>
+                <a:spcPts val="500"/>
+              </a:spcBef>
+              <a:buFont typeface="Arial" panose="020B0604020202020204" pitchFamily="34" charset="0"/>
+              <a:buNone/>
+              <a:defRPr sz="1600" kern="1200">
+                <a:solidFill>
+                  <a:schemeClr val="tx1"/>
+                </a:solidFill>
+                <a:latin typeface="+mn-lt"/>
+                <a:ea typeface="+mn-ea"/>
+                <a:cs typeface="+mn-cs"/>
+              </a:defRPr>
+            </a:lvl6pPr>
+            <a:lvl7pPr marL="2743200" indent="0" algn="ctr" defTabSz="914400" rtl="0" eaLnBrk="1" latinLnBrk="0" hangingPunct="1">
+              <a:lnSpc>
+                <a:spcPct val="90000"/>
+              </a:lnSpc>
+              <a:spcBef>
+                <a:spcPts val="500"/>
+              </a:spcBef>
+              <a:buFont typeface="Arial" panose="020B0604020202020204" pitchFamily="34" charset="0"/>
+              <a:buNone/>
+              <a:defRPr sz="1600" kern="1200">
+                <a:solidFill>
+                  <a:schemeClr val="tx1"/>
+                </a:solidFill>
+                <a:latin typeface="+mn-lt"/>
+                <a:ea typeface="+mn-ea"/>
+                <a:cs typeface="+mn-cs"/>
+              </a:defRPr>
+            </a:lvl7pPr>
+            <a:lvl8pPr marL="3200400" indent="0" algn="ctr" defTabSz="914400" rtl="0" eaLnBrk="1" latinLnBrk="0" hangingPunct="1">
+              <a:lnSpc>
+                <a:spcPct val="90000"/>
+              </a:lnSpc>
+              <a:spcBef>
+                <a:spcPts val="500"/>
+              </a:spcBef>
+              <a:buFont typeface="Arial" panose="020B0604020202020204" pitchFamily="34" charset="0"/>
+              <a:buNone/>
+              <a:defRPr sz="1600" kern="1200">
+                <a:solidFill>
+                  <a:schemeClr val="tx1"/>
+                </a:solidFill>
+                <a:latin typeface="+mn-lt"/>
+                <a:ea typeface="+mn-ea"/>
+                <a:cs typeface="+mn-cs"/>
+              </a:defRPr>
+            </a:lvl8pPr>
+            <a:lvl9pPr marL="3657600" indent="0" algn="ctr" defTabSz="914400" rtl="0" eaLnBrk="1" latinLnBrk="0" hangingPunct="1">
+              <a:lnSpc>
+                <a:spcPct val="90000"/>
+              </a:lnSpc>
+              <a:spcBef>
+                <a:spcPts val="500"/>
+              </a:spcBef>
+              <a:buFont typeface="Arial" panose="020B0604020202020204" pitchFamily="34" charset="0"/>
+              <a:buNone/>
+              <a:defRPr sz="1600" kern="1200">
+                <a:solidFill>
+                  <a:schemeClr val="tx1"/>
+                </a:solidFill>
+                <a:latin typeface="+mn-lt"/>
+                <a:ea typeface="+mn-ea"/>
+                <a:cs typeface="+mn-cs"/>
+              </a:defRPr>
+            </a:lvl9pPr>
+          </a:lstStyle>
+          <a:p>
+            <a:r>
+              <a:rPr lang="en-GB" dirty="0">
+                <a:solidFill>
+                  <a:schemeClr val="tx1">
+                    <a:lumMod val="75000"/>
+                    <a:lumOff val="25000"/>
+                  </a:schemeClr>
+                </a:solidFill>
+                <a:latin typeface="Arial" panose="020B0604020202020204" pitchFamily="34" charset="0"/>
+                <a:cs typeface="Arial" panose="020B0604020202020204" pitchFamily="34" charset="0"/>
+              </a:rPr>
+              <a:t>(Showcase)</a:t>
+            </a:r>
+            <a:endParaRPr lang="en-GB" dirty="0"/>
+          </a:p>
+        </p:txBody>
+      </p:sp>
+    </p:spTree>
+    <p:extLst>
+      <p:ext uri="{BB962C8B-B14F-4D97-AF65-F5344CB8AC3E}">
+        <p14:creationId xmlns:p14="http://schemas.microsoft.com/office/powerpoint/2010/main" val="290176325"/>
+      </p:ext>
+    </p:extLst>
+  </p:cSld>
+  <p:clrMapOvr>
+    <a:masterClrMapping/>
+  </p:clrMapOvr>
+</p:sld>
+</file>
+
+<file path=ppt/slides/slide4.xml><?xml version="1.0" encoding="utf-8"?>
+<p:sld xmlns:a="http://schemas.openxmlformats.org/drawingml/2006/main" xmlns:r="http://schemas.openxmlformats.org/officeDocument/2006/relationships" xmlns:p="http://schemas.openxmlformats.org/presentationml/2006/main">
+  <p:cSld>
+    <p:spTree>
+      <p:nvGrpSpPr>
+        <p:cNvPr id="1" name=""/>
+        <p:cNvGrpSpPr/>
+        <p:nvPr/>
+      </p:nvGrpSpPr>
+      <p:grpSpPr>
+        <a:xfrm>
+          <a:off x="0" y="0"/>
+          <a:ext cx="0" cy="0"/>
+          <a:chOff x="0" y="0"/>
+          <a:chExt cx="0" cy="0"/>
+        </a:xfrm>
+      </p:grpSpPr>
+      <p:sp>
+        <p:nvSpPr>
+          <p:cNvPr id="2" name="Cím 1">
+            <a:extLst>
+              <a:ext uri="{FF2B5EF4-FFF2-40B4-BE49-F238E27FC236}">
+                <a16:creationId xmlns:a16="http://schemas.microsoft.com/office/drawing/2014/main" id="{C37C21C9-7C9C-4C95-BE06-301051055663}"/>
+              </a:ext>
+            </a:extLst>
+          </p:cNvPr>
+          <p:cNvSpPr>
+            <a:spLocks noGrp="1"/>
+          </p:cNvSpPr>
+          <p:nvPr>
+            <p:ph type="ctrTitle"/>
+          </p:nvPr>
+        </p:nvSpPr>
+        <p:spPr>
+          <a:xfrm>
+            <a:off x="1524000" y="67286"/>
+            <a:ext cx="9144000" cy="847114"/>
+          </a:xfrm>
+          <a:ln>
+            <a:noFill/>
+          </a:ln>
+        </p:spPr>
+        <p:txBody>
+          <a:bodyPr anchor="ctr">
+            <a:normAutofit fontScale="90000"/>
+          </a:bodyPr>
+          <a:lstStyle/>
+          <a:p>
+            <a:r>
+              <a:rPr lang="en-GB" sz="6000" dirty="0">
+                <a:solidFill>
+                  <a:schemeClr val="tx1">
+                    <a:lumMod val="75000"/>
+                    <a:lumOff val="25000"/>
+                  </a:schemeClr>
+                </a:solidFill>
+                <a:latin typeface="Arial" panose="020B0604020202020204" pitchFamily="34" charset="0"/>
+                <a:cs typeface="Arial" panose="020B0604020202020204" pitchFamily="34" charset="0"/>
+              </a:rPr>
+              <a:t>Backend showcase</a:t>
+            </a:r>
+            <a:endParaRPr lang="en-GB" dirty="0"/>
+          </a:p>
+        </p:txBody>
+      </p:sp>
+      <p:sp>
+        <p:nvSpPr>
+          <p:cNvPr id="3" name="Alcím 2">
+            <a:extLst>
+              <a:ext uri="{FF2B5EF4-FFF2-40B4-BE49-F238E27FC236}">
+                <a16:creationId xmlns:a16="http://schemas.microsoft.com/office/drawing/2014/main" id="{2C955F0C-2D0A-42E1-9674-A9AFB46D7175}"/>
+              </a:ext>
+            </a:extLst>
+          </p:cNvPr>
+          <p:cNvSpPr>
+            <a:spLocks noGrp="1"/>
+          </p:cNvSpPr>
+          <p:nvPr>
+            <p:ph type="subTitle" idx="1"/>
+          </p:nvPr>
+        </p:nvSpPr>
+        <p:spPr>
+          <a:xfrm>
+            <a:off x="1524000" y="933633"/>
+            <a:ext cx="9144000" cy="545352"/>
+          </a:xfrm>
+        </p:spPr>
+        <p:txBody>
+          <a:bodyPr>
+            <a:normAutofit lnSpcReduction="10000"/>
+          </a:bodyPr>
+          <a:lstStyle/>
+          <a:p>
+            <a:r>
+              <a:rPr lang="en-GB" sz="3600" dirty="0">
+                <a:solidFill>
+                  <a:schemeClr val="tx1">
+                    <a:lumMod val="75000"/>
+                    <a:lumOff val="25000"/>
+                  </a:schemeClr>
+                </a:solidFill>
+                <a:latin typeface="Arial" panose="020B0604020202020204" pitchFamily="34" charset="0"/>
+                <a:cs typeface="Arial" panose="020B0604020202020204" pitchFamily="34" charset="0"/>
+              </a:rPr>
+              <a:t>Register &amp; Verify Account</a:t>
+            </a:r>
+            <a:endParaRPr lang="en-GB" sz="3600" dirty="0"/>
+          </a:p>
+        </p:txBody>
+      </p:sp>
+      <p:cxnSp>
+        <p:nvCxnSpPr>
+          <p:cNvPr id="5" name="Egyenes összekötő 4">
+            <a:extLst>
+              <a:ext uri="{FF2B5EF4-FFF2-40B4-BE49-F238E27FC236}">
+                <a16:creationId xmlns:a16="http://schemas.microsoft.com/office/drawing/2014/main" id="{67B72B84-2E81-4645-92BA-59A24301A3AF}"/>
+              </a:ext>
+            </a:extLst>
+          </p:cNvPr>
+          <p:cNvCxnSpPr>
+            <a:cxnSpLocks/>
+          </p:cNvCxnSpPr>
+          <p:nvPr/>
+        </p:nvCxnSpPr>
+        <p:spPr>
+          <a:xfrm>
+            <a:off x="3167406" y="914400"/>
+            <a:ext cx="5863472" cy="0"/>
+          </a:xfrm>
+          <a:prstGeom prst="line">
+            <a:avLst/>
+          </a:prstGeom>
+          <a:ln w="25400">
+            <a:solidFill>
+              <a:schemeClr val="tx1">
+                <a:lumMod val="50000"/>
+                <a:lumOff val="50000"/>
+              </a:schemeClr>
+            </a:solidFill>
+          </a:ln>
+        </p:spPr>
+        <p:style>
+          <a:lnRef idx="1">
+            <a:schemeClr val="accent1"/>
+          </a:lnRef>
+          <a:fillRef idx="0">
+            <a:schemeClr val="accent1"/>
+          </a:fillRef>
+          <a:effectRef idx="0">
+            <a:schemeClr val="accent1"/>
+          </a:effectRef>
+          <a:fontRef idx="minor">
+            <a:schemeClr val="tx1"/>
+          </a:fontRef>
+        </p:style>
+      </p:cxnSp>
+      <p:sp>
+        <p:nvSpPr>
+          <p:cNvPr id="19" name="Alcím 2">
+            <a:extLst>
+              <a:ext uri="{FF2B5EF4-FFF2-40B4-BE49-F238E27FC236}">
+                <a16:creationId xmlns:a16="http://schemas.microsoft.com/office/drawing/2014/main" id="{E0570FEA-9BAE-45BD-BE2E-95F1E84F7C7C}"/>
+              </a:ext>
+            </a:extLst>
+          </p:cNvPr>
+          <p:cNvSpPr txBox="1">
+            <a:spLocks/>
+          </p:cNvSpPr>
+          <p:nvPr/>
+        </p:nvSpPr>
+        <p:spPr>
+          <a:xfrm>
+            <a:off x="1524000" y="1362626"/>
+            <a:ext cx="9144000" cy="398888"/>
+          </a:xfrm>
+          <a:prstGeom prst="rect">
+            <a:avLst/>
+          </a:prstGeom>
+        </p:spPr>
+        <p:txBody>
+          <a:bodyPr vert="horz" lIns="91440" tIns="45720" rIns="91440" bIns="45720" rtlCol="0">
+            <a:normAutofit lnSpcReduction="10000"/>
+          </a:bodyPr>
+          <a:lstStyle>
+            <a:lvl1pPr marL="0" indent="0" algn="ctr" defTabSz="914400" rtl="0" eaLnBrk="1" latinLnBrk="0" hangingPunct="1">
+              <a:lnSpc>
+                <a:spcPct val="90000"/>
+              </a:lnSpc>
+              <a:spcBef>
+                <a:spcPts val="1000"/>
+              </a:spcBef>
+              <a:buFont typeface="Arial" panose="020B0604020202020204" pitchFamily="34" charset="0"/>
+              <a:buNone/>
+              <a:defRPr sz="2400" kern="1200">
+                <a:solidFill>
+                  <a:schemeClr val="tx1"/>
+                </a:solidFill>
+                <a:latin typeface="+mn-lt"/>
+                <a:ea typeface="+mn-ea"/>
+                <a:cs typeface="+mn-cs"/>
+              </a:defRPr>
+            </a:lvl1pPr>
+            <a:lvl2pPr marL="457200" indent="0" algn="ctr" defTabSz="914400" rtl="0" eaLnBrk="1" latinLnBrk="0" hangingPunct="1">
+              <a:lnSpc>
+                <a:spcPct val="90000"/>
+              </a:lnSpc>
+              <a:spcBef>
+                <a:spcPts val="500"/>
+              </a:spcBef>
+              <a:buFont typeface="Arial" panose="020B0604020202020204" pitchFamily="34" charset="0"/>
+              <a:buNone/>
+              <a:defRPr sz="2000" kern="1200">
+                <a:solidFill>
+                  <a:schemeClr val="tx1"/>
+                </a:solidFill>
+                <a:latin typeface="+mn-lt"/>
+                <a:ea typeface="+mn-ea"/>
+                <a:cs typeface="+mn-cs"/>
+              </a:defRPr>
+            </a:lvl2pPr>
+            <a:lvl3pPr marL="914400" indent="0" algn="ctr" defTabSz="914400" rtl="0" eaLnBrk="1" latinLnBrk="0" hangingPunct="1">
+              <a:lnSpc>
+                <a:spcPct val="90000"/>
+              </a:lnSpc>
+              <a:spcBef>
+                <a:spcPts val="500"/>
+              </a:spcBef>
+              <a:buFont typeface="Arial" panose="020B0604020202020204" pitchFamily="34" charset="0"/>
+              <a:buNone/>
+              <a:defRPr sz="1800" kern="1200">
+                <a:solidFill>
+                  <a:schemeClr val="tx1"/>
+                </a:solidFill>
+                <a:latin typeface="+mn-lt"/>
+                <a:ea typeface="+mn-ea"/>
+                <a:cs typeface="+mn-cs"/>
+              </a:defRPr>
+            </a:lvl3pPr>
+            <a:lvl4pPr marL="1371600" indent="0" algn="ctr" defTabSz="914400" rtl="0" eaLnBrk="1" latinLnBrk="0" hangingPunct="1">
+              <a:lnSpc>
+                <a:spcPct val="90000"/>
+              </a:lnSpc>
+              <a:spcBef>
+                <a:spcPts val="500"/>
+              </a:spcBef>
+              <a:buFont typeface="Arial" panose="020B0604020202020204" pitchFamily="34" charset="0"/>
+              <a:buNone/>
+              <a:defRPr sz="1600" kern="1200">
+                <a:solidFill>
+                  <a:schemeClr val="tx1"/>
+                </a:solidFill>
+                <a:latin typeface="+mn-lt"/>
+                <a:ea typeface="+mn-ea"/>
+                <a:cs typeface="+mn-cs"/>
+              </a:defRPr>
+            </a:lvl4pPr>
+            <a:lvl5pPr marL="1828800" indent="0" algn="ctr" defTabSz="914400" rtl="0" eaLnBrk="1" latinLnBrk="0" hangingPunct="1">
+              <a:lnSpc>
+                <a:spcPct val="90000"/>
+              </a:lnSpc>
+              <a:spcBef>
+                <a:spcPts val="500"/>
+              </a:spcBef>
+              <a:buFont typeface="Arial" panose="020B0604020202020204" pitchFamily="34" charset="0"/>
+              <a:buNone/>
+              <a:defRPr sz="1600" kern="1200">
+                <a:solidFill>
+                  <a:schemeClr val="tx1"/>
+                </a:solidFill>
+                <a:latin typeface="+mn-lt"/>
+                <a:ea typeface="+mn-ea"/>
+                <a:cs typeface="+mn-cs"/>
+              </a:defRPr>
+            </a:lvl5pPr>
+            <a:lvl6pPr marL="2286000" indent="0" algn="ctr" defTabSz="914400" rtl="0" eaLnBrk="1" latinLnBrk="0" hangingPunct="1">
+              <a:lnSpc>
+                <a:spcPct val="90000"/>
+              </a:lnSpc>
+              <a:spcBef>
+                <a:spcPts val="500"/>
+              </a:spcBef>
+              <a:buFont typeface="Arial" panose="020B0604020202020204" pitchFamily="34" charset="0"/>
+              <a:buNone/>
+              <a:defRPr sz="1600" kern="1200">
+                <a:solidFill>
+                  <a:schemeClr val="tx1"/>
+                </a:solidFill>
+                <a:latin typeface="+mn-lt"/>
+                <a:ea typeface="+mn-ea"/>
+                <a:cs typeface="+mn-cs"/>
+              </a:defRPr>
+            </a:lvl6pPr>
+            <a:lvl7pPr marL="2743200" indent="0" algn="ctr" defTabSz="914400" rtl="0" eaLnBrk="1" latinLnBrk="0" hangingPunct="1">
+              <a:lnSpc>
+                <a:spcPct val="90000"/>
+              </a:lnSpc>
+              <a:spcBef>
+                <a:spcPts val="500"/>
+              </a:spcBef>
+              <a:buFont typeface="Arial" panose="020B0604020202020204" pitchFamily="34" charset="0"/>
+              <a:buNone/>
+              <a:defRPr sz="1600" kern="1200">
+                <a:solidFill>
+                  <a:schemeClr val="tx1"/>
+                </a:solidFill>
+                <a:latin typeface="+mn-lt"/>
+                <a:ea typeface="+mn-ea"/>
+                <a:cs typeface="+mn-cs"/>
+              </a:defRPr>
+            </a:lvl7pPr>
+            <a:lvl8pPr marL="3200400" indent="0" algn="ctr" defTabSz="914400" rtl="0" eaLnBrk="1" latinLnBrk="0" hangingPunct="1">
+              <a:lnSpc>
+                <a:spcPct val="90000"/>
+              </a:lnSpc>
+              <a:spcBef>
+                <a:spcPts val="500"/>
+              </a:spcBef>
+              <a:buFont typeface="Arial" panose="020B0604020202020204" pitchFamily="34" charset="0"/>
+              <a:buNone/>
+              <a:defRPr sz="1600" kern="1200">
+                <a:solidFill>
+                  <a:schemeClr val="tx1"/>
+                </a:solidFill>
+                <a:latin typeface="+mn-lt"/>
+                <a:ea typeface="+mn-ea"/>
+                <a:cs typeface="+mn-cs"/>
+              </a:defRPr>
+            </a:lvl8pPr>
+            <a:lvl9pPr marL="3657600" indent="0" algn="ctr" defTabSz="914400" rtl="0" eaLnBrk="1" latinLnBrk="0" hangingPunct="1">
+              <a:lnSpc>
+                <a:spcPct val="90000"/>
+              </a:lnSpc>
+              <a:spcBef>
+                <a:spcPts val="500"/>
+              </a:spcBef>
+              <a:buFont typeface="Arial" panose="020B0604020202020204" pitchFamily="34" charset="0"/>
+              <a:buNone/>
+              <a:defRPr sz="1600" kern="1200">
+                <a:solidFill>
+                  <a:schemeClr val="tx1"/>
+                </a:solidFill>
+                <a:latin typeface="+mn-lt"/>
+                <a:ea typeface="+mn-ea"/>
+                <a:cs typeface="+mn-cs"/>
+              </a:defRPr>
+            </a:lvl9pPr>
+          </a:lstStyle>
+          <a:p>
+            <a:r>
+              <a:rPr lang="en-GB" dirty="0">
+                <a:solidFill>
+                  <a:schemeClr val="tx1">
+                    <a:lumMod val="75000"/>
+                    <a:lumOff val="25000"/>
+                  </a:schemeClr>
+                </a:solidFill>
+                <a:latin typeface="Arial" panose="020B0604020202020204" pitchFamily="34" charset="0"/>
+                <a:cs typeface="Arial" panose="020B0604020202020204" pitchFamily="34" charset="0"/>
+              </a:rPr>
+              <a:t>(Code)</a:t>
+            </a:r>
+            <a:endParaRPr lang="en-GB" dirty="0"/>
+          </a:p>
+        </p:txBody>
+      </p:sp>
+      <p:pic>
+        <p:nvPicPr>
+          <p:cNvPr id="9" name="Kép 8" descr="A képen szöveg látható&#10;&#10;Automatikusan generált leírás">
+            <a:extLst>
+              <a:ext uri="{FF2B5EF4-FFF2-40B4-BE49-F238E27FC236}">
+                <a16:creationId xmlns:a16="http://schemas.microsoft.com/office/drawing/2014/main" id="{E2888EDE-36FE-445E-8275-3B64F8AA456B}"/>
+              </a:ext>
+            </a:extLst>
+          </p:cNvPr>
+          <p:cNvPicPr>
+            <a:picLocks noChangeAspect="1"/>
+          </p:cNvPicPr>
+          <p:nvPr/>
+        </p:nvPicPr>
+        <p:blipFill rotWithShape="1">
+          <a:blip r:embed="rId2">
+            <a:extLst>
+              <a:ext uri="{28A0092B-C50C-407E-A947-70E740481C1C}">
+                <a14:useLocalDpi xmlns:a14="http://schemas.microsoft.com/office/drawing/2010/main" val="0"/>
+              </a:ext>
+            </a:extLst>
+          </a:blip>
+          <a:srcRect t="-200" b="19836"/>
+          <a:stretch/>
+        </p:blipFill>
+        <p:spPr>
+          <a:xfrm>
+            <a:off x="6381535" y="1761514"/>
+            <a:ext cx="5210902" cy="1768476"/>
+          </a:xfrm>
+          <a:prstGeom prst="rect">
+            <a:avLst/>
+          </a:prstGeom>
+          <a:effectLst>
+            <a:outerShdw blurRad="63500" sx="102000" sy="102000" algn="ctr" rotWithShape="0">
+              <a:schemeClr val="bg1">
+                <a:lumMod val="50000"/>
+                <a:alpha val="40000"/>
+              </a:schemeClr>
+            </a:outerShdw>
+          </a:effectLst>
+        </p:spPr>
+      </p:pic>
+      <p:pic>
+        <p:nvPicPr>
+          <p:cNvPr id="12" name="Kép 11" descr="A képen szöveg látható&#10;&#10;Automatikusan generált leírás">
+            <a:extLst>
+              <a:ext uri="{FF2B5EF4-FFF2-40B4-BE49-F238E27FC236}">
+                <a16:creationId xmlns:a16="http://schemas.microsoft.com/office/drawing/2014/main" id="{F201B88F-61FD-4AFF-8A24-0546F251A2CE}"/>
+              </a:ext>
+            </a:extLst>
+          </p:cNvPr>
+          <p:cNvPicPr>
+            <a:picLocks noChangeAspect="1"/>
+          </p:cNvPicPr>
+          <p:nvPr/>
+        </p:nvPicPr>
+        <p:blipFill>
+          <a:blip r:embed="rId3">
+            <a:extLst>
+              <a:ext uri="{28A0092B-C50C-407E-A947-70E740481C1C}">
+                <a14:useLocalDpi xmlns:a14="http://schemas.microsoft.com/office/drawing/2010/main" val="0"/>
+              </a:ext>
+            </a:extLst>
+          </a:blip>
+          <a:stretch>
+            <a:fillRect/>
+          </a:stretch>
+        </p:blipFill>
+        <p:spPr>
+          <a:xfrm>
+            <a:off x="3014232" y="4006751"/>
+            <a:ext cx="6163535" cy="2476846"/>
+          </a:xfrm>
+          <a:prstGeom prst="rect">
+            <a:avLst/>
+          </a:prstGeom>
+          <a:effectLst>
+            <a:outerShdw blurRad="63500" sx="102000" sy="102000" algn="ctr" rotWithShape="0">
+              <a:schemeClr val="bg1">
+                <a:lumMod val="50000"/>
+                <a:alpha val="40000"/>
+              </a:schemeClr>
+            </a:outerShdw>
+          </a:effectLst>
+        </p:spPr>
+      </p:pic>
+      <p:pic>
+        <p:nvPicPr>
+          <p:cNvPr id="14" name="Kép 13" descr="A képen szöveg látható&#10;&#10;Automatikusan generált leírás">
+            <a:extLst>
+              <a:ext uri="{FF2B5EF4-FFF2-40B4-BE49-F238E27FC236}">
+                <a16:creationId xmlns:a16="http://schemas.microsoft.com/office/drawing/2014/main" id="{EC4DEF3E-70B6-42E1-801B-2683CB2FC03A}"/>
+              </a:ext>
+            </a:extLst>
+          </p:cNvPr>
+          <p:cNvPicPr>
+            <a:picLocks noChangeAspect="1"/>
+          </p:cNvPicPr>
+          <p:nvPr/>
+        </p:nvPicPr>
+        <p:blipFill rotWithShape="1">
+          <a:blip r:embed="rId4">
+            <a:extLst>
+              <a:ext uri="{28A0092B-C50C-407E-A947-70E740481C1C}">
+                <a14:useLocalDpi xmlns:a14="http://schemas.microsoft.com/office/drawing/2010/main" val="0"/>
+              </a:ext>
+            </a:extLst>
+          </a:blip>
+          <a:srcRect l="1" r="28961"/>
+          <a:stretch/>
+        </p:blipFill>
+        <p:spPr>
+          <a:xfrm>
+            <a:off x="599563" y="1761514"/>
+            <a:ext cx="5210903" cy="1768476"/>
+          </a:xfrm>
+          <a:prstGeom prst="rect">
+            <a:avLst/>
+          </a:prstGeom>
+          <a:effectLst>
+            <a:outerShdw blurRad="63500" sx="102000" sy="102000" algn="ctr" rotWithShape="0">
+              <a:schemeClr val="bg1">
+                <a:lumMod val="50000"/>
+                <a:alpha val="40000"/>
+              </a:schemeClr>
+            </a:outerShdw>
+          </a:effectLst>
+        </p:spPr>
+      </p:pic>
+      <p:sp>
+        <p:nvSpPr>
+          <p:cNvPr id="16" name="Nyíl: jobbra mutató 15">
+            <a:extLst>
+              <a:ext uri="{FF2B5EF4-FFF2-40B4-BE49-F238E27FC236}">
+                <a16:creationId xmlns:a16="http://schemas.microsoft.com/office/drawing/2014/main" id="{A235FFDA-5BBC-4CC6-9CC7-24A4D5D0299B}"/>
+              </a:ext>
+            </a:extLst>
+          </p:cNvPr>
+          <p:cNvSpPr/>
+          <p:nvPr/>
+        </p:nvSpPr>
+        <p:spPr>
+          <a:xfrm>
+            <a:off x="5884103" y="2460396"/>
+            <a:ext cx="423795" cy="398888"/>
+          </a:xfrm>
+          <a:prstGeom prst="rightArrow">
+            <a:avLst/>
+          </a:prstGeom>
+          <a:solidFill>
+            <a:srgbClr val="92D050"/>
+          </a:solidFill>
+          <a:ln w="28575">
+            <a:solidFill>
+              <a:schemeClr val="tx1"/>
+            </a:solidFill>
+          </a:ln>
+        </p:spPr>
+        <p:style>
+          <a:lnRef idx="2">
+            <a:schemeClr val="accent1">
+              <a:shade val="50000"/>
+            </a:schemeClr>
+          </a:lnRef>
+          <a:fillRef idx="1">
+            <a:schemeClr val="accent1"/>
+          </a:fillRef>
+          <a:effectRef idx="0">
+            <a:schemeClr val="accent1"/>
+          </a:effectRef>
+          <a:fontRef idx="minor">
+            <a:schemeClr val="lt1"/>
+          </a:fontRef>
+        </p:style>
+        <p:txBody>
+          <a:bodyPr rtlCol="0" anchor="ctr"/>
+          <a:lstStyle/>
+          <a:p>
+            <a:pPr algn="ctr"/>
+            <a:endParaRPr lang="en-GB"/>
+          </a:p>
+        </p:txBody>
+      </p:sp>
+      <p:sp>
+        <p:nvSpPr>
+          <p:cNvPr id="20" name="Nyíl: jobbra mutató 19">
+            <a:extLst>
+              <a:ext uri="{FF2B5EF4-FFF2-40B4-BE49-F238E27FC236}">
+                <a16:creationId xmlns:a16="http://schemas.microsoft.com/office/drawing/2014/main" id="{55EDEF9D-9E99-4F09-B0D0-96F8BF20EA18}"/>
+              </a:ext>
+            </a:extLst>
+          </p:cNvPr>
+          <p:cNvSpPr/>
+          <p:nvPr/>
+        </p:nvSpPr>
+        <p:spPr>
+          <a:xfrm rot="5400000">
+            <a:off x="8484621" y="3568927"/>
+            <a:ext cx="423795" cy="398888"/>
+          </a:xfrm>
+          <a:prstGeom prst="rightArrow">
+            <a:avLst/>
+          </a:prstGeom>
+          <a:solidFill>
+            <a:srgbClr val="92D050"/>
+          </a:solidFill>
+          <a:ln w="28575">
+            <a:solidFill>
+              <a:schemeClr val="tx1"/>
+            </a:solidFill>
+          </a:ln>
+        </p:spPr>
+        <p:style>
+          <a:lnRef idx="2">
+            <a:schemeClr val="accent1">
+              <a:shade val="50000"/>
+            </a:schemeClr>
+          </a:lnRef>
+          <a:fillRef idx="1">
+            <a:schemeClr val="accent1"/>
+          </a:fillRef>
+          <a:effectRef idx="0">
+            <a:schemeClr val="accent1"/>
+          </a:effectRef>
+          <a:fontRef idx="minor">
+            <a:schemeClr val="lt1"/>
+          </a:fontRef>
+        </p:style>
+        <p:txBody>
+          <a:bodyPr rtlCol="0" anchor="ctr"/>
+          <a:lstStyle/>
+          <a:p>
+            <a:pPr algn="ctr"/>
+            <a:endParaRPr lang="en-GB"/>
+          </a:p>
+        </p:txBody>
+      </p:sp>
+    </p:spTree>
+    <p:extLst>
+      <p:ext uri="{BB962C8B-B14F-4D97-AF65-F5344CB8AC3E}">
+        <p14:creationId xmlns:p14="http://schemas.microsoft.com/office/powerpoint/2010/main" val="2372180978"/>
       </p:ext>
     </p:extLst>
   </p:cSld>

</xml_diff>

<commit_message>
backend progression - login & auth
</commit_message>
<xml_diff>
--- a/Documentations/NasaPC_WebShopProject.pptx
+++ b/Documentations/NasaPC_WebShopProject.pptx
@@ -5,14 +5,16 @@
     <p:sldMasterId id="2147483660" r:id="rId1"/>
   </p:sldMasterIdLst>
   <p:notesMasterIdLst>
-    <p:notesMasterId r:id="rId7"/>
+    <p:notesMasterId r:id="rId9"/>
   </p:notesMasterIdLst>
   <p:sldIdLst>
     <p:sldId id="257" r:id="rId2"/>
     <p:sldId id="259" r:id="rId3"/>
     <p:sldId id="260" r:id="rId4"/>
     <p:sldId id="261" r:id="rId5"/>
-    <p:sldId id="262" r:id="rId6"/>
+    <p:sldId id="263" r:id="rId6"/>
+    <p:sldId id="269" r:id="rId7"/>
+    <p:sldId id="270" r:id="rId8"/>
   </p:sldIdLst>
   <p:sldSz cx="12192000" cy="6858000"/>
   <p:notesSz cx="6858000" cy="9144000"/>
@@ -6507,7 +6509,7 @@
               <a:t>&amp; </a:t>
             </a:r>
             <a:r>
-              <a:rPr lang="hu-HU" sz="3600" dirty="0" err="1" smtClean="0">
+              <a:rPr lang="hu-HU" sz="3600" dirty="0" smtClean="0">
                 <a:solidFill>
                   <a:schemeClr val="tx1">
                     <a:lumMod val="75000"/>
@@ -6569,15 +6571,218 @@
           </a:fontRef>
         </p:style>
       </p:cxnSp>
+      <p:sp>
+        <p:nvSpPr>
+          <p:cNvPr id="19" name="Alcím 2">
+            <a:extLst>
+              <a:ext uri="{FF2B5EF4-FFF2-40B4-BE49-F238E27FC236}">
+                <a16:creationId xmlns:a16="http://schemas.microsoft.com/office/drawing/2014/main" id="{E0570FEA-9BAE-45BD-BE2E-95F1E84F7C7C}"/>
+              </a:ext>
+            </a:extLst>
+          </p:cNvPr>
+          <p:cNvSpPr txBox="1">
+            <a:spLocks/>
+          </p:cNvSpPr>
+          <p:nvPr/>
+        </p:nvSpPr>
+        <p:spPr>
+          <a:xfrm>
+            <a:off x="1524000" y="1362626"/>
+            <a:ext cx="9144000" cy="398888"/>
+          </a:xfrm>
+          <a:prstGeom prst="rect">
+            <a:avLst/>
+          </a:prstGeom>
+        </p:spPr>
+        <p:txBody>
+          <a:bodyPr vert="horz" lIns="91440" tIns="45720" rIns="91440" bIns="45720" rtlCol="0">
+            <a:normAutofit lnSpcReduction="10000"/>
+          </a:bodyPr>
+          <a:lstStyle>
+            <a:lvl1pPr marL="0" indent="0" algn="ctr" defTabSz="914400" rtl="0" eaLnBrk="1" latinLnBrk="0" hangingPunct="1">
+              <a:lnSpc>
+                <a:spcPct val="90000"/>
+              </a:lnSpc>
+              <a:spcBef>
+                <a:spcPts val="1000"/>
+              </a:spcBef>
+              <a:buFont typeface="Arial" panose="020B0604020202020204" pitchFamily="34" charset="0"/>
+              <a:buNone/>
+              <a:defRPr sz="2400" kern="1200">
+                <a:solidFill>
+                  <a:schemeClr val="tx1"/>
+                </a:solidFill>
+                <a:latin typeface="+mn-lt"/>
+                <a:ea typeface="+mn-ea"/>
+                <a:cs typeface="+mn-cs"/>
+              </a:defRPr>
+            </a:lvl1pPr>
+            <a:lvl2pPr marL="457200" indent="0" algn="ctr" defTabSz="914400" rtl="0" eaLnBrk="1" latinLnBrk="0" hangingPunct="1">
+              <a:lnSpc>
+                <a:spcPct val="90000"/>
+              </a:lnSpc>
+              <a:spcBef>
+                <a:spcPts val="500"/>
+              </a:spcBef>
+              <a:buFont typeface="Arial" panose="020B0604020202020204" pitchFamily="34" charset="0"/>
+              <a:buNone/>
+              <a:defRPr sz="2000" kern="1200">
+                <a:solidFill>
+                  <a:schemeClr val="tx1"/>
+                </a:solidFill>
+                <a:latin typeface="+mn-lt"/>
+                <a:ea typeface="+mn-ea"/>
+                <a:cs typeface="+mn-cs"/>
+              </a:defRPr>
+            </a:lvl2pPr>
+            <a:lvl3pPr marL="914400" indent="0" algn="ctr" defTabSz="914400" rtl="0" eaLnBrk="1" latinLnBrk="0" hangingPunct="1">
+              <a:lnSpc>
+                <a:spcPct val="90000"/>
+              </a:lnSpc>
+              <a:spcBef>
+                <a:spcPts val="500"/>
+              </a:spcBef>
+              <a:buFont typeface="Arial" panose="020B0604020202020204" pitchFamily="34" charset="0"/>
+              <a:buNone/>
+              <a:defRPr sz="1800" kern="1200">
+                <a:solidFill>
+                  <a:schemeClr val="tx1"/>
+                </a:solidFill>
+                <a:latin typeface="+mn-lt"/>
+                <a:ea typeface="+mn-ea"/>
+                <a:cs typeface="+mn-cs"/>
+              </a:defRPr>
+            </a:lvl3pPr>
+            <a:lvl4pPr marL="1371600" indent="0" algn="ctr" defTabSz="914400" rtl="0" eaLnBrk="1" latinLnBrk="0" hangingPunct="1">
+              <a:lnSpc>
+                <a:spcPct val="90000"/>
+              </a:lnSpc>
+              <a:spcBef>
+                <a:spcPts val="500"/>
+              </a:spcBef>
+              <a:buFont typeface="Arial" panose="020B0604020202020204" pitchFamily="34" charset="0"/>
+              <a:buNone/>
+              <a:defRPr sz="1600" kern="1200">
+                <a:solidFill>
+                  <a:schemeClr val="tx1"/>
+                </a:solidFill>
+                <a:latin typeface="+mn-lt"/>
+                <a:ea typeface="+mn-ea"/>
+                <a:cs typeface="+mn-cs"/>
+              </a:defRPr>
+            </a:lvl4pPr>
+            <a:lvl5pPr marL="1828800" indent="0" algn="ctr" defTabSz="914400" rtl="0" eaLnBrk="1" latinLnBrk="0" hangingPunct="1">
+              <a:lnSpc>
+                <a:spcPct val="90000"/>
+              </a:lnSpc>
+              <a:spcBef>
+                <a:spcPts val="500"/>
+              </a:spcBef>
+              <a:buFont typeface="Arial" panose="020B0604020202020204" pitchFamily="34" charset="0"/>
+              <a:buNone/>
+              <a:defRPr sz="1600" kern="1200">
+                <a:solidFill>
+                  <a:schemeClr val="tx1"/>
+                </a:solidFill>
+                <a:latin typeface="+mn-lt"/>
+                <a:ea typeface="+mn-ea"/>
+                <a:cs typeface="+mn-cs"/>
+              </a:defRPr>
+            </a:lvl5pPr>
+            <a:lvl6pPr marL="2286000" indent="0" algn="ctr" defTabSz="914400" rtl="0" eaLnBrk="1" latinLnBrk="0" hangingPunct="1">
+              <a:lnSpc>
+                <a:spcPct val="90000"/>
+              </a:lnSpc>
+              <a:spcBef>
+                <a:spcPts val="500"/>
+              </a:spcBef>
+              <a:buFont typeface="Arial" panose="020B0604020202020204" pitchFamily="34" charset="0"/>
+              <a:buNone/>
+              <a:defRPr sz="1600" kern="1200">
+                <a:solidFill>
+                  <a:schemeClr val="tx1"/>
+                </a:solidFill>
+                <a:latin typeface="+mn-lt"/>
+                <a:ea typeface="+mn-ea"/>
+                <a:cs typeface="+mn-cs"/>
+              </a:defRPr>
+            </a:lvl6pPr>
+            <a:lvl7pPr marL="2743200" indent="0" algn="ctr" defTabSz="914400" rtl="0" eaLnBrk="1" latinLnBrk="0" hangingPunct="1">
+              <a:lnSpc>
+                <a:spcPct val="90000"/>
+              </a:lnSpc>
+              <a:spcBef>
+                <a:spcPts val="500"/>
+              </a:spcBef>
+              <a:buFont typeface="Arial" panose="020B0604020202020204" pitchFamily="34" charset="0"/>
+              <a:buNone/>
+              <a:defRPr sz="1600" kern="1200">
+                <a:solidFill>
+                  <a:schemeClr val="tx1"/>
+                </a:solidFill>
+                <a:latin typeface="+mn-lt"/>
+                <a:ea typeface="+mn-ea"/>
+                <a:cs typeface="+mn-cs"/>
+              </a:defRPr>
+            </a:lvl7pPr>
+            <a:lvl8pPr marL="3200400" indent="0" algn="ctr" defTabSz="914400" rtl="0" eaLnBrk="1" latinLnBrk="0" hangingPunct="1">
+              <a:lnSpc>
+                <a:spcPct val="90000"/>
+              </a:lnSpc>
+              <a:spcBef>
+                <a:spcPts val="500"/>
+              </a:spcBef>
+              <a:buFont typeface="Arial" panose="020B0604020202020204" pitchFamily="34" charset="0"/>
+              <a:buNone/>
+              <a:defRPr sz="1600" kern="1200">
+                <a:solidFill>
+                  <a:schemeClr val="tx1"/>
+                </a:solidFill>
+                <a:latin typeface="+mn-lt"/>
+                <a:ea typeface="+mn-ea"/>
+                <a:cs typeface="+mn-cs"/>
+              </a:defRPr>
+            </a:lvl8pPr>
+            <a:lvl9pPr marL="3657600" indent="0" algn="ctr" defTabSz="914400" rtl="0" eaLnBrk="1" latinLnBrk="0" hangingPunct="1">
+              <a:lnSpc>
+                <a:spcPct val="90000"/>
+              </a:lnSpc>
+              <a:spcBef>
+                <a:spcPts val="500"/>
+              </a:spcBef>
+              <a:buFont typeface="Arial" panose="020B0604020202020204" pitchFamily="34" charset="0"/>
+              <a:buNone/>
+              <a:defRPr sz="1600" kern="1200">
+                <a:solidFill>
+                  <a:schemeClr val="tx1"/>
+                </a:solidFill>
+                <a:latin typeface="+mn-lt"/>
+                <a:ea typeface="+mn-ea"/>
+                <a:cs typeface="+mn-cs"/>
+              </a:defRPr>
+            </a:lvl9pPr>
+          </a:lstStyle>
+          <a:p>
+            <a:r>
+              <a:rPr lang="en-GB" dirty="0">
+                <a:solidFill>
+                  <a:schemeClr val="tx1">
+                    <a:lumMod val="75000"/>
+                    <a:lumOff val="25000"/>
+                  </a:schemeClr>
+                </a:solidFill>
+                <a:latin typeface="Arial" panose="020B0604020202020204" pitchFamily="34" charset="0"/>
+                <a:cs typeface="Arial" panose="020B0604020202020204" pitchFamily="34" charset="0"/>
+              </a:rPr>
+              <a:t>(Showcase)</a:t>
+            </a:r>
+            <a:endParaRPr lang="en-GB" dirty="0"/>
+          </a:p>
+        </p:txBody>
+      </p:sp>
       <p:pic>
         <p:nvPicPr>
-          <p:cNvPr id="6" name="Kép 5" descr="A képen szöveg látható&#10;&#10;Automatikusan generált leírás">
-            <a:extLst>
-              <a:ext uri="{FF2B5EF4-FFF2-40B4-BE49-F238E27FC236}">
-                <a16:creationId xmlns:a16="http://schemas.microsoft.com/office/drawing/2014/main" id="{5422F4C5-3618-4295-86B4-3650F2475BEF}"/>
-              </a:ext>
-            </a:extLst>
-          </p:cNvPr>
+          <p:cNvPr id="8" name="Kép 7"/>
           <p:cNvPicPr>
             <a:picLocks noChangeAspect="1"/>
           </p:cNvPicPr>
@@ -6591,13 +6796,13 @@
               </a:ext>
             </a:extLst>
           </a:blip>
-          <a:srcRect b="17443"/>
+          <a:srcRect b="4537"/>
           <a:stretch/>
         </p:blipFill>
-        <p:spPr bwMode="auto">
+        <p:spPr>
           <a:xfrm>
-            <a:off x="555115" y="2027213"/>
-            <a:ext cx="5038725" cy="2374810"/>
+            <a:off x="6498302" y="1907978"/>
+            <a:ext cx="5028407" cy="2088000"/>
           </a:xfrm>
           <a:prstGeom prst="rect">
             <a:avLst/>
@@ -6614,15 +6819,9 @@
       </p:pic>
       <p:pic>
         <p:nvPicPr>
-          <p:cNvPr id="11" name="Kép 10">
-            <a:extLst>
-              <a:ext uri="{FF2B5EF4-FFF2-40B4-BE49-F238E27FC236}">
-                <a16:creationId xmlns:a16="http://schemas.microsoft.com/office/drawing/2014/main" id="{C2E2FF05-73BE-4AAD-92DE-0C68B06F3758}"/>
-              </a:ext>
-            </a:extLst>
-          </p:cNvPr>
+          <p:cNvPr id="15" name="Kép 14"/>
           <p:cNvPicPr>
-            <a:picLocks noChangeAspect="1"/>
+            <a:picLocks/>
           </p:cNvPicPr>
           <p:nvPr/>
         </p:nvPicPr>
@@ -6634,62 +6833,13 @@
               </a:ext>
             </a:extLst>
           </a:blip>
-          <a:srcRect t="1827" b="25330"/>
+          <a:srcRect t="50023" r="13547" b="23026"/>
           <a:stretch/>
-        </p:blipFill>
-        <p:spPr bwMode="auto">
-          <a:xfrm>
-            <a:off x="6510880" y="5096487"/>
-            <a:ext cx="5039995" cy="1223437"/>
-          </a:xfrm>
-          <a:prstGeom prst="rect">
-            <a:avLst/>
-          </a:prstGeom>
-          <a:effectLst>
-            <a:outerShdw blurRad="63500" sx="102000" sy="102000" algn="ctr" rotWithShape="0">
-              <a:schemeClr val="bg1">
-                <a:lumMod val="50000"/>
-                <a:alpha val="40000"/>
-              </a:schemeClr>
-            </a:outerShdw>
-          </a:effectLst>
-          <a:extLst>
-            <a:ext uri="{53640926-AAD7-44D8-BBD7-CCE9431645EC}">
-              <a14:shadowObscured xmlns:a14="http://schemas.microsoft.com/office/drawing/2010/main"/>
-            </a:ext>
-          </a:extLst>
-        </p:spPr>
-      </p:pic>
-      <p:pic>
-        <p:nvPicPr>
-          <p:cNvPr id="15" name="Kép 14" descr="A képen szöveg látható&#10;&#10;Automatikusan generált leírás">
-            <a:extLst>
-              <a:ext uri="{FF2B5EF4-FFF2-40B4-BE49-F238E27FC236}">
-                <a16:creationId xmlns:a16="http://schemas.microsoft.com/office/drawing/2014/main" id="{BCE12F8D-C494-4820-8DC8-41071482C32D}"/>
-              </a:ext>
-            </a:extLst>
-          </p:cNvPr>
-          <p:cNvPicPr>
-            <a:picLocks noChangeAspect="1"/>
-          </p:cNvPicPr>
-          <p:nvPr/>
-        </p:nvPicPr>
-        <p:blipFill>
-          <a:blip r:embed="rId4">
-            <a:extLst>
-              <a:ext uri="{28A0092B-C50C-407E-A947-70E740481C1C}">
-                <a14:useLocalDpi xmlns:a14="http://schemas.microsoft.com/office/drawing/2010/main" val="0"/>
-              </a:ext>
-            </a:extLst>
-          </a:blip>
-          <a:stretch>
-            <a:fillRect/>
-          </a:stretch>
         </p:blipFill>
         <p:spPr>
           <a:xfrm>
-            <a:off x="550736" y="5096487"/>
-            <a:ext cx="5043104" cy="1224754"/>
+            <a:off x="6535047" y="5931579"/>
+            <a:ext cx="4996800" cy="374400"/>
           </a:xfrm>
           <a:prstGeom prst="rect">
             <a:avLst/>
@@ -6706,34 +6856,27 @@
       </p:pic>
       <p:pic>
         <p:nvPicPr>
-          <p:cNvPr id="17" name="Kép 16" descr="A képen szöveg látható&#10;&#10;Automatikusan generált leírás">
-            <a:extLst>
-              <a:ext uri="{FF2B5EF4-FFF2-40B4-BE49-F238E27FC236}">
-                <a16:creationId xmlns:a16="http://schemas.microsoft.com/office/drawing/2014/main" id="{5F39D9DB-73CA-47A5-905A-D17D27E6173B}"/>
-              </a:ext>
-            </a:extLst>
-          </p:cNvPr>
+          <p:cNvPr id="16" name="Kép 15"/>
           <p:cNvPicPr>
             <a:picLocks noChangeAspect="1"/>
           </p:cNvPicPr>
           <p:nvPr/>
         </p:nvPicPr>
-        <p:blipFill>
-          <a:blip r:embed="rId5">
+        <p:blipFill rotWithShape="1">
+          <a:blip r:embed="rId4">
             <a:extLst>
               <a:ext uri="{28A0092B-C50C-407E-A947-70E740481C1C}">
                 <a14:useLocalDpi xmlns:a14="http://schemas.microsoft.com/office/drawing/2010/main" val="0"/>
               </a:ext>
             </a:extLst>
           </a:blip>
-          <a:stretch>
-            <a:fillRect/>
-          </a:stretch>
+          <a:srcRect t="37365" r="11242" b="33632"/>
+          <a:stretch/>
         </p:blipFill>
         <p:spPr>
           <a:xfrm>
-            <a:off x="6510542" y="2027213"/>
-            <a:ext cx="5040333" cy="2374692"/>
+            <a:off x="651199" y="5931579"/>
+            <a:ext cx="4996800" cy="373073"/>
           </a:xfrm>
           <a:prstGeom prst="rect">
             <a:avLst/>
@@ -6748,6 +6891,325 @@
           </a:effectLst>
         </p:spPr>
       </p:pic>
+      <p:pic>
+        <p:nvPicPr>
+          <p:cNvPr id="17" name="Kép 16"/>
+          <p:cNvPicPr>
+            <a:picLocks noChangeAspect="1"/>
+          </p:cNvPicPr>
+          <p:nvPr/>
+        </p:nvPicPr>
+        <p:blipFill rotWithShape="1">
+          <a:blip r:embed="rId5">
+            <a:extLst>
+              <a:ext uri="{28A0092B-C50C-407E-A947-70E740481C1C}">
+                <a14:useLocalDpi xmlns:a14="http://schemas.microsoft.com/office/drawing/2010/main" val="0"/>
+              </a:ext>
+            </a:extLst>
+          </a:blip>
+          <a:srcRect l="50133" t="4950" b="18232"/>
+          <a:stretch/>
+        </p:blipFill>
+        <p:spPr>
+          <a:xfrm>
+            <a:off x="6535047" y="4217158"/>
+            <a:ext cx="4991662" cy="1440000"/>
+          </a:xfrm>
+          <a:prstGeom prst="rect">
+            <a:avLst/>
+          </a:prstGeom>
+          <a:effectLst>
+            <a:outerShdw blurRad="63500" sx="102000" sy="102000" algn="ctr" rotWithShape="0">
+              <a:schemeClr val="bg1">
+                <a:lumMod val="50000"/>
+                <a:alpha val="40000"/>
+              </a:schemeClr>
+            </a:outerShdw>
+          </a:effectLst>
+        </p:spPr>
+      </p:pic>
+      <p:pic>
+        <p:nvPicPr>
+          <p:cNvPr id="18" name="Kép 17"/>
+          <p:cNvPicPr>
+            <a:picLocks noChangeAspect="1"/>
+          </p:cNvPicPr>
+          <p:nvPr/>
+        </p:nvPicPr>
+        <p:blipFill rotWithShape="1">
+          <a:blip r:embed="rId6">
+            <a:extLst>
+              <a:ext uri="{28A0092B-C50C-407E-A947-70E740481C1C}">
+                <a14:useLocalDpi xmlns:a14="http://schemas.microsoft.com/office/drawing/2010/main" val="0"/>
+              </a:ext>
+            </a:extLst>
+          </a:blip>
+          <a:srcRect b="6017"/>
+          <a:stretch/>
+        </p:blipFill>
+        <p:spPr>
+          <a:xfrm>
+            <a:off x="646506" y="1907978"/>
+            <a:ext cx="5020064" cy="2088000"/>
+          </a:xfrm>
+          <a:prstGeom prst="rect">
+            <a:avLst/>
+          </a:prstGeom>
+          <a:effectLst>
+            <a:outerShdw blurRad="63500" sx="102000" sy="102000" algn="ctr" rotWithShape="0">
+              <a:schemeClr val="bg1">
+                <a:lumMod val="50000"/>
+                <a:alpha val="40000"/>
+              </a:schemeClr>
+            </a:outerShdw>
+          </a:effectLst>
+        </p:spPr>
+      </p:pic>
+      <p:pic>
+        <p:nvPicPr>
+          <p:cNvPr id="20" name="Kép 19"/>
+          <p:cNvPicPr>
+            <a:picLocks noChangeAspect="1"/>
+          </p:cNvPicPr>
+          <p:nvPr/>
+        </p:nvPicPr>
+        <p:blipFill rotWithShape="1">
+          <a:blip r:embed="rId5">
+            <a:extLst>
+              <a:ext uri="{28A0092B-C50C-407E-A947-70E740481C1C}">
+                <a14:useLocalDpi xmlns:a14="http://schemas.microsoft.com/office/drawing/2010/main" val="0"/>
+              </a:ext>
+            </a:extLst>
+          </a:blip>
+          <a:srcRect t="4950" r="50066" b="18232"/>
+          <a:stretch/>
+        </p:blipFill>
+        <p:spPr>
+          <a:xfrm>
+            <a:off x="668241" y="4230679"/>
+            <a:ext cx="4998329" cy="1440000"/>
+          </a:xfrm>
+          <a:prstGeom prst="rect">
+            <a:avLst/>
+          </a:prstGeom>
+          <a:effectLst>
+            <a:outerShdw blurRad="63500" sx="102000" sy="102000" algn="ctr" rotWithShape="0">
+              <a:schemeClr val="bg1">
+                <a:lumMod val="50000"/>
+                <a:alpha val="40000"/>
+              </a:schemeClr>
+            </a:outerShdw>
+          </a:effectLst>
+        </p:spPr>
+      </p:pic>
+    </p:spTree>
+    <p:extLst>
+      <p:ext uri="{BB962C8B-B14F-4D97-AF65-F5344CB8AC3E}">
+        <p14:creationId xmlns:p14="http://schemas.microsoft.com/office/powerpoint/2010/main" val="3604941466"/>
+      </p:ext>
+    </p:extLst>
+  </p:cSld>
+  <p:clrMapOvr>
+    <a:masterClrMapping/>
+  </p:clrMapOvr>
+</p:sld>
+</file>
+
+<file path=ppt/slides/slide6.xml><?xml version="1.0" encoding="utf-8"?>
+<p:sld xmlns:a="http://schemas.openxmlformats.org/drawingml/2006/main" xmlns:r="http://schemas.openxmlformats.org/officeDocument/2006/relationships" xmlns:p="http://schemas.openxmlformats.org/presentationml/2006/main">
+  <p:cSld>
+    <p:spTree>
+      <p:nvGrpSpPr>
+        <p:cNvPr id="1" name=""/>
+        <p:cNvGrpSpPr/>
+        <p:nvPr/>
+      </p:nvGrpSpPr>
+      <p:grpSpPr>
+        <a:xfrm>
+          <a:off x="0" y="0"/>
+          <a:ext cx="0" cy="0"/>
+          <a:chOff x="0" y="0"/>
+          <a:chExt cx="0" cy="0"/>
+        </a:xfrm>
+      </p:grpSpPr>
+      <p:sp>
+        <p:nvSpPr>
+          <p:cNvPr id="2" name="Cím 1">
+            <a:extLst>
+              <a:ext uri="{FF2B5EF4-FFF2-40B4-BE49-F238E27FC236}">
+                <a16:creationId xmlns:a16="http://schemas.microsoft.com/office/drawing/2014/main" id="{C37C21C9-7C9C-4C95-BE06-301051055663}"/>
+              </a:ext>
+            </a:extLst>
+          </p:cNvPr>
+          <p:cNvSpPr>
+            <a:spLocks noGrp="1"/>
+          </p:cNvSpPr>
+          <p:nvPr>
+            <p:ph type="ctrTitle"/>
+          </p:nvPr>
+        </p:nvSpPr>
+        <p:spPr>
+          <a:xfrm>
+            <a:off x="1524000" y="67286"/>
+            <a:ext cx="9144000" cy="847114"/>
+          </a:xfrm>
+          <a:ln>
+            <a:noFill/>
+          </a:ln>
+        </p:spPr>
+        <p:txBody>
+          <a:bodyPr anchor="ctr">
+            <a:normAutofit fontScale="90000"/>
+          </a:bodyPr>
+          <a:lstStyle/>
+          <a:p>
+            <a:r>
+              <a:rPr lang="en-GB" sz="6000" dirty="0">
+                <a:solidFill>
+                  <a:schemeClr val="tx1">
+                    <a:lumMod val="75000"/>
+                    <a:lumOff val="25000"/>
+                  </a:schemeClr>
+                </a:solidFill>
+                <a:latin typeface="Arial" panose="020B0604020202020204" pitchFamily="34" charset="0"/>
+                <a:cs typeface="Arial" panose="020B0604020202020204" pitchFamily="34" charset="0"/>
+              </a:rPr>
+              <a:t>Backend showcase</a:t>
+            </a:r>
+            <a:endParaRPr lang="en-GB" dirty="0"/>
+          </a:p>
+        </p:txBody>
+      </p:sp>
+      <p:sp>
+        <p:nvSpPr>
+          <p:cNvPr id="3" name="Alcím 2">
+            <a:extLst>
+              <a:ext uri="{FF2B5EF4-FFF2-40B4-BE49-F238E27FC236}">
+                <a16:creationId xmlns:a16="http://schemas.microsoft.com/office/drawing/2014/main" id="{2C955F0C-2D0A-42E1-9674-A9AFB46D7175}"/>
+              </a:ext>
+            </a:extLst>
+          </p:cNvPr>
+          <p:cNvSpPr>
+            <a:spLocks noGrp="1"/>
+          </p:cNvSpPr>
+          <p:nvPr>
+            <p:ph type="subTitle" idx="1"/>
+          </p:nvPr>
+        </p:nvSpPr>
+        <p:spPr>
+          <a:xfrm>
+            <a:off x="1524000" y="933633"/>
+            <a:ext cx="9144000" cy="545352"/>
+          </a:xfrm>
+        </p:spPr>
+        <p:txBody>
+          <a:bodyPr>
+            <a:normAutofit lnSpcReduction="10000"/>
+          </a:bodyPr>
+          <a:lstStyle/>
+          <a:p>
+            <a:r>
+              <a:rPr lang="hu-HU" sz="3600" dirty="0" smtClean="0">
+                <a:solidFill>
+                  <a:schemeClr val="tx1">
+                    <a:lumMod val="75000"/>
+                    <a:lumOff val="25000"/>
+                  </a:schemeClr>
+                </a:solidFill>
+                <a:latin typeface="Arial" panose="020B0604020202020204" pitchFamily="34" charset="0"/>
+                <a:cs typeface="Arial" panose="020B0604020202020204" pitchFamily="34" charset="0"/>
+              </a:rPr>
+              <a:t>Login</a:t>
+            </a:r>
+            <a:r>
+              <a:rPr lang="en-GB" sz="3600" dirty="0" smtClean="0">
+                <a:solidFill>
+                  <a:schemeClr val="tx1">
+                    <a:lumMod val="75000"/>
+                    <a:lumOff val="25000"/>
+                  </a:schemeClr>
+                </a:solidFill>
+                <a:latin typeface="Arial" panose="020B0604020202020204" pitchFamily="34" charset="0"/>
+                <a:cs typeface="Arial" panose="020B0604020202020204" pitchFamily="34" charset="0"/>
+              </a:rPr>
+              <a:t> </a:t>
+            </a:r>
+            <a:r>
+              <a:rPr lang="en-GB" sz="3600" dirty="0">
+                <a:solidFill>
+                  <a:schemeClr val="tx1">
+                    <a:lumMod val="75000"/>
+                    <a:lumOff val="25000"/>
+                  </a:schemeClr>
+                </a:solidFill>
+                <a:latin typeface="Arial" panose="020B0604020202020204" pitchFamily="34" charset="0"/>
+                <a:cs typeface="Arial" panose="020B0604020202020204" pitchFamily="34" charset="0"/>
+              </a:rPr>
+              <a:t>&amp; </a:t>
+            </a:r>
+            <a:r>
+              <a:rPr lang="hu-HU" sz="3600" dirty="0" smtClean="0">
+                <a:solidFill>
+                  <a:schemeClr val="tx1">
+                    <a:lumMod val="75000"/>
+                    <a:lumOff val="25000"/>
+                  </a:schemeClr>
+                </a:solidFill>
+                <a:latin typeface="Arial" panose="020B0604020202020204" pitchFamily="34" charset="0"/>
+                <a:cs typeface="Arial" panose="020B0604020202020204" pitchFamily="34" charset="0"/>
+              </a:rPr>
+              <a:t>Authentication</a:t>
+            </a:r>
+            <a:endParaRPr lang="en-GB" sz="3600" dirty="0"/>
+          </a:p>
+        </p:txBody>
+      </p:sp>
+      <p:cxnSp>
+        <p:nvCxnSpPr>
+          <p:cNvPr id="5" name="Egyenes összekötő 4">
+            <a:extLst>
+              <a:ext uri="{FF2B5EF4-FFF2-40B4-BE49-F238E27FC236}">
+                <a16:creationId xmlns:a16="http://schemas.microsoft.com/office/drawing/2014/main" id="{67B72B84-2E81-4645-92BA-59A24301A3AF}"/>
+              </a:ext>
+            </a:extLst>
+          </p:cNvPr>
+          <p:cNvCxnSpPr>
+            <a:cxnSpLocks/>
+          </p:cNvCxnSpPr>
+          <p:nvPr/>
+        </p:nvCxnSpPr>
+        <p:spPr>
+          <a:xfrm>
+            <a:off x="3167406" y="914400"/>
+            <a:ext cx="5863472" cy="0"/>
+          </a:xfrm>
+          <a:prstGeom prst="line">
+            <a:avLst/>
+          </a:prstGeom>
+          <a:ln w="25400">
+            <a:solidFill>
+              <a:schemeClr val="tx1">
+                <a:lumMod val="50000"/>
+                <a:lumOff val="50000"/>
+              </a:schemeClr>
+            </a:solidFill>
+          </a:ln>
+        </p:spPr>
+        <p:style>
+          <a:lnRef idx="1">
+            <a:schemeClr val="accent1"/>
+          </a:lnRef>
+          <a:fillRef idx="0">
+            <a:schemeClr val="accent1"/>
+          </a:fillRef>
+          <a:effectRef idx="0">
+            <a:schemeClr val="accent1"/>
+          </a:effectRef>
+          <a:fontRef idx="minor">
+            <a:schemeClr val="tx1"/>
+          </a:fontRef>
+        </p:style>
+      </p:cxnSp>
       <p:sp>
         <p:nvSpPr>
           <p:cNvPr id="19" name="Alcím 2">
@@ -6941,7 +7403,7 @@
           </a:lstStyle>
           <a:p>
             <a:r>
-              <a:rPr lang="en-GB" dirty="0">
+              <a:rPr lang="en-GB" dirty="0" smtClean="0">
                 <a:solidFill>
                   <a:schemeClr val="tx1">
                     <a:lumMod val="75000"/>
@@ -6951,7 +7413,33 @@
                 <a:latin typeface="Arial" panose="020B0604020202020204" pitchFamily="34" charset="0"/>
                 <a:cs typeface="Arial" panose="020B0604020202020204" pitchFamily="34" charset="0"/>
               </a:rPr>
-              <a:t>(Showcase)</a:t>
+              <a:t>(</a:t>
+            </a:r>
+            <a:r>
+              <a:rPr lang="hu-HU" dirty="0" err="1" smtClean="0">
+                <a:solidFill>
+                  <a:schemeClr val="tx1">
+                    <a:lumMod val="75000"/>
+                    <a:lumOff val="25000"/>
+                  </a:schemeClr>
+                </a:solidFill>
+                <a:latin typeface="Arial" panose="020B0604020202020204" pitchFamily="34" charset="0"/>
+                <a:cs typeface="Arial" panose="020B0604020202020204" pitchFamily="34" charset="0"/>
+              </a:rPr>
+              <a:t>Code</a:t>
+            </a:r>
+            <a:r>
+              <a:rPr lang="en-GB" dirty="0" smtClean="0">
+                <a:solidFill>
+                  <a:schemeClr val="tx1">
+                    <a:lumMod val="75000"/>
+                    <a:lumOff val="25000"/>
+                  </a:schemeClr>
+                </a:solidFill>
+                <a:latin typeface="Arial" panose="020B0604020202020204" pitchFamily="34" charset="0"/>
+                <a:cs typeface="Arial" panose="020B0604020202020204" pitchFamily="34" charset="0"/>
+              </a:rPr>
+              <a:t>)</a:t>
             </a:r>
             <a:endParaRPr lang="en-GB" dirty="0"/>
           </a:p>
@@ -6960,7 +7448,411 @@
     </p:spTree>
     <p:extLst>
       <p:ext uri="{BB962C8B-B14F-4D97-AF65-F5344CB8AC3E}">
-        <p14:creationId xmlns:p14="http://schemas.microsoft.com/office/powerpoint/2010/main" val="2041905248"/>
+        <p14:creationId xmlns:p14="http://schemas.microsoft.com/office/powerpoint/2010/main" val="1121524537"/>
+      </p:ext>
+    </p:extLst>
+  </p:cSld>
+  <p:clrMapOvr>
+    <a:masterClrMapping/>
+  </p:clrMapOvr>
+</p:sld>
+</file>
+
+<file path=ppt/slides/slide7.xml><?xml version="1.0" encoding="utf-8"?>
+<p:sld xmlns:a="http://schemas.openxmlformats.org/drawingml/2006/main" xmlns:r="http://schemas.openxmlformats.org/officeDocument/2006/relationships" xmlns:p="http://schemas.openxmlformats.org/presentationml/2006/main">
+  <p:cSld>
+    <p:spTree>
+      <p:nvGrpSpPr>
+        <p:cNvPr id="1" name=""/>
+        <p:cNvGrpSpPr/>
+        <p:nvPr/>
+      </p:nvGrpSpPr>
+      <p:grpSpPr>
+        <a:xfrm>
+          <a:off x="0" y="0"/>
+          <a:ext cx="0" cy="0"/>
+          <a:chOff x="0" y="0"/>
+          <a:chExt cx="0" cy="0"/>
+        </a:xfrm>
+      </p:grpSpPr>
+      <p:sp>
+        <p:nvSpPr>
+          <p:cNvPr id="2" name="Cím 1">
+            <a:extLst>
+              <a:ext uri="{FF2B5EF4-FFF2-40B4-BE49-F238E27FC236}">
+                <a16:creationId xmlns:a16="http://schemas.microsoft.com/office/drawing/2014/main" id="{C37C21C9-7C9C-4C95-BE06-301051055663}"/>
+              </a:ext>
+            </a:extLst>
+          </p:cNvPr>
+          <p:cNvSpPr>
+            <a:spLocks noGrp="1"/>
+          </p:cNvSpPr>
+          <p:nvPr>
+            <p:ph type="ctrTitle"/>
+          </p:nvPr>
+        </p:nvSpPr>
+        <p:spPr>
+          <a:xfrm>
+            <a:off x="1524000" y="67286"/>
+            <a:ext cx="9144000" cy="847114"/>
+          </a:xfrm>
+          <a:ln>
+            <a:noFill/>
+          </a:ln>
+        </p:spPr>
+        <p:txBody>
+          <a:bodyPr anchor="ctr">
+            <a:normAutofit fontScale="90000"/>
+          </a:bodyPr>
+          <a:lstStyle/>
+          <a:p>
+            <a:r>
+              <a:rPr lang="hu-HU" sz="6000" dirty="0" err="1" smtClean="0">
+                <a:solidFill>
+                  <a:schemeClr val="tx1">
+                    <a:lumMod val="75000"/>
+                    <a:lumOff val="25000"/>
+                  </a:schemeClr>
+                </a:solidFill>
+                <a:latin typeface="Arial" panose="020B0604020202020204" pitchFamily="34" charset="0"/>
+                <a:cs typeface="Arial" panose="020B0604020202020204" pitchFamily="34" charset="0"/>
+              </a:rPr>
+              <a:t>template</a:t>
+            </a:r>
+            <a:endParaRPr lang="en-GB" dirty="0"/>
+          </a:p>
+        </p:txBody>
+      </p:sp>
+      <p:sp>
+        <p:nvSpPr>
+          <p:cNvPr id="3" name="Alcím 2">
+            <a:extLst>
+              <a:ext uri="{FF2B5EF4-FFF2-40B4-BE49-F238E27FC236}">
+                <a16:creationId xmlns:a16="http://schemas.microsoft.com/office/drawing/2014/main" id="{2C955F0C-2D0A-42E1-9674-A9AFB46D7175}"/>
+              </a:ext>
+            </a:extLst>
+          </p:cNvPr>
+          <p:cNvSpPr>
+            <a:spLocks noGrp="1"/>
+          </p:cNvSpPr>
+          <p:nvPr>
+            <p:ph type="subTitle" idx="1"/>
+          </p:nvPr>
+        </p:nvSpPr>
+        <p:spPr>
+          <a:xfrm>
+            <a:off x="1524000" y="933633"/>
+            <a:ext cx="9144000" cy="545352"/>
+          </a:xfrm>
+        </p:spPr>
+        <p:txBody>
+          <a:bodyPr>
+            <a:normAutofit lnSpcReduction="10000"/>
+          </a:bodyPr>
+          <a:lstStyle/>
+          <a:p>
+            <a:r>
+              <a:rPr lang="hu-HU" sz="3600" dirty="0" err="1" smtClean="0">
+                <a:solidFill>
+                  <a:schemeClr val="tx1">
+                    <a:lumMod val="75000"/>
+                    <a:lumOff val="25000"/>
+                  </a:schemeClr>
+                </a:solidFill>
+                <a:latin typeface="Arial" panose="020B0604020202020204" pitchFamily="34" charset="0"/>
+                <a:cs typeface="Arial" panose="020B0604020202020204" pitchFamily="34" charset="0"/>
+              </a:rPr>
+              <a:t>template</a:t>
+            </a:r>
+            <a:endParaRPr lang="en-GB" sz="3600" dirty="0"/>
+          </a:p>
+        </p:txBody>
+      </p:sp>
+      <p:cxnSp>
+        <p:nvCxnSpPr>
+          <p:cNvPr id="5" name="Egyenes összekötő 4">
+            <a:extLst>
+              <a:ext uri="{FF2B5EF4-FFF2-40B4-BE49-F238E27FC236}">
+                <a16:creationId xmlns:a16="http://schemas.microsoft.com/office/drawing/2014/main" id="{67B72B84-2E81-4645-92BA-59A24301A3AF}"/>
+              </a:ext>
+            </a:extLst>
+          </p:cNvPr>
+          <p:cNvCxnSpPr>
+            <a:cxnSpLocks/>
+          </p:cNvCxnSpPr>
+          <p:nvPr/>
+        </p:nvCxnSpPr>
+        <p:spPr>
+          <a:xfrm>
+            <a:off x="3167406" y="914400"/>
+            <a:ext cx="5863472" cy="0"/>
+          </a:xfrm>
+          <a:prstGeom prst="line">
+            <a:avLst/>
+          </a:prstGeom>
+          <a:ln w="25400">
+            <a:solidFill>
+              <a:schemeClr val="tx1">
+                <a:lumMod val="50000"/>
+                <a:lumOff val="50000"/>
+              </a:schemeClr>
+            </a:solidFill>
+          </a:ln>
+        </p:spPr>
+        <p:style>
+          <a:lnRef idx="1">
+            <a:schemeClr val="accent1"/>
+          </a:lnRef>
+          <a:fillRef idx="0">
+            <a:schemeClr val="accent1"/>
+          </a:fillRef>
+          <a:effectRef idx="0">
+            <a:schemeClr val="accent1"/>
+          </a:effectRef>
+          <a:fontRef idx="minor">
+            <a:schemeClr val="tx1"/>
+          </a:fontRef>
+        </p:style>
+      </p:cxnSp>
+      <p:sp>
+        <p:nvSpPr>
+          <p:cNvPr id="19" name="Alcím 2">
+            <a:extLst>
+              <a:ext uri="{FF2B5EF4-FFF2-40B4-BE49-F238E27FC236}">
+                <a16:creationId xmlns:a16="http://schemas.microsoft.com/office/drawing/2014/main" id="{E0570FEA-9BAE-45BD-BE2E-95F1E84F7C7C}"/>
+              </a:ext>
+            </a:extLst>
+          </p:cNvPr>
+          <p:cNvSpPr txBox="1">
+            <a:spLocks/>
+          </p:cNvSpPr>
+          <p:nvPr/>
+        </p:nvSpPr>
+        <p:spPr>
+          <a:xfrm>
+            <a:off x="1524000" y="1362626"/>
+            <a:ext cx="9144000" cy="398888"/>
+          </a:xfrm>
+          <a:prstGeom prst="rect">
+            <a:avLst/>
+          </a:prstGeom>
+        </p:spPr>
+        <p:txBody>
+          <a:bodyPr vert="horz" lIns="91440" tIns="45720" rIns="91440" bIns="45720" rtlCol="0">
+            <a:normAutofit lnSpcReduction="10000"/>
+          </a:bodyPr>
+          <a:lstStyle>
+            <a:lvl1pPr marL="0" indent="0" algn="ctr" defTabSz="914400" rtl="0" eaLnBrk="1" latinLnBrk="0" hangingPunct="1">
+              <a:lnSpc>
+                <a:spcPct val="90000"/>
+              </a:lnSpc>
+              <a:spcBef>
+                <a:spcPts val="1000"/>
+              </a:spcBef>
+              <a:buFont typeface="Arial" panose="020B0604020202020204" pitchFamily="34" charset="0"/>
+              <a:buNone/>
+              <a:defRPr sz="2400" kern="1200">
+                <a:solidFill>
+                  <a:schemeClr val="tx1"/>
+                </a:solidFill>
+                <a:latin typeface="+mn-lt"/>
+                <a:ea typeface="+mn-ea"/>
+                <a:cs typeface="+mn-cs"/>
+              </a:defRPr>
+            </a:lvl1pPr>
+            <a:lvl2pPr marL="457200" indent="0" algn="ctr" defTabSz="914400" rtl="0" eaLnBrk="1" latinLnBrk="0" hangingPunct="1">
+              <a:lnSpc>
+                <a:spcPct val="90000"/>
+              </a:lnSpc>
+              <a:spcBef>
+                <a:spcPts val="500"/>
+              </a:spcBef>
+              <a:buFont typeface="Arial" panose="020B0604020202020204" pitchFamily="34" charset="0"/>
+              <a:buNone/>
+              <a:defRPr sz="2000" kern="1200">
+                <a:solidFill>
+                  <a:schemeClr val="tx1"/>
+                </a:solidFill>
+                <a:latin typeface="+mn-lt"/>
+                <a:ea typeface="+mn-ea"/>
+                <a:cs typeface="+mn-cs"/>
+              </a:defRPr>
+            </a:lvl2pPr>
+            <a:lvl3pPr marL="914400" indent="0" algn="ctr" defTabSz="914400" rtl="0" eaLnBrk="1" latinLnBrk="0" hangingPunct="1">
+              <a:lnSpc>
+                <a:spcPct val="90000"/>
+              </a:lnSpc>
+              <a:spcBef>
+                <a:spcPts val="500"/>
+              </a:spcBef>
+              <a:buFont typeface="Arial" panose="020B0604020202020204" pitchFamily="34" charset="0"/>
+              <a:buNone/>
+              <a:defRPr sz="1800" kern="1200">
+                <a:solidFill>
+                  <a:schemeClr val="tx1"/>
+                </a:solidFill>
+                <a:latin typeface="+mn-lt"/>
+                <a:ea typeface="+mn-ea"/>
+                <a:cs typeface="+mn-cs"/>
+              </a:defRPr>
+            </a:lvl3pPr>
+            <a:lvl4pPr marL="1371600" indent="0" algn="ctr" defTabSz="914400" rtl="0" eaLnBrk="1" latinLnBrk="0" hangingPunct="1">
+              <a:lnSpc>
+                <a:spcPct val="90000"/>
+              </a:lnSpc>
+              <a:spcBef>
+                <a:spcPts val="500"/>
+              </a:spcBef>
+              <a:buFont typeface="Arial" panose="020B0604020202020204" pitchFamily="34" charset="0"/>
+              <a:buNone/>
+              <a:defRPr sz="1600" kern="1200">
+                <a:solidFill>
+                  <a:schemeClr val="tx1"/>
+                </a:solidFill>
+                <a:latin typeface="+mn-lt"/>
+                <a:ea typeface="+mn-ea"/>
+                <a:cs typeface="+mn-cs"/>
+              </a:defRPr>
+            </a:lvl4pPr>
+            <a:lvl5pPr marL="1828800" indent="0" algn="ctr" defTabSz="914400" rtl="0" eaLnBrk="1" latinLnBrk="0" hangingPunct="1">
+              <a:lnSpc>
+                <a:spcPct val="90000"/>
+              </a:lnSpc>
+              <a:spcBef>
+                <a:spcPts val="500"/>
+              </a:spcBef>
+              <a:buFont typeface="Arial" panose="020B0604020202020204" pitchFamily="34" charset="0"/>
+              <a:buNone/>
+              <a:defRPr sz="1600" kern="1200">
+                <a:solidFill>
+                  <a:schemeClr val="tx1"/>
+                </a:solidFill>
+                <a:latin typeface="+mn-lt"/>
+                <a:ea typeface="+mn-ea"/>
+                <a:cs typeface="+mn-cs"/>
+              </a:defRPr>
+            </a:lvl5pPr>
+            <a:lvl6pPr marL="2286000" indent="0" algn="ctr" defTabSz="914400" rtl="0" eaLnBrk="1" latinLnBrk="0" hangingPunct="1">
+              <a:lnSpc>
+                <a:spcPct val="90000"/>
+              </a:lnSpc>
+              <a:spcBef>
+                <a:spcPts val="500"/>
+              </a:spcBef>
+              <a:buFont typeface="Arial" panose="020B0604020202020204" pitchFamily="34" charset="0"/>
+              <a:buNone/>
+              <a:defRPr sz="1600" kern="1200">
+                <a:solidFill>
+                  <a:schemeClr val="tx1"/>
+                </a:solidFill>
+                <a:latin typeface="+mn-lt"/>
+                <a:ea typeface="+mn-ea"/>
+                <a:cs typeface="+mn-cs"/>
+              </a:defRPr>
+            </a:lvl6pPr>
+            <a:lvl7pPr marL="2743200" indent="0" algn="ctr" defTabSz="914400" rtl="0" eaLnBrk="1" latinLnBrk="0" hangingPunct="1">
+              <a:lnSpc>
+                <a:spcPct val="90000"/>
+              </a:lnSpc>
+              <a:spcBef>
+                <a:spcPts val="500"/>
+              </a:spcBef>
+              <a:buFont typeface="Arial" panose="020B0604020202020204" pitchFamily="34" charset="0"/>
+              <a:buNone/>
+              <a:defRPr sz="1600" kern="1200">
+                <a:solidFill>
+                  <a:schemeClr val="tx1"/>
+                </a:solidFill>
+                <a:latin typeface="+mn-lt"/>
+                <a:ea typeface="+mn-ea"/>
+                <a:cs typeface="+mn-cs"/>
+              </a:defRPr>
+            </a:lvl7pPr>
+            <a:lvl8pPr marL="3200400" indent="0" algn="ctr" defTabSz="914400" rtl="0" eaLnBrk="1" latinLnBrk="0" hangingPunct="1">
+              <a:lnSpc>
+                <a:spcPct val="90000"/>
+              </a:lnSpc>
+              <a:spcBef>
+                <a:spcPts val="500"/>
+              </a:spcBef>
+              <a:buFont typeface="Arial" panose="020B0604020202020204" pitchFamily="34" charset="0"/>
+              <a:buNone/>
+              <a:defRPr sz="1600" kern="1200">
+                <a:solidFill>
+                  <a:schemeClr val="tx1"/>
+                </a:solidFill>
+                <a:latin typeface="+mn-lt"/>
+                <a:ea typeface="+mn-ea"/>
+                <a:cs typeface="+mn-cs"/>
+              </a:defRPr>
+            </a:lvl8pPr>
+            <a:lvl9pPr marL="3657600" indent="0" algn="ctr" defTabSz="914400" rtl="0" eaLnBrk="1" latinLnBrk="0" hangingPunct="1">
+              <a:lnSpc>
+                <a:spcPct val="90000"/>
+              </a:lnSpc>
+              <a:spcBef>
+                <a:spcPts val="500"/>
+              </a:spcBef>
+              <a:buFont typeface="Arial" panose="020B0604020202020204" pitchFamily="34" charset="0"/>
+              <a:buNone/>
+              <a:defRPr sz="1600" kern="1200">
+                <a:solidFill>
+                  <a:schemeClr val="tx1"/>
+                </a:solidFill>
+                <a:latin typeface="+mn-lt"/>
+                <a:ea typeface="+mn-ea"/>
+                <a:cs typeface="+mn-cs"/>
+              </a:defRPr>
+            </a:lvl9pPr>
+          </a:lstStyle>
+          <a:p>
+            <a:r>
+              <a:rPr lang="en-GB" dirty="0" smtClean="0">
+                <a:solidFill>
+                  <a:schemeClr val="tx1">
+                    <a:lumMod val="75000"/>
+                    <a:lumOff val="25000"/>
+                  </a:schemeClr>
+                </a:solidFill>
+                <a:latin typeface="Arial" panose="020B0604020202020204" pitchFamily="34" charset="0"/>
+                <a:cs typeface="Arial" panose="020B0604020202020204" pitchFamily="34" charset="0"/>
+              </a:rPr>
+              <a:t>(</a:t>
+            </a:r>
+            <a:r>
+              <a:rPr lang="hu-HU" dirty="0" err="1" smtClean="0">
+                <a:solidFill>
+                  <a:schemeClr val="tx1">
+                    <a:lumMod val="75000"/>
+                    <a:lumOff val="25000"/>
+                  </a:schemeClr>
+                </a:solidFill>
+                <a:latin typeface="Arial" panose="020B0604020202020204" pitchFamily="34" charset="0"/>
+                <a:cs typeface="Arial" panose="020B0604020202020204" pitchFamily="34" charset="0"/>
+              </a:rPr>
+              <a:t>template</a:t>
+            </a:r>
+            <a:r>
+              <a:rPr lang="en-GB" dirty="0" smtClean="0">
+                <a:solidFill>
+                  <a:schemeClr val="tx1">
+                    <a:lumMod val="75000"/>
+                    <a:lumOff val="25000"/>
+                  </a:schemeClr>
+                </a:solidFill>
+                <a:latin typeface="Arial" panose="020B0604020202020204" pitchFamily="34" charset="0"/>
+                <a:cs typeface="Arial" panose="020B0604020202020204" pitchFamily="34" charset="0"/>
+              </a:rPr>
+              <a:t>)</a:t>
+            </a:r>
+            <a:endParaRPr lang="en-GB" dirty="0"/>
+          </a:p>
+        </p:txBody>
+      </p:sp>
+    </p:spTree>
+    <p:extLst>
+      <p:ext uri="{BB962C8B-B14F-4D97-AF65-F5344CB8AC3E}">
+        <p14:creationId xmlns:p14="http://schemas.microsoft.com/office/powerpoint/2010/main" val="1930532806"/>
       </p:ext>
     </p:extLst>
   </p:cSld>

</xml_diff>